<commit_message>
docs: atualizar pdf HTML5_e_CSS3-parte_2
</commit_message>
<xml_diff>
--- a/Trilhas/[Iniciante em Programação T5 - ONE]/Material/04.HTML5_e_CSS3-parte_2.pptx
+++ b/Trilhas/[Iniciante em Programação T5 - ONE]/Material/04.HTML5_e_CSS3-parte_2.pptx
@@ -5,20 +5,22 @@
     <p:sldMasterId id="2147483660" r:id="rId1"/>
   </p:sldMasterIdLst>
   <p:notesMasterIdLst>
-    <p:notesMasterId r:id="rId10"/>
+    <p:notesMasterId r:id="rId12"/>
   </p:notesMasterIdLst>
   <p:handoutMasterIdLst>
-    <p:handoutMasterId r:id="rId11"/>
+    <p:handoutMasterId r:id="rId13"/>
   </p:handoutMasterIdLst>
   <p:sldIdLst>
     <p:sldId id="256" r:id="rId2"/>
     <p:sldId id="283" r:id="rId3"/>
-    <p:sldId id="281" r:id="rId4"/>
-    <p:sldId id="280" r:id="rId5"/>
-    <p:sldId id="257" r:id="rId6"/>
-    <p:sldId id="275" r:id="rId7"/>
-    <p:sldId id="276" r:id="rId8"/>
-    <p:sldId id="282" r:id="rId9"/>
+    <p:sldId id="284" r:id="rId4"/>
+    <p:sldId id="285" r:id="rId5"/>
+    <p:sldId id="281" r:id="rId6"/>
+    <p:sldId id="280" r:id="rId7"/>
+    <p:sldId id="257" r:id="rId8"/>
+    <p:sldId id="275" r:id="rId9"/>
+    <p:sldId id="276" r:id="rId10"/>
+    <p:sldId id="282" r:id="rId11"/>
   </p:sldIdLst>
   <p:sldSz cx="12192000" cy="6858000"/>
   <p:notesSz cx="6858000" cy="9144000"/>
@@ -124,6 +126,8 @@
           <p14:sldIdLst>
             <p14:sldId id="256"/>
             <p14:sldId id="283"/>
+            <p14:sldId id="284"/>
+            <p14:sldId id="285"/>
           </p14:sldIdLst>
         </p14:section>
         <p14:section name="Design, Transformar, Anotação, Trabalhe em Conjunto, Diga-me" id="{B9B51309-D148-4332-87C2-07BE32FBCA3B}">
@@ -851,7 +855,7 @@
             <a:pPr rtl="0"/>
             <a:fld id="{DF61EA0F-A667-4B49-8422-0062BC55E249}" type="slidenum">
               <a:rPr lang="pt-BR" smtClean="0"/>
-              <a:t>3</a:t>
+              <a:t>5</a:t>
             </a:fld>
             <a:endParaRPr lang="pt-BR"/>
           </a:p>
@@ -936,7 +940,7 @@
             <a:pPr rtl="0"/>
             <a:fld id="{DF61EA0F-A667-4B49-8422-0062BC55E249}" type="slidenum">
               <a:rPr lang="pt-BR" smtClean="0"/>
-              <a:t>4</a:t>
+              <a:t>6</a:t>
             </a:fld>
             <a:endParaRPr lang="pt-BR"/>
           </a:p>
@@ -1022,7 +1026,7 @@
             <a:pPr rtl="0"/>
             <a:fld id="{DF61EA0F-A667-4B49-8422-0062BC55E249}" type="slidenum">
               <a:rPr lang="pt-BR" smtClean="0"/>
-              <a:t>5</a:t>
+              <a:t>7</a:t>
             </a:fld>
             <a:endParaRPr lang="pt-BR"/>
           </a:p>
@@ -1107,7 +1111,7 @@
             <a:pPr rtl="0"/>
             <a:fld id="{DF61EA0F-A667-4B49-8422-0062BC55E249}" type="slidenum">
               <a:rPr lang="pt-BR" smtClean="0"/>
-              <a:t>6</a:t>
+              <a:t>8</a:t>
             </a:fld>
             <a:endParaRPr lang="pt-BR"/>
           </a:p>
@@ -1192,7 +1196,7 @@
             <a:pPr rtl="0"/>
             <a:fld id="{DF61EA0F-A667-4B49-8422-0062BC55E249}" type="slidenum">
               <a:rPr lang="pt-BR" smtClean="0"/>
-              <a:t>7</a:t>
+              <a:t>9</a:t>
             </a:fld>
             <a:endParaRPr lang="pt-BR"/>
           </a:p>
@@ -1283,7 +1287,7 @@
             <a:pPr rtl="0"/>
             <a:fld id="{DF61EA0F-A667-4B49-8422-0062BC55E249}" type="slidenum">
               <a:rPr lang="pt-BR" smtClean="0"/>
-              <a:t>8</a:t>
+              <a:t>10</a:t>
             </a:fld>
             <a:endParaRPr lang="pt-BR"/>
           </a:p>
@@ -2914,6 +2918,366 @@
 </p:sld>
 </file>
 
+<file path=ppt/slides/slide10.xml><?xml version="1.0" encoding="utf-8"?>
+<p:sld xmlns:a="http://schemas.openxmlformats.org/drawingml/2006/main" xmlns:r="http://schemas.openxmlformats.org/officeDocument/2006/relationships" xmlns:p="http://schemas.openxmlformats.org/presentationml/2006/main">
+  <p:cSld>
+    <p:spTree>
+      <p:nvGrpSpPr>
+        <p:cNvPr id="1" name=""/>
+        <p:cNvGrpSpPr/>
+        <p:nvPr/>
+      </p:nvGrpSpPr>
+      <p:grpSpPr>
+        <a:xfrm>
+          <a:off x="0" y="0"/>
+          <a:ext cx="0" cy="0"/>
+          <a:chOff x="0" y="0"/>
+          <a:chExt cx="0" cy="0"/>
+        </a:xfrm>
+      </p:grpSpPr>
+      <p:sp>
+        <p:nvSpPr>
+          <p:cNvPr id="10" name="Título 9"/>
+          <p:cNvSpPr>
+            <a:spLocks noGrp="1"/>
+          </p:cNvSpPr>
+          <p:nvPr>
+            <p:ph type="title"/>
+          </p:nvPr>
+        </p:nvSpPr>
+        <p:spPr/>
+        <p:txBody>
+          <a:bodyPr rtlCol="0">
+            <a:normAutofit/>
+          </a:bodyPr>
+          <a:lstStyle/>
+          <a:p>
+            <a:pPr rtl="0"/>
+            <a:r>
+              <a:rPr lang="pt-BR">
+                <a:latin typeface="Segoe UI Light" panose="020B0502040204020203" pitchFamily="34" charset="0"/>
+                <a:cs typeface="Segoe UI Light" panose="020B0502040204020203" pitchFamily="34" charset="0"/>
+              </a:rPr>
+              <a:t>Mais dúvidas sobre o PowerPoint?</a:t>
+            </a:r>
+          </a:p>
+        </p:txBody>
+      </p:sp>
+      <p:sp>
+        <p:nvSpPr>
+          <p:cNvPr id="5" name="Espaço Reservado para Conteúdo 4"/>
+          <p:cNvSpPr>
+            <a:spLocks noGrp="1"/>
+          </p:cNvSpPr>
+          <p:nvPr>
+            <p:ph sz="half" idx="4294967295"/>
+          </p:nvPr>
+        </p:nvSpPr>
+        <p:spPr>
+          <a:xfrm>
+            <a:off x="541611" y="2614427"/>
+            <a:ext cx="9442648" cy="3978275"/>
+          </a:xfrm>
+        </p:spPr>
+        <p:txBody>
+          <a:bodyPr rtlCol="0">
+            <a:normAutofit/>
+          </a:bodyPr>
+          <a:lstStyle/>
+          <a:p>
+            <a:pPr marL="0" indent="0" rtl="0">
+              <a:lnSpc>
+                <a:spcPts val="3600"/>
+              </a:lnSpc>
+              <a:spcAft>
+                <a:spcPts val="0"/>
+              </a:spcAft>
+              <a:buNone/>
+            </a:pPr>
+            <a:r>
+              <a:rPr lang="pt-BR" sz="2000" dirty="0">
+                <a:latin typeface="Segoe UI Light" panose="020B0502040204020203" pitchFamily="34" charset="0"/>
+                <a:cs typeface="Segoe UI Light" panose="020B0502040204020203" pitchFamily="34" charset="0"/>
+              </a:rPr>
+              <a:t>Selecione o botão </a:t>
+            </a:r>
+            <a:r>
+              <a:rPr lang="pt-BR" sz="2000" dirty="0">
+                <a:solidFill>
+                  <a:srgbClr val="D24726"/>
+                </a:solidFill>
+                <a:latin typeface="Segoe UI Semibold" panose="020B0702040204020203" pitchFamily="34" charset="0"/>
+                <a:cs typeface="Segoe UI Semibold" panose="020B0702040204020203" pitchFamily="34" charset="0"/>
+              </a:rPr>
+              <a:t>Diga-me</a:t>
+            </a:r>
+            <a:r>
+              <a:rPr lang="pt-BR" sz="2000" dirty="0">
+                <a:latin typeface="Segoe UI Light" panose="020B0502040204020203" pitchFamily="34" charset="0"/>
+                <a:cs typeface="Segoe UI Light" panose="020B0502040204020203" pitchFamily="34" charset="0"/>
+              </a:rPr>
+              <a:t>                  e digite o que você deseja saber.</a:t>
+            </a:r>
+            <a:br>
+              <a:rPr lang="pt-BR" sz="2000" dirty="0">
+                <a:latin typeface="Segoe UI Light" panose="020B0502040204020203" pitchFamily="34" charset="0"/>
+                <a:cs typeface="Segoe UI Light" panose="020B0502040204020203" pitchFamily="34" charset="0"/>
+              </a:rPr>
+            </a:br>
+            <a:endParaRPr lang="pt-BR" sz="2000" dirty="0">
+              <a:latin typeface="Segoe UI Light" panose="020B0502040204020203" pitchFamily="34" charset="0"/>
+              <a:cs typeface="Segoe UI Light" panose="020B0502040204020203" pitchFamily="34" charset="0"/>
+            </a:endParaRPr>
+          </a:p>
+          <a:p>
+            <a:pPr marL="0" indent="0" rtl="0">
+              <a:lnSpc>
+                <a:spcPts val="3600"/>
+              </a:lnSpc>
+              <a:spcAft>
+                <a:spcPts val="0"/>
+              </a:spcAft>
+              <a:buNone/>
+            </a:pPr>
+            <a:r>
+              <a:rPr lang="pt-BR" sz="2000" u="sng" dirty="0">
+                <a:latin typeface="Segoe UI Light" panose="020B0502040204020203" pitchFamily="34" charset="0"/>
+                <a:cs typeface="Segoe UI Light" panose="020B0502040204020203" pitchFamily="34" charset="0"/>
+                <a:hlinkClick r:id="rId3" tooltip="Visite o blog da equipe do PowerPoint"/>
+              </a:rPr>
+              <a:t>Visite o blog da equipe do PowerPoint</a:t>
+            </a:r>
+            <a:endParaRPr lang="pt-BR" sz="2000" dirty="0">
+              <a:latin typeface="Segoe UI Light" panose="020B0502040204020203" pitchFamily="34" charset="0"/>
+              <a:cs typeface="Segoe UI Light" panose="020B0502040204020203" pitchFamily="34" charset="0"/>
+            </a:endParaRPr>
+          </a:p>
+          <a:p>
+            <a:pPr marL="0" indent="0" rtl="0">
+              <a:lnSpc>
+                <a:spcPts val="3600"/>
+              </a:lnSpc>
+              <a:spcBef>
+                <a:spcPts val="1500"/>
+              </a:spcBef>
+              <a:spcAft>
+                <a:spcPts val="0"/>
+              </a:spcAft>
+              <a:buNone/>
+            </a:pPr>
+            <a:r>
+              <a:rPr lang="pt-BR" sz="2000" dirty="0">
+                <a:latin typeface="Segoe UI Light" panose="020B0502040204020203" pitchFamily="34" charset="0"/>
+                <a:cs typeface="Segoe UI Light" panose="020B0502040204020203" pitchFamily="34" charset="0"/>
+                <a:hlinkClick r:id="rId4" tooltip="Acesse o treinamento gratuito do PowerPoint"/>
+              </a:rPr>
+              <a:t>Acesse o treinamento gratuito do PowerPoint</a:t>
+            </a:r>
+            <a:endParaRPr lang="pt-BR" sz="2000" dirty="0">
+              <a:latin typeface="Segoe UI Light" panose="020B0502040204020203" pitchFamily="34" charset="0"/>
+              <a:cs typeface="Segoe UI Light" panose="020B0502040204020203" pitchFamily="34" charset="0"/>
+            </a:endParaRPr>
+          </a:p>
+          <a:p>
+            <a:pPr marL="0" indent="0" rtl="0">
+              <a:lnSpc>
+                <a:spcPts val="3600"/>
+              </a:lnSpc>
+              <a:spcAft>
+                <a:spcPts val="0"/>
+              </a:spcAft>
+              <a:buNone/>
+            </a:pPr>
+            <a:endParaRPr lang="pt-BR" sz="2000" dirty="0">
+              <a:latin typeface="Segoe UI Light" panose="020B0502040204020203" pitchFamily="34" charset="0"/>
+              <a:cs typeface="Segoe UI Light" panose="020B0502040204020203" pitchFamily="34" charset="0"/>
+            </a:endParaRPr>
+          </a:p>
+          <a:p>
+            <a:pPr marL="0" indent="0" rtl="0">
+              <a:lnSpc>
+                <a:spcPts val="3600"/>
+              </a:lnSpc>
+              <a:spcAft>
+                <a:spcPts val="0"/>
+              </a:spcAft>
+              <a:buNone/>
+            </a:pPr>
+            <a:endParaRPr lang="pt-BR" sz="2000" dirty="0">
+              <a:latin typeface="Segoe UI Light" panose="020B0502040204020203" pitchFamily="34" charset="0"/>
+              <a:cs typeface="Segoe UI Light" panose="020B0502040204020203" pitchFamily="34" charset="0"/>
+            </a:endParaRPr>
+          </a:p>
+        </p:txBody>
+      </p:sp>
+      <p:pic>
+        <p:nvPicPr>
+          <p:cNvPr id="2" name="Imagem 1" descr="Botão Diga-me"/>
+          <p:cNvPicPr>
+            <a:picLocks noChangeAspect="1"/>
+          </p:cNvPicPr>
+          <p:nvPr/>
+        </p:nvPicPr>
+        <p:blipFill>
+          <a:blip r:embed="rId5"/>
+          <a:srcRect/>
+          <a:stretch/>
+        </p:blipFill>
+        <p:spPr>
+          <a:xfrm>
+            <a:off x="3616853" y="2350333"/>
+            <a:ext cx="1268511" cy="1189747"/>
+          </a:xfrm>
+          <a:prstGeom prst="rect">
+            <a:avLst/>
+          </a:prstGeom>
+        </p:spPr>
+      </p:pic>
+      <p:pic>
+        <p:nvPicPr>
+          <p:cNvPr id="8" name="Imagem 7" descr="Seta apontando para a direita com um hiperlink para o blog da equipe do PowerPoint. Escolha a imagem para visitar o blog da equipe do PowerPoint ">
+            <a:hlinkClick r:id="rId3" tooltip="Selecione aqui para visitar o blog da equipe do PowerPoint."/>
+          </p:cNvPr>
+          <p:cNvPicPr>
+            <a:picLocks noChangeAspect="1"/>
+          </p:cNvPicPr>
+          <p:nvPr/>
+        </p:nvPicPr>
+        <p:blipFill>
+          <a:blip r:embed="rId6" cstate="print">
+            <a:extLst>
+              <a:ext uri="{28A0092B-C50C-407E-A947-70E740481C1C}">
+                <a14:useLocalDpi xmlns:a14="http://schemas.microsoft.com/office/drawing/2010/main" val="0"/>
+              </a:ext>
+            </a:extLst>
+          </a:blip>
+          <a:stretch>
+            <a:fillRect/>
+          </a:stretch>
+        </p:blipFill>
+        <p:spPr>
+          <a:xfrm>
+            <a:off x="5646174" y="3566804"/>
+            <a:ext cx="661940" cy="661940"/>
+          </a:xfrm>
+          <a:prstGeom prst="rect">
+            <a:avLst/>
+          </a:prstGeom>
+        </p:spPr>
+      </p:pic>
+      <p:pic>
+        <p:nvPicPr>
+          <p:cNvPr id="7" name="Imagem 6" descr="Seta apontando para a direita com um hiperlink para o treinamento gratuito do PowerPoint. Selecione a imagem para acessar um treinamento gratuito do PowerPoint">
+            <a:hlinkClick r:id="rId7" action="ppaction://hlinkfile" tooltip="Selecione aqui para ir para o treinamento gratuito do PowerPoint."/>
+          </p:cNvPr>
+          <p:cNvPicPr>
+            <a:picLocks noChangeAspect="1"/>
+          </p:cNvPicPr>
+          <p:nvPr/>
+        </p:nvPicPr>
+        <p:blipFill>
+          <a:blip r:embed="rId6" cstate="print">
+            <a:extLst>
+              <a:ext uri="{28A0092B-C50C-407E-A947-70E740481C1C}">
+                <a14:useLocalDpi xmlns:a14="http://schemas.microsoft.com/office/drawing/2010/main" val="0"/>
+              </a:ext>
+            </a:extLst>
+          </a:blip>
+          <a:stretch>
+            <a:fillRect/>
+          </a:stretch>
+        </p:blipFill>
+        <p:spPr>
+          <a:xfrm>
+            <a:off x="5646174" y="4252716"/>
+            <a:ext cx="661940" cy="661940"/>
+          </a:xfrm>
+          <a:prstGeom prst="rect">
+            <a:avLst/>
+          </a:prstGeom>
+        </p:spPr>
+      </p:pic>
+      <p:sp>
+        <p:nvSpPr>
+          <p:cNvPr id="9" name="Caixa de texto 8"/>
+          <p:cNvSpPr txBox="1"/>
+          <p:nvPr/>
+        </p:nvSpPr>
+        <p:spPr>
+          <a:xfrm>
+            <a:off x="541611" y="5738132"/>
+            <a:ext cx="6193971" cy="307777"/>
+          </a:xfrm>
+          <a:prstGeom prst="rect">
+            <a:avLst/>
+          </a:prstGeom>
+          <a:noFill/>
+        </p:spPr>
+        <p:txBody>
+          <a:bodyPr wrap="square" rtlCol="0">
+            <a:spAutoFit/>
+          </a:bodyPr>
+          <a:lstStyle/>
+          <a:p>
+            <a:pPr algn="l" rtl="0"/>
+            <a:r>
+              <a:rPr lang="pt-BR" sz="1400" dirty="0">
+                <a:latin typeface="Segoe UI Light" panose="020B0502040204020203" pitchFamily="34" charset="0"/>
+                <a:cs typeface="Segoe UI Light" panose="020B0502040204020203" pitchFamily="34" charset="0"/>
+              </a:rPr>
+              <a:t>ESCOLHA A SETA QUANDO ESTIVER NO MODO DE APRESENTAÇÃO DE SLIDES</a:t>
+            </a:r>
+          </a:p>
+        </p:txBody>
+      </p:sp>
+      <p:pic>
+        <p:nvPicPr>
+          <p:cNvPr id="11" name="Imagem 10" descr="Sugestões da caixa Diga-me"/>
+          <p:cNvPicPr>
+            <a:picLocks noChangeAspect="1"/>
+          </p:cNvPicPr>
+          <p:nvPr/>
+        </p:nvPicPr>
+        <p:blipFill>
+          <a:blip r:embed="rId8"/>
+          <a:srcRect/>
+          <a:stretch/>
+        </p:blipFill>
+        <p:spPr>
+          <a:xfrm>
+            <a:off x="8622792" y="2751216"/>
+            <a:ext cx="2476156" cy="1546333"/>
+          </a:xfrm>
+          <a:prstGeom prst="rect">
+            <a:avLst/>
+          </a:prstGeom>
+        </p:spPr>
+      </p:pic>
+    </p:spTree>
+    <p:extLst>
+      <p:ext uri="{BB962C8B-B14F-4D97-AF65-F5344CB8AC3E}">
+        <p14:creationId xmlns:p14="http://schemas.microsoft.com/office/powerpoint/2010/main" val="893025881"/>
+      </p:ext>
+    </p:extLst>
+  </p:cSld>
+  <p:clrMapOvr>
+    <a:masterClrMapping/>
+  </p:clrMapOvr>
+  <mc:AlternateContent xmlns:mc="http://schemas.openxmlformats.org/markup-compatibility/2006" xmlns:p15="http://schemas.microsoft.com/office/powerpoint/2012/main">
+    <mc:Choice Requires="p15">
+      <p:transition xmlns:p14="http://schemas.microsoft.com/office/powerpoint/2010/main" spd="slow" p14:dur="2000">
+        <p15:prstTrans prst="drape"/>
+      </p:transition>
+    </mc:Choice>
+    <mc:Fallback xmlns="">
+      <p:transition xmlns:p14="http://schemas.microsoft.com/office/powerpoint/2010/main" spd="slow">
+        <p:fade/>
+      </p:transition>
+    </mc:Fallback>
+  </mc:AlternateContent>
+</p:sld>
+</file>
+
 <file path=ppt/slides/slide2.xml><?xml version="1.0" encoding="utf-8"?>
 <p:sld xmlns:a="http://schemas.openxmlformats.org/drawingml/2006/main" xmlns:r="http://schemas.openxmlformats.org/officeDocument/2006/relationships" xmlns:p="http://schemas.openxmlformats.org/presentationml/2006/main">
   <p:cSld>
@@ -2954,7 +3318,7 @@
           <a:p>
             <a:r>
               <a:rPr lang="pt-BR" dirty="0"/>
-              <a:t>Aprendizados</a:t>
+              <a:t>Aprendizado</a:t>
             </a:r>
           </a:p>
         </p:txBody>
@@ -3367,6 +3731,1147 @@
 </file>
 
 <file path=ppt/slides/slide3.xml><?xml version="1.0" encoding="utf-8"?>
+<p:sld xmlns:a="http://schemas.openxmlformats.org/drawingml/2006/main" xmlns:r="http://schemas.openxmlformats.org/officeDocument/2006/relationships" xmlns:p="http://schemas.openxmlformats.org/presentationml/2006/main">
+  <p:cSld>
+    <p:spTree>
+      <p:nvGrpSpPr>
+        <p:cNvPr id="1" name=""/>
+        <p:cNvGrpSpPr/>
+        <p:nvPr/>
+      </p:nvGrpSpPr>
+      <p:grpSpPr>
+        <a:xfrm>
+          <a:off x="0" y="0"/>
+          <a:ext cx="0" cy="0"/>
+          <a:chOff x="0" y="0"/>
+          <a:chExt cx="0" cy="0"/>
+        </a:xfrm>
+      </p:grpSpPr>
+      <p:sp>
+        <p:nvSpPr>
+          <p:cNvPr id="2" name="Título 1">
+            <a:extLst>
+              <a:ext uri="{FF2B5EF4-FFF2-40B4-BE49-F238E27FC236}">
+                <a16:creationId xmlns:a16="http://schemas.microsoft.com/office/drawing/2014/main" id="{7167ADEF-2607-7D0F-2094-EA482596F129}"/>
+              </a:ext>
+            </a:extLst>
+          </p:cNvPr>
+          <p:cNvSpPr>
+            <a:spLocks noGrp="1"/>
+          </p:cNvSpPr>
+          <p:nvPr>
+            <p:ph type="title"/>
+          </p:nvPr>
+        </p:nvSpPr>
+        <p:spPr/>
+        <p:txBody>
+          <a:bodyPr/>
+          <a:lstStyle/>
+          <a:p>
+            <a:r>
+              <a:rPr lang="pt-BR" dirty="0"/>
+              <a:t>Aprendizado</a:t>
+            </a:r>
+          </a:p>
+        </p:txBody>
+      </p:sp>
+      <p:sp>
+        <p:nvSpPr>
+          <p:cNvPr id="3" name="Espaço Reservado para Conteúdo 2">
+            <a:extLst>
+              <a:ext uri="{FF2B5EF4-FFF2-40B4-BE49-F238E27FC236}">
+                <a16:creationId xmlns:a16="http://schemas.microsoft.com/office/drawing/2014/main" id="{AA3EC90F-4DA9-8A26-0929-1D7B04A5CE08}"/>
+              </a:ext>
+            </a:extLst>
+          </p:cNvPr>
+          <p:cNvSpPr>
+            <a:spLocks noGrp="1"/>
+          </p:cNvSpPr>
+          <p:nvPr>
+            <p:ph sz="quarter" idx="10"/>
+          </p:nvPr>
+        </p:nvSpPr>
+        <p:spPr>
+          <a:xfrm>
+            <a:off x="539496" y="1435608"/>
+            <a:ext cx="4416552" cy="5132340"/>
+          </a:xfrm>
+        </p:spPr>
+        <p:txBody>
+          <a:bodyPr>
+            <a:normAutofit fontScale="85000" lnSpcReduction="10000"/>
+          </a:bodyPr>
+          <a:lstStyle/>
+          <a:p>
+            <a:r>
+              <a:rPr lang="pt-BR" b="1" dirty="0"/>
+              <a:t>position</a:t>
+            </a:r>
+          </a:p>
+          <a:p>
+            <a:r>
+              <a:rPr lang="pt-BR" dirty="0"/>
+              <a:t>A propriedade position, encontrada no CSS, define como um elemento pode ser posicionado (renderizado) no documento (página). Essa propriedade (position) pode ser acompanhada de outras, tais como, top, </a:t>
+            </a:r>
+            <a:r>
+              <a:rPr lang="pt-BR" dirty="0" err="1"/>
+              <a:t>right</a:t>
+            </a:r>
+            <a:r>
+              <a:rPr lang="pt-BR" dirty="0"/>
+              <a:t>, </a:t>
+            </a:r>
+            <a:r>
+              <a:rPr lang="pt-BR" dirty="0" err="1"/>
+              <a:t>bottom</a:t>
+            </a:r>
+            <a:r>
+              <a:rPr lang="pt-BR" dirty="0"/>
+              <a:t>, </a:t>
+            </a:r>
+            <a:r>
+              <a:rPr lang="pt-BR" dirty="0" err="1"/>
+              <a:t>and</a:t>
+            </a:r>
+            <a:r>
+              <a:rPr lang="pt-BR" dirty="0"/>
+              <a:t> </a:t>
+            </a:r>
+            <a:r>
+              <a:rPr lang="pt-BR" dirty="0" err="1"/>
+              <a:t>left</a:t>
+            </a:r>
+            <a:r>
+              <a:rPr lang="pt-BR" dirty="0"/>
+              <a:t>, que determinam como ficará a localização final do objeto, permitindo seu deslocamento, como será apresentado adiante.</a:t>
+            </a:r>
+          </a:p>
+          <a:p>
+            <a:r>
+              <a:rPr lang="pt-BR" dirty="0"/>
+              <a:t>position: </a:t>
+            </a:r>
+            <a:r>
+              <a:rPr lang="pt-BR" b="1" dirty="0" err="1">
+                <a:solidFill>
+                  <a:srgbClr val="7030A0"/>
+                </a:solidFill>
+              </a:rPr>
+              <a:t>static</a:t>
+            </a:r>
+            <a:r>
+              <a:rPr lang="pt-BR" dirty="0"/>
+              <a:t>; </a:t>
+            </a:r>
+            <a:br>
+              <a:rPr lang="pt-BR" dirty="0"/>
+            </a:br>
+            <a:r>
+              <a:rPr lang="pt-BR" dirty="0"/>
+              <a:t>position: </a:t>
+            </a:r>
+            <a:r>
+              <a:rPr lang="pt-BR" b="1" dirty="0" err="1">
+                <a:solidFill>
+                  <a:srgbClr val="7030A0"/>
+                </a:solidFill>
+              </a:rPr>
+              <a:t>relative</a:t>
+            </a:r>
+            <a:r>
+              <a:rPr lang="pt-BR" dirty="0"/>
+              <a:t>; </a:t>
+            </a:r>
+            <a:br>
+              <a:rPr lang="pt-BR" dirty="0"/>
+            </a:br>
+            <a:r>
+              <a:rPr lang="pt-BR" dirty="0"/>
+              <a:t>position: </a:t>
+            </a:r>
+            <a:r>
+              <a:rPr lang="pt-BR" b="1" dirty="0" err="1">
+                <a:solidFill>
+                  <a:srgbClr val="7030A0"/>
+                </a:solidFill>
+              </a:rPr>
+              <a:t>absolute</a:t>
+            </a:r>
+            <a:r>
+              <a:rPr lang="pt-BR" dirty="0"/>
+              <a:t>; </a:t>
+            </a:r>
+          </a:p>
+          <a:p>
+            <a:r>
+              <a:rPr lang="pt-BR" dirty="0"/>
+              <a:t>Toda a vez que a gente mexe em posicionamento e a gente está usando posicionamento absoluto, ele fica absoluto em relação a página, ou seja, o novo ponto inicial dele é qualquer ponto que a gente selecionou no navegador.</a:t>
+            </a:r>
+          </a:p>
+          <a:p>
+            <a:r>
+              <a:rPr lang="pt-BR" dirty="0"/>
+              <a:t>Quando eu quero que ele tenha um ponto absoluto, mas de dentro de alguma caixa, eu preciso que essa caixa levante, eu preciso que essa caixa também tenha um posicionamento, só que agora um posicionamento relativo, eu quero só que ela levante, position </a:t>
+            </a:r>
+            <a:r>
+              <a:rPr lang="pt-BR" dirty="0" err="1"/>
+              <a:t>relative</a:t>
+            </a:r>
+            <a:r>
+              <a:rPr lang="pt-BR" dirty="0"/>
+              <a:t>.</a:t>
+            </a:r>
+          </a:p>
+          <a:p>
+            <a:endParaRPr lang="pt-BR" dirty="0"/>
+          </a:p>
+          <a:p>
+            <a:endParaRPr lang="pt-BR" dirty="0"/>
+          </a:p>
+          <a:p>
+            <a:endParaRPr lang="pt-BR" dirty="0"/>
+          </a:p>
+        </p:txBody>
+      </p:sp>
+      <p:sp>
+        <p:nvSpPr>
+          <p:cNvPr id="5" name="Espaço Reservado para Conteúdo 2">
+            <a:extLst>
+              <a:ext uri="{FF2B5EF4-FFF2-40B4-BE49-F238E27FC236}">
+                <a16:creationId xmlns:a16="http://schemas.microsoft.com/office/drawing/2014/main" id="{1C379070-5E34-9338-A64B-33768E83E203}"/>
+              </a:ext>
+            </a:extLst>
+          </p:cNvPr>
+          <p:cNvSpPr txBox="1">
+            <a:spLocks/>
+          </p:cNvSpPr>
+          <p:nvPr/>
+        </p:nvSpPr>
+        <p:spPr>
+          <a:xfrm>
+            <a:off x="6096000" y="1435608"/>
+            <a:ext cx="4416552" cy="5132340"/>
+          </a:xfrm>
+          <a:prstGeom prst="rect">
+            <a:avLst/>
+          </a:prstGeom>
+        </p:spPr>
+        <p:txBody>
+          <a:bodyPr vert="horz" lIns="91440" tIns="45720" rIns="91440" bIns="45720" rtlCol="0">
+            <a:normAutofit/>
+          </a:bodyPr>
+          <a:lstStyle>
+            <a:lvl1pPr marL="0" indent="0" algn="l" defTabSz="914400" rtl="0" eaLnBrk="1" latinLnBrk="0" hangingPunct="1">
+              <a:lnSpc>
+                <a:spcPct val="150000"/>
+              </a:lnSpc>
+              <a:spcBef>
+                <a:spcPts val="1000"/>
+              </a:spcBef>
+              <a:spcAft>
+                <a:spcPts val="1200"/>
+              </a:spcAft>
+              <a:buFontTx/>
+              <a:buNone/>
+              <a:defRPr lang="en-US" sz="1200" kern="1200" smtClean="0">
+                <a:solidFill>
+                  <a:schemeClr val="tx1">
+                    <a:lumMod val="75000"/>
+                    <a:lumOff val="25000"/>
+                  </a:schemeClr>
+                </a:solidFill>
+                <a:latin typeface="+mn-lt"/>
+                <a:ea typeface="+mn-ea"/>
+                <a:cs typeface="+mn-cs"/>
+              </a:defRPr>
+            </a:lvl1pPr>
+            <a:lvl2pPr marL="228600" indent="-228600" algn="l" defTabSz="914400" rtl="0" eaLnBrk="1" latinLnBrk="0" hangingPunct="1">
+              <a:lnSpc>
+                <a:spcPct val="150000"/>
+              </a:lnSpc>
+              <a:spcBef>
+                <a:spcPts val="1000"/>
+              </a:spcBef>
+              <a:spcAft>
+                <a:spcPts val="1200"/>
+              </a:spcAft>
+              <a:buFont typeface="Arial" panose="020B0604020202020204" pitchFamily="34" charset="0"/>
+              <a:buChar char="•"/>
+              <a:defRPr lang="en-US" sz="1200" kern="1200" smtClean="0">
+                <a:solidFill>
+                  <a:schemeClr val="tx1">
+                    <a:lumMod val="75000"/>
+                    <a:lumOff val="25000"/>
+                  </a:schemeClr>
+                </a:solidFill>
+                <a:latin typeface="+mn-lt"/>
+                <a:ea typeface="+mn-ea"/>
+                <a:cs typeface="+mn-cs"/>
+              </a:defRPr>
+            </a:lvl2pPr>
+            <a:lvl3pPr marL="685800" indent="-228600" algn="l" defTabSz="914400" rtl="0" eaLnBrk="1" latinLnBrk="0" hangingPunct="1">
+              <a:lnSpc>
+                <a:spcPct val="150000"/>
+              </a:lnSpc>
+              <a:spcBef>
+                <a:spcPts val="1000"/>
+              </a:spcBef>
+              <a:spcAft>
+                <a:spcPts val="1200"/>
+              </a:spcAft>
+              <a:buFont typeface="Arial" panose="020B0604020202020204" pitchFamily="34" charset="0"/>
+              <a:buChar char="•"/>
+              <a:defRPr lang="en-US" sz="1200" kern="1200" smtClean="0">
+                <a:solidFill>
+                  <a:schemeClr val="tx1">
+                    <a:lumMod val="75000"/>
+                    <a:lumOff val="25000"/>
+                  </a:schemeClr>
+                </a:solidFill>
+                <a:latin typeface="+mn-lt"/>
+                <a:ea typeface="+mn-ea"/>
+                <a:cs typeface="+mn-cs"/>
+              </a:defRPr>
+            </a:lvl3pPr>
+            <a:lvl4pPr marL="1143000" indent="-228600" algn="l" defTabSz="914400" rtl="0" eaLnBrk="1" latinLnBrk="0" hangingPunct="1">
+              <a:lnSpc>
+                <a:spcPct val="150000"/>
+              </a:lnSpc>
+              <a:spcBef>
+                <a:spcPts val="1000"/>
+              </a:spcBef>
+              <a:spcAft>
+                <a:spcPts val="1200"/>
+              </a:spcAft>
+              <a:buFont typeface="Arial" panose="020B0604020202020204" pitchFamily="34" charset="0"/>
+              <a:buChar char="•"/>
+              <a:defRPr lang="en-US" sz="1200" kern="1200" smtClean="0">
+                <a:solidFill>
+                  <a:schemeClr val="tx1">
+                    <a:lumMod val="75000"/>
+                    <a:lumOff val="25000"/>
+                  </a:schemeClr>
+                </a:solidFill>
+                <a:latin typeface="+mn-lt"/>
+                <a:ea typeface="+mn-ea"/>
+                <a:cs typeface="+mn-cs"/>
+              </a:defRPr>
+            </a:lvl4pPr>
+            <a:lvl5pPr marL="1600200" indent="-228600" algn="l" defTabSz="914400" rtl="0" eaLnBrk="1" latinLnBrk="0" hangingPunct="1">
+              <a:lnSpc>
+                <a:spcPct val="150000"/>
+              </a:lnSpc>
+              <a:spcBef>
+                <a:spcPts val="1000"/>
+              </a:spcBef>
+              <a:spcAft>
+                <a:spcPts val="1200"/>
+              </a:spcAft>
+              <a:buFont typeface="Arial" panose="020B0604020202020204" pitchFamily="34" charset="0"/>
+              <a:buChar char="•"/>
+              <a:defRPr lang="en-US" sz="1200" kern="1200">
+                <a:solidFill>
+                  <a:schemeClr val="tx1">
+                    <a:lumMod val="75000"/>
+                    <a:lumOff val="25000"/>
+                  </a:schemeClr>
+                </a:solidFill>
+                <a:latin typeface="+mn-lt"/>
+                <a:ea typeface="+mn-ea"/>
+                <a:cs typeface="+mn-cs"/>
+              </a:defRPr>
+            </a:lvl5pPr>
+            <a:lvl6pPr marL="2057400" indent="-228600" algn="l" defTabSz="914400" rtl="0" eaLnBrk="1" latinLnBrk="0" hangingPunct="1">
+              <a:lnSpc>
+                <a:spcPct val="150000"/>
+              </a:lnSpc>
+              <a:spcBef>
+                <a:spcPts val="1000"/>
+              </a:spcBef>
+              <a:spcAft>
+                <a:spcPts val="1200"/>
+              </a:spcAft>
+              <a:buFont typeface="Arial" panose="020B0604020202020204" pitchFamily="34" charset="0"/>
+              <a:buChar char="•"/>
+              <a:defRPr lang="en-US" sz="1200" kern="1200" dirty="0" smtClean="0">
+                <a:solidFill>
+                  <a:schemeClr val="tx1"/>
+                </a:solidFill>
+                <a:latin typeface="+mn-lt"/>
+                <a:ea typeface="+mn-ea"/>
+                <a:cs typeface="+mn-cs"/>
+              </a:defRPr>
+            </a:lvl6pPr>
+            <a:lvl7pPr marL="2514600" indent="-228600" algn="l" defTabSz="914400" rtl="0" eaLnBrk="1" latinLnBrk="0" hangingPunct="1">
+              <a:lnSpc>
+                <a:spcPct val="150000"/>
+              </a:lnSpc>
+              <a:spcBef>
+                <a:spcPts val="1000"/>
+              </a:spcBef>
+              <a:spcAft>
+                <a:spcPts val="1200"/>
+              </a:spcAft>
+              <a:buFont typeface="Arial" panose="020B0604020202020204" pitchFamily="34" charset="0"/>
+              <a:buChar char="•"/>
+              <a:defRPr lang="en-US" sz="1200" kern="1200" dirty="0" smtClean="0">
+                <a:solidFill>
+                  <a:schemeClr val="tx1"/>
+                </a:solidFill>
+                <a:latin typeface="+mn-lt"/>
+                <a:ea typeface="+mn-ea"/>
+                <a:cs typeface="+mn-cs"/>
+              </a:defRPr>
+            </a:lvl7pPr>
+            <a:lvl8pPr marL="2971800" indent="-228600" algn="l" defTabSz="914400" rtl="0" eaLnBrk="1" latinLnBrk="0" hangingPunct="1">
+              <a:lnSpc>
+                <a:spcPct val="150000"/>
+              </a:lnSpc>
+              <a:spcBef>
+                <a:spcPts val="1000"/>
+              </a:spcBef>
+              <a:spcAft>
+                <a:spcPts val="1200"/>
+              </a:spcAft>
+              <a:buFont typeface="Arial" panose="020B0604020202020204" pitchFamily="34" charset="0"/>
+              <a:buChar char="•"/>
+              <a:defRPr lang="en-US" sz="1200" kern="1200" dirty="0" smtClean="0">
+                <a:solidFill>
+                  <a:schemeClr val="tx1"/>
+                </a:solidFill>
+                <a:latin typeface="+mn-lt"/>
+                <a:ea typeface="+mn-ea"/>
+                <a:cs typeface="+mn-cs"/>
+              </a:defRPr>
+            </a:lvl8pPr>
+            <a:lvl9pPr marL="3429000" indent="-228600" algn="l" defTabSz="914400" rtl="0" eaLnBrk="1" latinLnBrk="0" hangingPunct="1">
+              <a:lnSpc>
+                <a:spcPct val="90000"/>
+              </a:lnSpc>
+              <a:spcBef>
+                <a:spcPct val="30000"/>
+              </a:spcBef>
+              <a:buFont typeface="Arial" panose="020B0604020202020204" pitchFamily="34" charset="0"/>
+              <a:buNone/>
+              <a:defRPr sz="1200" kern="1200">
+                <a:solidFill>
+                  <a:schemeClr val="tx1"/>
+                </a:solidFill>
+                <a:latin typeface="+mn-lt"/>
+                <a:ea typeface="+mn-ea"/>
+                <a:cs typeface="+mn-cs"/>
+              </a:defRPr>
+            </a:lvl9pPr>
+          </a:lstStyle>
+          <a:p>
+            <a:r>
+              <a:rPr lang="pt-BR" sz="1050" b="1" dirty="0"/>
+              <a:t>Valores </a:t>
+            </a:r>
+          </a:p>
+          <a:p>
+            <a:r>
+              <a:rPr lang="pt-BR" sz="1050" b="1" dirty="0" err="1"/>
+              <a:t>static</a:t>
+            </a:r>
+            <a:r>
+              <a:rPr lang="pt-BR" sz="1050" b="1" dirty="0"/>
+              <a:t>: </a:t>
+            </a:r>
+            <a:r>
+              <a:rPr lang="pt-BR" sz="1050" dirty="0"/>
+              <a:t>O elemento é posicionado de acordo com o fluxo normal do documento. O top, </a:t>
+            </a:r>
+            <a:r>
+              <a:rPr lang="pt-BR" sz="1050" dirty="0" err="1"/>
+              <a:t>right</a:t>
+            </a:r>
+            <a:r>
+              <a:rPr lang="pt-BR" sz="1050" dirty="0"/>
+              <a:t>, </a:t>
+            </a:r>
+            <a:r>
+              <a:rPr lang="pt-BR" sz="1050" dirty="0" err="1"/>
+              <a:t>bottom</a:t>
+            </a:r>
+            <a:r>
+              <a:rPr lang="pt-BR" sz="1050" dirty="0"/>
+              <a:t>, </a:t>
+            </a:r>
+            <a:r>
+              <a:rPr lang="pt-BR" sz="1050" dirty="0" err="1"/>
+              <a:t>left</a:t>
+            </a:r>
+            <a:r>
+              <a:rPr lang="pt-BR" sz="1050" dirty="0"/>
+              <a:t>, e z-index propriedades não têm efeito.. Este é o valor padrão.</a:t>
+            </a:r>
+          </a:p>
+          <a:p>
+            <a:r>
+              <a:rPr lang="pt-BR" sz="1050" b="1" dirty="0" err="1"/>
+              <a:t>relative</a:t>
+            </a:r>
+            <a:r>
+              <a:rPr lang="pt-BR" sz="1050" b="1" dirty="0"/>
+              <a:t>: </a:t>
+            </a:r>
+            <a:r>
+              <a:rPr lang="pt-BR" sz="1050" dirty="0"/>
+              <a:t>O elemento é posicionado de acordo com o fluxo normal do documento e, em seguida, deslocado em relação a si mesmo com base nos valores de top, </a:t>
+            </a:r>
+            <a:r>
+              <a:rPr lang="pt-BR" sz="1050" dirty="0" err="1"/>
+              <a:t>right</a:t>
+            </a:r>
+            <a:r>
+              <a:rPr lang="pt-BR" sz="1050" dirty="0"/>
+              <a:t>, </a:t>
+            </a:r>
+            <a:r>
+              <a:rPr lang="pt-BR" sz="1050" dirty="0" err="1"/>
+              <a:t>bottom</a:t>
+            </a:r>
+            <a:r>
+              <a:rPr lang="pt-BR" sz="1050" dirty="0"/>
+              <a:t>, e </a:t>
+            </a:r>
+            <a:r>
+              <a:rPr lang="pt-BR" sz="1050" dirty="0" err="1"/>
+              <a:t>left</a:t>
+            </a:r>
+            <a:r>
+              <a:rPr lang="pt-BR" sz="1050" dirty="0"/>
+              <a:t>. O deslocamento não afeta a posição de nenhum outro elemento; assim, o espaço dado para o elemento no layout da página é o mesmo que se a posição fosse </a:t>
+            </a:r>
+            <a:r>
+              <a:rPr lang="pt-BR" sz="1050" dirty="0" err="1"/>
+              <a:t>static</a:t>
+            </a:r>
+            <a:r>
+              <a:rPr lang="pt-BR" sz="1050" dirty="0"/>
+              <a:t>. </a:t>
+            </a:r>
+          </a:p>
+          <a:p>
+            <a:r>
+              <a:rPr lang="pt-BR" sz="1050" b="1" dirty="0" err="1"/>
+              <a:t>absolute</a:t>
+            </a:r>
+            <a:r>
+              <a:rPr lang="pt-BR" sz="1050" b="1" dirty="0"/>
+              <a:t>: </a:t>
+            </a:r>
+            <a:r>
+              <a:rPr lang="pt-BR" sz="1050" dirty="0"/>
+              <a:t>O elemento é removido do fluxo normal de documentos e nenhum espaço é criado para o elemento no layout da página. Ele é posicionado em relação ao seu ancestral posicionado mais próximo, se houver; caso contrário, ele é colocado em relação ao inicial </a:t>
+            </a:r>
+            <a:r>
+              <a:rPr lang="pt-BR" sz="1050" dirty="0" err="1"/>
+              <a:t>containing</a:t>
+            </a:r>
+            <a:r>
+              <a:rPr lang="pt-BR" sz="1050" dirty="0"/>
+              <a:t> </a:t>
+            </a:r>
+            <a:r>
+              <a:rPr lang="pt-BR" sz="1050" dirty="0" err="1"/>
+              <a:t>block</a:t>
+            </a:r>
+            <a:r>
+              <a:rPr lang="pt-BR" sz="1050" dirty="0"/>
+              <a:t> . Sua posição final é determinada pelos valores de top, </a:t>
+            </a:r>
+            <a:r>
+              <a:rPr lang="pt-BR" sz="1050" dirty="0" err="1"/>
+              <a:t>right</a:t>
+            </a:r>
+            <a:r>
+              <a:rPr lang="pt-BR" sz="1050" dirty="0"/>
+              <a:t>, </a:t>
+            </a:r>
+            <a:r>
+              <a:rPr lang="pt-BR" sz="1050" dirty="0" err="1"/>
+              <a:t>bottom</a:t>
+            </a:r>
+            <a:r>
+              <a:rPr lang="pt-BR" sz="1050" dirty="0"/>
+              <a:t>, e </a:t>
+            </a:r>
+            <a:r>
+              <a:rPr lang="pt-BR" sz="1050" dirty="0" err="1"/>
+              <a:t>left</a:t>
+            </a:r>
+            <a:r>
+              <a:rPr lang="pt-BR" sz="1050" dirty="0"/>
+              <a:t>. </a:t>
+            </a:r>
+          </a:p>
+        </p:txBody>
+      </p:sp>
+    </p:spTree>
+    <p:extLst>
+      <p:ext uri="{BB962C8B-B14F-4D97-AF65-F5344CB8AC3E}">
+        <p14:creationId xmlns:p14="http://schemas.microsoft.com/office/powerpoint/2010/main" val="3836273385"/>
+      </p:ext>
+    </p:extLst>
+  </p:cSld>
+  <p:clrMapOvr>
+    <a:masterClrMapping/>
+  </p:clrMapOvr>
+</p:sld>
+</file>
+
+<file path=ppt/slides/slide4.xml><?xml version="1.0" encoding="utf-8"?>
+<p:sld xmlns:a="http://schemas.openxmlformats.org/drawingml/2006/main" xmlns:r="http://schemas.openxmlformats.org/officeDocument/2006/relationships" xmlns:p="http://schemas.openxmlformats.org/presentationml/2006/main">
+  <p:cSld>
+    <p:spTree>
+      <p:nvGrpSpPr>
+        <p:cNvPr id="1" name=""/>
+        <p:cNvGrpSpPr/>
+        <p:nvPr/>
+      </p:nvGrpSpPr>
+      <p:grpSpPr>
+        <a:xfrm>
+          <a:off x="0" y="0"/>
+          <a:ext cx="0" cy="0"/>
+          <a:chOff x="0" y="0"/>
+          <a:chExt cx="0" cy="0"/>
+        </a:xfrm>
+      </p:grpSpPr>
+      <p:sp>
+        <p:nvSpPr>
+          <p:cNvPr id="2" name="Título 1">
+            <a:extLst>
+              <a:ext uri="{FF2B5EF4-FFF2-40B4-BE49-F238E27FC236}">
+                <a16:creationId xmlns:a16="http://schemas.microsoft.com/office/drawing/2014/main" id="{B1436FCB-CC87-A380-D936-D44F7F30DB48}"/>
+              </a:ext>
+            </a:extLst>
+          </p:cNvPr>
+          <p:cNvSpPr>
+            <a:spLocks noGrp="1"/>
+          </p:cNvSpPr>
+          <p:nvPr>
+            <p:ph type="title"/>
+          </p:nvPr>
+        </p:nvSpPr>
+        <p:spPr/>
+        <p:txBody>
+          <a:bodyPr/>
+          <a:lstStyle/>
+          <a:p>
+            <a:r>
+              <a:rPr lang="pt-BR" dirty="0"/>
+              <a:t>Aprendizado</a:t>
+            </a:r>
+          </a:p>
+        </p:txBody>
+      </p:sp>
+      <p:sp>
+        <p:nvSpPr>
+          <p:cNvPr id="3" name="Espaço Reservado para Conteúdo 2">
+            <a:extLst>
+              <a:ext uri="{FF2B5EF4-FFF2-40B4-BE49-F238E27FC236}">
+                <a16:creationId xmlns:a16="http://schemas.microsoft.com/office/drawing/2014/main" id="{F27AF9B9-7F0D-43D8-846C-0CD57677D173}"/>
+              </a:ext>
+            </a:extLst>
+          </p:cNvPr>
+          <p:cNvSpPr>
+            <a:spLocks noGrp="1"/>
+          </p:cNvSpPr>
+          <p:nvPr>
+            <p:ph sz="quarter" idx="10"/>
+          </p:nvPr>
+        </p:nvSpPr>
+        <p:spPr>
+          <a:xfrm>
+            <a:off x="539496" y="1435607"/>
+            <a:ext cx="4416552" cy="5152005"/>
+          </a:xfrm>
+        </p:spPr>
+        <p:txBody>
+          <a:bodyPr/>
+          <a:lstStyle/>
+          <a:p>
+            <a:r>
+              <a:rPr lang="pt-BR" b="1" dirty="0" err="1"/>
+              <a:t>width</a:t>
+            </a:r>
+            <a:endParaRPr lang="pt-BR" b="1" dirty="0"/>
+          </a:p>
+          <a:p>
+            <a:r>
+              <a:rPr lang="pt-BR" dirty="0"/>
+              <a:t>A propriedade CSS </a:t>
+            </a:r>
+            <a:r>
+              <a:rPr lang="pt-BR" dirty="0" err="1"/>
+              <a:t>width</a:t>
+            </a:r>
+            <a:r>
+              <a:rPr lang="pt-BR" dirty="0"/>
+              <a:t> determina a largura da área de conteúdo de um elemento. A área de conteúdo fica dentro do preenchimento, da borda, e da margem de um elemento.</a:t>
+            </a:r>
+          </a:p>
+          <a:p>
+            <a:r>
+              <a:rPr lang="pt-BR" dirty="0"/>
+              <a:t>// </a:t>
+            </a:r>
+            <a:r>
+              <a:rPr lang="pt-BR" b="1" dirty="0">
+                <a:solidFill>
+                  <a:schemeClr val="accent1"/>
+                </a:solidFill>
+              </a:rPr>
+              <a:t>940px</a:t>
+            </a:r>
+            <a:r>
+              <a:rPr lang="pt-BR" dirty="0"/>
+              <a:t> largura padrão que se usa na web</a:t>
+            </a:r>
+            <a:br>
+              <a:rPr lang="pt-BR" dirty="0"/>
+            </a:br>
+            <a:r>
+              <a:rPr lang="pt-BR" dirty="0" err="1"/>
+              <a:t>width</a:t>
+            </a:r>
+            <a:r>
+              <a:rPr lang="pt-BR" dirty="0"/>
+              <a:t>: </a:t>
+            </a:r>
+            <a:r>
+              <a:rPr lang="pt-BR" b="1" dirty="0">
+                <a:solidFill>
+                  <a:schemeClr val="accent1"/>
+                </a:solidFill>
+              </a:rPr>
+              <a:t>940px</a:t>
+            </a:r>
+            <a:r>
+              <a:rPr lang="pt-BR" dirty="0"/>
+              <a:t>; </a:t>
+            </a:r>
+          </a:p>
+          <a:p>
+            <a:r>
+              <a:rPr lang="pt-BR" b="1" dirty="0" err="1"/>
+              <a:t>margin</a:t>
+            </a:r>
+            <a:r>
+              <a:rPr lang="pt-BR" b="1" dirty="0"/>
+              <a:t>: </a:t>
+            </a:r>
+            <a:r>
+              <a:rPr lang="pt-BR" dirty="0"/>
+              <a:t>Eu</a:t>
+            </a:r>
+            <a:r>
+              <a:rPr lang="pt-BR" b="0" i="0" dirty="0">
+                <a:effectLst/>
+              </a:rPr>
+              <a:t> quero que na minha caixa, o espaçamento externo, ou seja, a margem, para cima e para baixo seja zero e para direita e para a esquerda, elas se calculem automaticamente e para isso, a gente declara que elas são auto, de automáticos.</a:t>
+            </a:r>
+            <a:br>
+              <a:rPr lang="pt-BR" b="0" i="0" dirty="0">
+                <a:effectLst/>
+              </a:rPr>
+            </a:br>
+            <a:br>
+              <a:rPr lang="pt-BR" b="0" i="0" dirty="0">
+                <a:effectLst/>
+              </a:rPr>
+            </a:br>
+            <a:r>
+              <a:rPr lang="pt-BR" b="0" i="0" dirty="0" err="1">
+                <a:effectLst/>
+              </a:rPr>
+              <a:t>margin</a:t>
+            </a:r>
+            <a:r>
+              <a:rPr lang="pt-BR" b="0" i="0" dirty="0">
+                <a:effectLst/>
+              </a:rPr>
+              <a:t>: </a:t>
+            </a:r>
+            <a:r>
+              <a:rPr lang="pt-BR" b="1" i="0" dirty="0">
+                <a:solidFill>
+                  <a:schemeClr val="accent1"/>
+                </a:solidFill>
+                <a:effectLst/>
+              </a:rPr>
+              <a:t>0</a:t>
+            </a:r>
+            <a:r>
+              <a:rPr lang="pt-BR" b="0" i="0" dirty="0">
+                <a:effectLst/>
+              </a:rPr>
+              <a:t> </a:t>
+            </a:r>
+            <a:r>
+              <a:rPr lang="pt-BR" b="1" i="0" dirty="0">
+                <a:solidFill>
+                  <a:srgbClr val="7030A0"/>
+                </a:solidFill>
+                <a:effectLst/>
+              </a:rPr>
+              <a:t>auto</a:t>
+            </a:r>
+            <a:r>
+              <a:rPr lang="pt-BR" b="0" i="0" dirty="0">
+                <a:effectLst/>
+              </a:rPr>
+              <a:t>; </a:t>
+            </a:r>
+          </a:p>
+          <a:p>
+            <a:r>
+              <a:rPr lang="pt-BR" b="1" dirty="0"/>
+              <a:t>Reset </a:t>
+            </a:r>
+            <a:r>
+              <a:rPr lang="pt-BR" b="1" dirty="0" err="1"/>
+              <a:t>css</a:t>
+            </a:r>
+            <a:r>
+              <a:rPr lang="pt-BR" dirty="0"/>
+              <a:t>: limpa todos os padrões do navegador</a:t>
+            </a:r>
+          </a:p>
+        </p:txBody>
+      </p:sp>
+      <p:sp>
+        <p:nvSpPr>
+          <p:cNvPr id="4" name="Espaço Reservado para Conteúdo 2">
+            <a:extLst>
+              <a:ext uri="{FF2B5EF4-FFF2-40B4-BE49-F238E27FC236}">
+                <a16:creationId xmlns:a16="http://schemas.microsoft.com/office/drawing/2014/main" id="{C2D449F0-DADD-6542-440B-0E7124E06BEA}"/>
+              </a:ext>
+            </a:extLst>
+          </p:cNvPr>
+          <p:cNvSpPr txBox="1">
+            <a:spLocks/>
+          </p:cNvSpPr>
+          <p:nvPr/>
+        </p:nvSpPr>
+        <p:spPr>
+          <a:xfrm>
+            <a:off x="6149630" y="1435606"/>
+            <a:ext cx="4416552" cy="5152005"/>
+          </a:xfrm>
+          <a:prstGeom prst="rect">
+            <a:avLst/>
+          </a:prstGeom>
+        </p:spPr>
+        <p:txBody>
+          <a:bodyPr vert="horz" lIns="91440" tIns="45720" rIns="91440" bIns="45720" rtlCol="0">
+            <a:normAutofit/>
+          </a:bodyPr>
+          <a:lstStyle>
+            <a:lvl1pPr marL="0" indent="0" algn="l" defTabSz="914400" rtl="0" eaLnBrk="1" latinLnBrk="0" hangingPunct="1">
+              <a:lnSpc>
+                <a:spcPct val="150000"/>
+              </a:lnSpc>
+              <a:spcBef>
+                <a:spcPts val="1000"/>
+              </a:spcBef>
+              <a:spcAft>
+                <a:spcPts val="1200"/>
+              </a:spcAft>
+              <a:buFontTx/>
+              <a:buNone/>
+              <a:defRPr lang="en-US" sz="1200" kern="1200" smtClean="0">
+                <a:solidFill>
+                  <a:schemeClr val="tx1">
+                    <a:lumMod val="75000"/>
+                    <a:lumOff val="25000"/>
+                  </a:schemeClr>
+                </a:solidFill>
+                <a:latin typeface="+mn-lt"/>
+                <a:ea typeface="+mn-ea"/>
+                <a:cs typeface="+mn-cs"/>
+              </a:defRPr>
+            </a:lvl1pPr>
+            <a:lvl2pPr marL="228600" indent="-228600" algn="l" defTabSz="914400" rtl="0" eaLnBrk="1" latinLnBrk="0" hangingPunct="1">
+              <a:lnSpc>
+                <a:spcPct val="150000"/>
+              </a:lnSpc>
+              <a:spcBef>
+                <a:spcPts val="1000"/>
+              </a:spcBef>
+              <a:spcAft>
+                <a:spcPts val="1200"/>
+              </a:spcAft>
+              <a:buFont typeface="Arial" panose="020B0604020202020204" pitchFamily="34" charset="0"/>
+              <a:buChar char="•"/>
+              <a:defRPr lang="en-US" sz="1200" kern="1200" smtClean="0">
+                <a:solidFill>
+                  <a:schemeClr val="tx1">
+                    <a:lumMod val="75000"/>
+                    <a:lumOff val="25000"/>
+                  </a:schemeClr>
+                </a:solidFill>
+                <a:latin typeface="+mn-lt"/>
+                <a:ea typeface="+mn-ea"/>
+                <a:cs typeface="+mn-cs"/>
+              </a:defRPr>
+            </a:lvl2pPr>
+            <a:lvl3pPr marL="685800" indent="-228600" algn="l" defTabSz="914400" rtl="0" eaLnBrk="1" latinLnBrk="0" hangingPunct="1">
+              <a:lnSpc>
+                <a:spcPct val="150000"/>
+              </a:lnSpc>
+              <a:spcBef>
+                <a:spcPts val="1000"/>
+              </a:spcBef>
+              <a:spcAft>
+                <a:spcPts val="1200"/>
+              </a:spcAft>
+              <a:buFont typeface="Arial" panose="020B0604020202020204" pitchFamily="34" charset="0"/>
+              <a:buChar char="•"/>
+              <a:defRPr lang="en-US" sz="1200" kern="1200" smtClean="0">
+                <a:solidFill>
+                  <a:schemeClr val="tx1">
+                    <a:lumMod val="75000"/>
+                    <a:lumOff val="25000"/>
+                  </a:schemeClr>
+                </a:solidFill>
+                <a:latin typeface="+mn-lt"/>
+                <a:ea typeface="+mn-ea"/>
+                <a:cs typeface="+mn-cs"/>
+              </a:defRPr>
+            </a:lvl3pPr>
+            <a:lvl4pPr marL="1143000" indent="-228600" algn="l" defTabSz="914400" rtl="0" eaLnBrk="1" latinLnBrk="0" hangingPunct="1">
+              <a:lnSpc>
+                <a:spcPct val="150000"/>
+              </a:lnSpc>
+              <a:spcBef>
+                <a:spcPts val="1000"/>
+              </a:spcBef>
+              <a:spcAft>
+                <a:spcPts val="1200"/>
+              </a:spcAft>
+              <a:buFont typeface="Arial" panose="020B0604020202020204" pitchFamily="34" charset="0"/>
+              <a:buChar char="•"/>
+              <a:defRPr lang="en-US" sz="1200" kern="1200" smtClean="0">
+                <a:solidFill>
+                  <a:schemeClr val="tx1">
+                    <a:lumMod val="75000"/>
+                    <a:lumOff val="25000"/>
+                  </a:schemeClr>
+                </a:solidFill>
+                <a:latin typeface="+mn-lt"/>
+                <a:ea typeface="+mn-ea"/>
+                <a:cs typeface="+mn-cs"/>
+              </a:defRPr>
+            </a:lvl4pPr>
+            <a:lvl5pPr marL="1600200" indent="-228600" algn="l" defTabSz="914400" rtl="0" eaLnBrk="1" latinLnBrk="0" hangingPunct="1">
+              <a:lnSpc>
+                <a:spcPct val="150000"/>
+              </a:lnSpc>
+              <a:spcBef>
+                <a:spcPts val="1000"/>
+              </a:spcBef>
+              <a:spcAft>
+                <a:spcPts val="1200"/>
+              </a:spcAft>
+              <a:buFont typeface="Arial" panose="020B0604020202020204" pitchFamily="34" charset="0"/>
+              <a:buChar char="•"/>
+              <a:defRPr lang="en-US" sz="1200" kern="1200">
+                <a:solidFill>
+                  <a:schemeClr val="tx1">
+                    <a:lumMod val="75000"/>
+                    <a:lumOff val="25000"/>
+                  </a:schemeClr>
+                </a:solidFill>
+                <a:latin typeface="+mn-lt"/>
+                <a:ea typeface="+mn-ea"/>
+                <a:cs typeface="+mn-cs"/>
+              </a:defRPr>
+            </a:lvl5pPr>
+            <a:lvl6pPr marL="2057400" indent="-228600" algn="l" defTabSz="914400" rtl="0" eaLnBrk="1" latinLnBrk="0" hangingPunct="1">
+              <a:lnSpc>
+                <a:spcPct val="150000"/>
+              </a:lnSpc>
+              <a:spcBef>
+                <a:spcPts val="1000"/>
+              </a:spcBef>
+              <a:spcAft>
+                <a:spcPts val="1200"/>
+              </a:spcAft>
+              <a:buFont typeface="Arial" panose="020B0604020202020204" pitchFamily="34" charset="0"/>
+              <a:buChar char="•"/>
+              <a:defRPr lang="en-US" sz="1200" kern="1200" dirty="0" smtClean="0">
+                <a:solidFill>
+                  <a:schemeClr val="tx1"/>
+                </a:solidFill>
+                <a:latin typeface="+mn-lt"/>
+                <a:ea typeface="+mn-ea"/>
+                <a:cs typeface="+mn-cs"/>
+              </a:defRPr>
+            </a:lvl6pPr>
+            <a:lvl7pPr marL="2514600" indent="-228600" algn="l" defTabSz="914400" rtl="0" eaLnBrk="1" latinLnBrk="0" hangingPunct="1">
+              <a:lnSpc>
+                <a:spcPct val="150000"/>
+              </a:lnSpc>
+              <a:spcBef>
+                <a:spcPts val="1000"/>
+              </a:spcBef>
+              <a:spcAft>
+                <a:spcPts val="1200"/>
+              </a:spcAft>
+              <a:buFont typeface="Arial" panose="020B0604020202020204" pitchFamily="34" charset="0"/>
+              <a:buChar char="•"/>
+              <a:defRPr lang="en-US" sz="1200" kern="1200" dirty="0" smtClean="0">
+                <a:solidFill>
+                  <a:schemeClr val="tx1"/>
+                </a:solidFill>
+                <a:latin typeface="+mn-lt"/>
+                <a:ea typeface="+mn-ea"/>
+                <a:cs typeface="+mn-cs"/>
+              </a:defRPr>
+            </a:lvl7pPr>
+            <a:lvl8pPr marL="2971800" indent="-228600" algn="l" defTabSz="914400" rtl="0" eaLnBrk="1" latinLnBrk="0" hangingPunct="1">
+              <a:lnSpc>
+                <a:spcPct val="150000"/>
+              </a:lnSpc>
+              <a:spcBef>
+                <a:spcPts val="1000"/>
+              </a:spcBef>
+              <a:spcAft>
+                <a:spcPts val="1200"/>
+              </a:spcAft>
+              <a:buFont typeface="Arial" panose="020B0604020202020204" pitchFamily="34" charset="0"/>
+              <a:buChar char="•"/>
+              <a:defRPr lang="en-US" sz="1200" kern="1200" dirty="0" smtClean="0">
+                <a:solidFill>
+                  <a:schemeClr val="tx1"/>
+                </a:solidFill>
+                <a:latin typeface="+mn-lt"/>
+                <a:ea typeface="+mn-ea"/>
+                <a:cs typeface="+mn-cs"/>
+              </a:defRPr>
+            </a:lvl8pPr>
+            <a:lvl9pPr marL="3429000" indent="-228600" algn="l" defTabSz="914400" rtl="0" eaLnBrk="1" latinLnBrk="0" hangingPunct="1">
+              <a:lnSpc>
+                <a:spcPct val="90000"/>
+              </a:lnSpc>
+              <a:spcBef>
+                <a:spcPct val="30000"/>
+              </a:spcBef>
+              <a:buFont typeface="Arial" panose="020B0604020202020204" pitchFamily="34" charset="0"/>
+              <a:buNone/>
+              <a:defRPr sz="1200" kern="1200">
+                <a:solidFill>
+                  <a:schemeClr val="tx1"/>
+                </a:solidFill>
+                <a:latin typeface="+mn-lt"/>
+                <a:ea typeface="+mn-ea"/>
+                <a:cs typeface="+mn-cs"/>
+              </a:defRPr>
+            </a:lvl9pPr>
+          </a:lstStyle>
+          <a:p>
+            <a:pPr algn="l"/>
+            <a:r>
+              <a:rPr lang="pt-BR" b="1" i="0" dirty="0">
+                <a:effectLst/>
+              </a:rPr>
+              <a:t>Nesta aula, aprendemos:</a:t>
+            </a:r>
+          </a:p>
+          <a:p>
+            <a:pPr marL="171450" indent="-171450" algn="l">
+              <a:buFont typeface="Wingdings" panose="05000000000000000000" pitchFamily="2" charset="2"/>
+              <a:buChar char="q"/>
+            </a:pPr>
+            <a:r>
+              <a:rPr lang="pt-BR" b="0" i="0" dirty="0">
+                <a:effectLst/>
+              </a:rPr>
+              <a:t> Como remover os estilos que o navegador cria automaticamente</a:t>
+            </a:r>
+          </a:p>
+          <a:p>
+            <a:pPr marL="171450" indent="-171450" algn="l">
+              <a:buFont typeface="Wingdings" panose="05000000000000000000" pitchFamily="2" charset="2"/>
+              <a:buChar char="q"/>
+            </a:pPr>
+            <a:r>
+              <a:rPr lang="pt-BR" b="0" i="0" dirty="0">
+                <a:effectLst/>
+              </a:rPr>
+              <a:t> Como funciona os posicionamentos </a:t>
+            </a:r>
+            <a:r>
+              <a:rPr lang="pt-BR" b="1" i="1" dirty="0" err="1">
+                <a:effectLst/>
+              </a:rPr>
+              <a:t>static</a:t>
+            </a:r>
+            <a:r>
+              <a:rPr lang="pt-BR" b="0" i="0" dirty="0">
+                <a:effectLst/>
+              </a:rPr>
+              <a:t>, </a:t>
+            </a:r>
+            <a:r>
+              <a:rPr lang="pt-BR" b="1" i="1" dirty="0" err="1">
+                <a:effectLst/>
+              </a:rPr>
+              <a:t>relative</a:t>
+            </a:r>
+            <a:r>
+              <a:rPr lang="pt-BR" b="0" i="0" dirty="0">
+                <a:effectLst/>
+              </a:rPr>
+              <a:t> e </a:t>
+            </a:r>
+            <a:r>
+              <a:rPr lang="pt-BR" b="1" i="1" dirty="0" err="1">
+                <a:effectLst/>
+              </a:rPr>
+              <a:t>absolute</a:t>
+            </a:r>
+            <a:r>
+              <a:rPr lang="pt-BR" b="0" i="0" dirty="0">
+                <a:effectLst/>
+              </a:rPr>
+              <a:t> dos elementos</a:t>
+            </a:r>
+          </a:p>
+          <a:p>
+            <a:pPr marL="171450" indent="-171450" algn="l">
+              <a:buFont typeface="Wingdings" panose="05000000000000000000" pitchFamily="2" charset="2"/>
+              <a:buChar char="q"/>
+            </a:pPr>
+            <a:r>
+              <a:rPr lang="pt-BR" b="0" i="0" dirty="0">
+                <a:effectLst/>
+              </a:rPr>
+              <a:t> Como posicionar o cabeçalho da nossa página</a:t>
+            </a:r>
+          </a:p>
+          <a:p>
+            <a:endParaRPr lang="pt-BR" b="1" dirty="0"/>
+          </a:p>
+        </p:txBody>
+      </p:sp>
+    </p:spTree>
+    <p:extLst>
+      <p:ext uri="{BB962C8B-B14F-4D97-AF65-F5344CB8AC3E}">
+        <p14:creationId xmlns:p14="http://schemas.microsoft.com/office/powerpoint/2010/main" val="2444524634"/>
+      </p:ext>
+    </p:extLst>
+  </p:cSld>
+  <p:clrMapOvr>
+    <a:masterClrMapping/>
+  </p:clrMapOvr>
+</p:sld>
+</file>
+
+<file path=ppt/slides/slide5.xml><?xml version="1.0" encoding="utf-8"?>
 <p:sld xmlns:a="http://schemas.openxmlformats.org/drawingml/2006/main" xmlns:r="http://schemas.openxmlformats.org/officeDocument/2006/relationships" xmlns:p="http://schemas.openxmlformats.org/presentationml/2006/main">
   <p:cSld>
     <p:spTree>
@@ -3694,7 +5199,7 @@
 </p:sld>
 </file>
 
-<file path=ppt/slides/slide4.xml><?xml version="1.0" encoding="utf-8"?>
+<file path=ppt/slides/slide6.xml><?xml version="1.0" encoding="utf-8"?>
 <p:sld xmlns:a="http://schemas.openxmlformats.org/drawingml/2006/main" xmlns:r="http://schemas.openxmlformats.org/officeDocument/2006/relationships" xmlns:p="http://schemas.openxmlformats.org/presentationml/2006/main">
   <p:cSld>
     <p:spTree>
@@ -5726,7 +7231,7 @@
 </p:sld>
 </file>
 
-<file path=ppt/slides/slide5.xml><?xml version="1.0" encoding="utf-8"?>
+<file path=ppt/slides/slide7.xml><?xml version="1.0" encoding="utf-8"?>
 <p:sld xmlns:a="http://schemas.openxmlformats.org/drawingml/2006/main" xmlns:r="http://schemas.openxmlformats.org/officeDocument/2006/relationships" xmlns:p="http://schemas.openxmlformats.org/presentationml/2006/main">
   <p:cSld>
     <p:spTree>
@@ -6999,7 +8504,7 @@
 </p:sld>
 </file>
 
-<file path=ppt/slides/slide6.xml><?xml version="1.0" encoding="utf-8"?>
+<file path=ppt/slides/slide8.xml><?xml version="1.0" encoding="utf-8"?>
 <p:sld xmlns:a="http://schemas.openxmlformats.org/drawingml/2006/main" xmlns:r="http://schemas.openxmlformats.org/officeDocument/2006/relationships" xmlns:p="http://schemas.openxmlformats.org/presentationml/2006/main">
   <p:cSld>
     <p:spTree>
@@ -8496,7 +10001,7 @@
           <a:effectLst/>
           <a:extLst>
             <a:ext uri="{C572A759-6A51-4108-AA02-DFA0A04FC94B}">
-              <ma14:wrappingTextBoxFlag xmlns="" xmlns:ma14="http://schemas.microsoft.com/office/mac/drawingml/2011/main"/>
+              <ma14:wrappingTextBoxFlag xmlns:ma14="http://schemas.microsoft.com/office/mac/drawingml/2011/main" xmlns=""/>
             </a:ext>
           </a:extLst>
         </p:spPr>
@@ -8672,7 +10177,7 @@
 </p:sld>
 </file>
 
-<file path=ppt/slides/slide7.xml><?xml version="1.0" encoding="utf-8"?>
+<file path=ppt/slides/slide9.xml><?xml version="1.0" encoding="utf-8"?>
 <p:sld xmlns:a="http://schemas.openxmlformats.org/drawingml/2006/main" xmlns:r="http://schemas.openxmlformats.org/officeDocument/2006/relationships" xmlns:p="http://schemas.openxmlformats.org/presentationml/2006/main">
   <p:cSld>
     <p:spTree>
@@ -10149,366 +11654,6 @@
     </mc:Choice>
     <mc:Fallback xmlns="">
       <p:transition/>
-    </mc:Fallback>
-  </mc:AlternateContent>
-</p:sld>
-</file>
-
-<file path=ppt/slides/slide8.xml><?xml version="1.0" encoding="utf-8"?>
-<p:sld xmlns:a="http://schemas.openxmlformats.org/drawingml/2006/main" xmlns:r="http://schemas.openxmlformats.org/officeDocument/2006/relationships" xmlns:p="http://schemas.openxmlformats.org/presentationml/2006/main">
-  <p:cSld>
-    <p:spTree>
-      <p:nvGrpSpPr>
-        <p:cNvPr id="1" name=""/>
-        <p:cNvGrpSpPr/>
-        <p:nvPr/>
-      </p:nvGrpSpPr>
-      <p:grpSpPr>
-        <a:xfrm>
-          <a:off x="0" y="0"/>
-          <a:ext cx="0" cy="0"/>
-          <a:chOff x="0" y="0"/>
-          <a:chExt cx="0" cy="0"/>
-        </a:xfrm>
-      </p:grpSpPr>
-      <p:sp>
-        <p:nvSpPr>
-          <p:cNvPr id="10" name="Título 9"/>
-          <p:cNvSpPr>
-            <a:spLocks noGrp="1"/>
-          </p:cNvSpPr>
-          <p:nvPr>
-            <p:ph type="title"/>
-          </p:nvPr>
-        </p:nvSpPr>
-        <p:spPr/>
-        <p:txBody>
-          <a:bodyPr rtlCol="0">
-            <a:normAutofit/>
-          </a:bodyPr>
-          <a:lstStyle/>
-          <a:p>
-            <a:pPr rtl="0"/>
-            <a:r>
-              <a:rPr lang="pt-BR">
-                <a:latin typeface="Segoe UI Light" panose="020B0502040204020203" pitchFamily="34" charset="0"/>
-                <a:cs typeface="Segoe UI Light" panose="020B0502040204020203" pitchFamily="34" charset="0"/>
-              </a:rPr>
-              <a:t>Mais dúvidas sobre o PowerPoint?</a:t>
-            </a:r>
-          </a:p>
-        </p:txBody>
-      </p:sp>
-      <p:sp>
-        <p:nvSpPr>
-          <p:cNvPr id="5" name="Espaço Reservado para Conteúdo 4"/>
-          <p:cNvSpPr>
-            <a:spLocks noGrp="1"/>
-          </p:cNvSpPr>
-          <p:nvPr>
-            <p:ph sz="half" idx="4294967295"/>
-          </p:nvPr>
-        </p:nvSpPr>
-        <p:spPr>
-          <a:xfrm>
-            <a:off x="541611" y="2614427"/>
-            <a:ext cx="9442648" cy="3978275"/>
-          </a:xfrm>
-        </p:spPr>
-        <p:txBody>
-          <a:bodyPr rtlCol="0">
-            <a:normAutofit/>
-          </a:bodyPr>
-          <a:lstStyle/>
-          <a:p>
-            <a:pPr marL="0" indent="0" rtl="0">
-              <a:lnSpc>
-                <a:spcPts val="3600"/>
-              </a:lnSpc>
-              <a:spcAft>
-                <a:spcPts val="0"/>
-              </a:spcAft>
-              <a:buNone/>
-            </a:pPr>
-            <a:r>
-              <a:rPr lang="pt-BR" sz="2000" dirty="0">
-                <a:latin typeface="Segoe UI Light" panose="020B0502040204020203" pitchFamily="34" charset="0"/>
-                <a:cs typeface="Segoe UI Light" panose="020B0502040204020203" pitchFamily="34" charset="0"/>
-              </a:rPr>
-              <a:t>Selecione o botão </a:t>
-            </a:r>
-            <a:r>
-              <a:rPr lang="pt-BR" sz="2000" dirty="0">
-                <a:solidFill>
-                  <a:srgbClr val="D24726"/>
-                </a:solidFill>
-                <a:latin typeface="Segoe UI Semibold" panose="020B0702040204020203" pitchFamily="34" charset="0"/>
-                <a:cs typeface="Segoe UI Semibold" panose="020B0702040204020203" pitchFamily="34" charset="0"/>
-              </a:rPr>
-              <a:t>Diga-me</a:t>
-            </a:r>
-            <a:r>
-              <a:rPr lang="pt-BR" sz="2000" dirty="0">
-                <a:latin typeface="Segoe UI Light" panose="020B0502040204020203" pitchFamily="34" charset="0"/>
-                <a:cs typeface="Segoe UI Light" panose="020B0502040204020203" pitchFamily="34" charset="0"/>
-              </a:rPr>
-              <a:t>                  e digite o que você deseja saber.</a:t>
-            </a:r>
-            <a:br>
-              <a:rPr lang="pt-BR" sz="2000" dirty="0">
-                <a:latin typeface="Segoe UI Light" panose="020B0502040204020203" pitchFamily="34" charset="0"/>
-                <a:cs typeface="Segoe UI Light" panose="020B0502040204020203" pitchFamily="34" charset="0"/>
-              </a:rPr>
-            </a:br>
-            <a:endParaRPr lang="pt-BR" sz="2000" dirty="0">
-              <a:latin typeface="Segoe UI Light" panose="020B0502040204020203" pitchFamily="34" charset="0"/>
-              <a:cs typeface="Segoe UI Light" panose="020B0502040204020203" pitchFamily="34" charset="0"/>
-            </a:endParaRPr>
-          </a:p>
-          <a:p>
-            <a:pPr marL="0" indent="0" rtl="0">
-              <a:lnSpc>
-                <a:spcPts val="3600"/>
-              </a:lnSpc>
-              <a:spcAft>
-                <a:spcPts val="0"/>
-              </a:spcAft>
-              <a:buNone/>
-            </a:pPr>
-            <a:r>
-              <a:rPr lang="pt-BR" sz="2000" u="sng" dirty="0">
-                <a:latin typeface="Segoe UI Light" panose="020B0502040204020203" pitchFamily="34" charset="0"/>
-                <a:cs typeface="Segoe UI Light" panose="020B0502040204020203" pitchFamily="34" charset="0"/>
-                <a:hlinkClick r:id="rId3" tooltip="Visite o blog da equipe do PowerPoint"/>
-              </a:rPr>
-              <a:t>Visite o blog da equipe do PowerPoint</a:t>
-            </a:r>
-            <a:endParaRPr lang="pt-BR" sz="2000" dirty="0">
-              <a:latin typeface="Segoe UI Light" panose="020B0502040204020203" pitchFamily="34" charset="0"/>
-              <a:cs typeface="Segoe UI Light" panose="020B0502040204020203" pitchFamily="34" charset="0"/>
-            </a:endParaRPr>
-          </a:p>
-          <a:p>
-            <a:pPr marL="0" indent="0" rtl="0">
-              <a:lnSpc>
-                <a:spcPts val="3600"/>
-              </a:lnSpc>
-              <a:spcBef>
-                <a:spcPts val="1500"/>
-              </a:spcBef>
-              <a:spcAft>
-                <a:spcPts val="0"/>
-              </a:spcAft>
-              <a:buNone/>
-            </a:pPr>
-            <a:r>
-              <a:rPr lang="pt-BR" sz="2000" dirty="0">
-                <a:latin typeface="Segoe UI Light" panose="020B0502040204020203" pitchFamily="34" charset="0"/>
-                <a:cs typeface="Segoe UI Light" panose="020B0502040204020203" pitchFamily="34" charset="0"/>
-                <a:hlinkClick r:id="rId4" tooltip="Acesse o treinamento gratuito do PowerPoint"/>
-              </a:rPr>
-              <a:t>Acesse o treinamento gratuito do PowerPoint</a:t>
-            </a:r>
-            <a:endParaRPr lang="pt-BR" sz="2000" dirty="0">
-              <a:latin typeface="Segoe UI Light" panose="020B0502040204020203" pitchFamily="34" charset="0"/>
-              <a:cs typeface="Segoe UI Light" panose="020B0502040204020203" pitchFamily="34" charset="0"/>
-            </a:endParaRPr>
-          </a:p>
-          <a:p>
-            <a:pPr marL="0" indent="0" rtl="0">
-              <a:lnSpc>
-                <a:spcPts val="3600"/>
-              </a:lnSpc>
-              <a:spcAft>
-                <a:spcPts val="0"/>
-              </a:spcAft>
-              <a:buNone/>
-            </a:pPr>
-            <a:endParaRPr lang="pt-BR" sz="2000" dirty="0">
-              <a:latin typeface="Segoe UI Light" panose="020B0502040204020203" pitchFamily="34" charset="0"/>
-              <a:cs typeface="Segoe UI Light" panose="020B0502040204020203" pitchFamily="34" charset="0"/>
-            </a:endParaRPr>
-          </a:p>
-          <a:p>
-            <a:pPr marL="0" indent="0" rtl="0">
-              <a:lnSpc>
-                <a:spcPts val="3600"/>
-              </a:lnSpc>
-              <a:spcAft>
-                <a:spcPts val="0"/>
-              </a:spcAft>
-              <a:buNone/>
-            </a:pPr>
-            <a:endParaRPr lang="pt-BR" sz="2000" dirty="0">
-              <a:latin typeface="Segoe UI Light" panose="020B0502040204020203" pitchFamily="34" charset="0"/>
-              <a:cs typeface="Segoe UI Light" panose="020B0502040204020203" pitchFamily="34" charset="0"/>
-            </a:endParaRPr>
-          </a:p>
-        </p:txBody>
-      </p:sp>
-      <p:pic>
-        <p:nvPicPr>
-          <p:cNvPr id="2" name="Imagem 1" descr="Botão Diga-me"/>
-          <p:cNvPicPr>
-            <a:picLocks noChangeAspect="1"/>
-          </p:cNvPicPr>
-          <p:nvPr/>
-        </p:nvPicPr>
-        <p:blipFill>
-          <a:blip r:embed="rId5"/>
-          <a:srcRect/>
-          <a:stretch/>
-        </p:blipFill>
-        <p:spPr>
-          <a:xfrm>
-            <a:off x="3616853" y="2350333"/>
-            <a:ext cx="1268511" cy="1189747"/>
-          </a:xfrm>
-          <a:prstGeom prst="rect">
-            <a:avLst/>
-          </a:prstGeom>
-        </p:spPr>
-      </p:pic>
-      <p:pic>
-        <p:nvPicPr>
-          <p:cNvPr id="8" name="Imagem 7" descr="Seta apontando para a direita com um hiperlink para o blog da equipe do PowerPoint. Escolha a imagem para visitar o blog da equipe do PowerPoint ">
-            <a:hlinkClick r:id="rId3" tooltip="Selecione aqui para visitar o blog da equipe do PowerPoint."/>
-          </p:cNvPr>
-          <p:cNvPicPr>
-            <a:picLocks noChangeAspect="1"/>
-          </p:cNvPicPr>
-          <p:nvPr/>
-        </p:nvPicPr>
-        <p:blipFill>
-          <a:blip r:embed="rId6" cstate="print">
-            <a:extLst>
-              <a:ext uri="{28A0092B-C50C-407E-A947-70E740481C1C}">
-                <a14:useLocalDpi xmlns:a14="http://schemas.microsoft.com/office/drawing/2010/main" val="0"/>
-              </a:ext>
-            </a:extLst>
-          </a:blip>
-          <a:stretch>
-            <a:fillRect/>
-          </a:stretch>
-        </p:blipFill>
-        <p:spPr>
-          <a:xfrm>
-            <a:off x="5646174" y="3566804"/>
-            <a:ext cx="661940" cy="661940"/>
-          </a:xfrm>
-          <a:prstGeom prst="rect">
-            <a:avLst/>
-          </a:prstGeom>
-        </p:spPr>
-      </p:pic>
-      <p:pic>
-        <p:nvPicPr>
-          <p:cNvPr id="7" name="Imagem 6" descr="Seta apontando para a direita com um hiperlink para o treinamento gratuito do PowerPoint. Selecione a imagem para acessar um treinamento gratuito do PowerPoint">
-            <a:hlinkClick r:id="rId7" action="ppaction://hlinkfile" tooltip="Selecione aqui para ir para o treinamento gratuito do PowerPoint."/>
-          </p:cNvPr>
-          <p:cNvPicPr>
-            <a:picLocks noChangeAspect="1"/>
-          </p:cNvPicPr>
-          <p:nvPr/>
-        </p:nvPicPr>
-        <p:blipFill>
-          <a:blip r:embed="rId6" cstate="print">
-            <a:extLst>
-              <a:ext uri="{28A0092B-C50C-407E-A947-70E740481C1C}">
-                <a14:useLocalDpi xmlns:a14="http://schemas.microsoft.com/office/drawing/2010/main" val="0"/>
-              </a:ext>
-            </a:extLst>
-          </a:blip>
-          <a:stretch>
-            <a:fillRect/>
-          </a:stretch>
-        </p:blipFill>
-        <p:spPr>
-          <a:xfrm>
-            <a:off x="5646174" y="4252716"/>
-            <a:ext cx="661940" cy="661940"/>
-          </a:xfrm>
-          <a:prstGeom prst="rect">
-            <a:avLst/>
-          </a:prstGeom>
-        </p:spPr>
-      </p:pic>
-      <p:sp>
-        <p:nvSpPr>
-          <p:cNvPr id="9" name="Caixa de texto 8"/>
-          <p:cNvSpPr txBox="1"/>
-          <p:nvPr/>
-        </p:nvSpPr>
-        <p:spPr>
-          <a:xfrm>
-            <a:off x="541611" y="5738132"/>
-            <a:ext cx="6193971" cy="307777"/>
-          </a:xfrm>
-          <a:prstGeom prst="rect">
-            <a:avLst/>
-          </a:prstGeom>
-          <a:noFill/>
-        </p:spPr>
-        <p:txBody>
-          <a:bodyPr wrap="square" rtlCol="0">
-            <a:spAutoFit/>
-          </a:bodyPr>
-          <a:lstStyle/>
-          <a:p>
-            <a:pPr algn="l" rtl="0"/>
-            <a:r>
-              <a:rPr lang="pt-BR" sz="1400" dirty="0">
-                <a:latin typeface="Segoe UI Light" panose="020B0502040204020203" pitchFamily="34" charset="0"/>
-                <a:cs typeface="Segoe UI Light" panose="020B0502040204020203" pitchFamily="34" charset="0"/>
-              </a:rPr>
-              <a:t>ESCOLHA A SETA QUANDO ESTIVER NO MODO DE APRESENTAÇÃO DE SLIDES</a:t>
-            </a:r>
-          </a:p>
-        </p:txBody>
-      </p:sp>
-      <p:pic>
-        <p:nvPicPr>
-          <p:cNvPr id="11" name="Imagem 10" descr="Sugestões da caixa Diga-me"/>
-          <p:cNvPicPr>
-            <a:picLocks noChangeAspect="1"/>
-          </p:cNvPicPr>
-          <p:nvPr/>
-        </p:nvPicPr>
-        <p:blipFill>
-          <a:blip r:embed="rId8"/>
-          <a:srcRect/>
-          <a:stretch/>
-        </p:blipFill>
-        <p:spPr>
-          <a:xfrm>
-            <a:off x="8622792" y="2751216"/>
-            <a:ext cx="2476156" cy="1546333"/>
-          </a:xfrm>
-          <a:prstGeom prst="rect">
-            <a:avLst/>
-          </a:prstGeom>
-        </p:spPr>
-      </p:pic>
-    </p:spTree>
-    <p:extLst>
-      <p:ext uri="{BB962C8B-B14F-4D97-AF65-F5344CB8AC3E}">
-        <p14:creationId xmlns:p14="http://schemas.microsoft.com/office/powerpoint/2010/main" val="893025881"/>
-      </p:ext>
-    </p:extLst>
-  </p:cSld>
-  <p:clrMapOvr>
-    <a:masterClrMapping/>
-  </p:clrMapOvr>
-  <mc:AlternateContent xmlns:mc="http://schemas.openxmlformats.org/markup-compatibility/2006" xmlns:p15="http://schemas.microsoft.com/office/powerpoint/2012/main">
-    <mc:Choice Requires="p15">
-      <p:transition xmlns:p14="http://schemas.microsoft.com/office/powerpoint/2010/main" spd="slow" p14:dur="2000">
-        <p15:prstTrans prst="drape"/>
-      </p:transition>
-    </mc:Choice>
-    <mc:Fallback xmlns="">
-      <p:transition xmlns:p14="http://schemas.microsoft.com/office/powerpoint/2010/main" spd="slow">
-        <p:fade/>
-      </p:transition>
     </mc:Fallback>
   </mc:AlternateContent>
 </p:sld>

</xml_diff>

<commit_message>
docs: finalizar ppt HTML5_e_CSS3-parte_2
</commit_message>
<xml_diff>
--- a/Trilhas/[Iniciante em Programação T5 - ONE]/Material/04.HTML5_e_CSS3-parte_2.pptx
+++ b/Trilhas/[Iniciante em Programação T5 - ONE]/Material/04.HTML5_e_CSS3-parte_2.pptx
@@ -5,10 +5,10 @@
     <p:sldMasterId id="2147483660" r:id="rId1"/>
   </p:sldMasterIdLst>
   <p:notesMasterIdLst>
-    <p:notesMasterId r:id="rId9"/>
+    <p:notesMasterId r:id="rId14"/>
   </p:notesMasterIdLst>
   <p:handoutMasterIdLst>
-    <p:handoutMasterId r:id="rId10"/>
+    <p:handoutMasterId r:id="rId15"/>
   </p:handoutMasterIdLst>
   <p:sldIdLst>
     <p:sldId id="256" r:id="rId2"/>
@@ -18,6 +18,11 @@
     <p:sldId id="286" r:id="rId6"/>
     <p:sldId id="287" r:id="rId7"/>
     <p:sldId id="288" r:id="rId8"/>
+    <p:sldId id="289" r:id="rId9"/>
+    <p:sldId id="290" r:id="rId10"/>
+    <p:sldId id="291" r:id="rId11"/>
+    <p:sldId id="292" r:id="rId12"/>
+    <p:sldId id="293" r:id="rId13"/>
   </p:sldIdLst>
   <p:sldSz cx="12192000" cy="6858000"/>
   <p:notesSz cx="6858000" cy="9144000"/>
@@ -128,6 +133,11 @@
             <p14:sldId id="286"/>
             <p14:sldId id="287"/>
             <p14:sldId id="288"/>
+            <p14:sldId id="289"/>
+            <p14:sldId id="290"/>
+            <p14:sldId id="291"/>
+            <p14:sldId id="292"/>
+            <p14:sldId id="293"/>
           </p14:sldIdLst>
         </p14:section>
       </p14:sectionLst>
@@ -243,7 +253,7 @@
             <a:pPr rtl="0"/>
             <a:fld id="{12E8EFE0-5F29-4A8F-882F-2C5E3702D946}" type="datetime1">
               <a:rPr lang="pt-BR" smtClean="0"/>
-              <a:t>07/05/2023</a:t>
+              <a:t>09/05/2023</a:t>
             </a:fld>
             <a:endParaRPr lang="pt-BR"/>
           </a:p>
@@ -413,7 +423,7 @@
             <a:fld id="{25C915AE-A572-46FB-8F05-B028884B90C4}" type="datetime1">
               <a:rPr lang="pt-BR" smtClean="0"/>
               <a:pPr/>
-              <a:t>07/05/2023</a:t>
+              <a:t>09/05/2023</a:t>
             </a:fld>
             <a:endParaRPr lang="pt-BR" dirty="0"/>
           </a:p>
@@ -1213,7 +1223,7 @@
             <a:pPr rtl="0"/>
             <a:fld id="{DFFABA16-A60E-4C58-9DC9-284576B05B35}" type="datetime1">
               <a:rPr lang="pt-BR" noProof="0" smtClean="0"/>
-              <a:t>07/05/2023</a:t>
+              <a:t>09/05/2023</a:t>
             </a:fld>
             <a:endParaRPr lang="pt-BR" noProof="0"/>
           </a:p>
@@ -1839,7 +1849,7 @@
             <a:pPr rtl="0"/>
             <a:fld id="{495CCA5C-24EB-4738-B463-0ADFEF5D3564}" type="datetime1">
               <a:rPr lang="pt-BR" noProof="0" smtClean="0"/>
-              <a:t>07/05/2023</a:t>
+              <a:t>09/05/2023</a:t>
             </a:fld>
             <a:endParaRPr lang="pt-BR" noProof="0" dirty="0"/>
           </a:p>
@@ -2387,6 +2397,2324 @@
 </p:sld>
 </file>
 
+<file path=ppt/slides/slide10.xml><?xml version="1.0" encoding="utf-8"?>
+<p:sld xmlns:a="http://schemas.openxmlformats.org/drawingml/2006/main" xmlns:r="http://schemas.openxmlformats.org/officeDocument/2006/relationships" xmlns:p="http://schemas.openxmlformats.org/presentationml/2006/main">
+  <p:cSld>
+    <p:spTree>
+      <p:nvGrpSpPr>
+        <p:cNvPr id="1" name=""/>
+        <p:cNvGrpSpPr/>
+        <p:nvPr/>
+      </p:nvGrpSpPr>
+      <p:grpSpPr>
+        <a:xfrm>
+          <a:off x="0" y="0"/>
+          <a:ext cx="0" cy="0"/>
+          <a:chOff x="0" y="0"/>
+          <a:chExt cx="0" cy="0"/>
+        </a:xfrm>
+      </p:grpSpPr>
+      <p:sp>
+        <p:nvSpPr>
+          <p:cNvPr id="2" name="Título 1">
+            <a:extLst>
+              <a:ext uri="{FF2B5EF4-FFF2-40B4-BE49-F238E27FC236}">
+                <a16:creationId xmlns:a16="http://schemas.microsoft.com/office/drawing/2014/main" id="{09A54415-3C98-1678-B9A1-4D43BCEED0A8}"/>
+              </a:ext>
+            </a:extLst>
+          </p:cNvPr>
+          <p:cNvSpPr>
+            <a:spLocks noGrp="1"/>
+          </p:cNvSpPr>
+          <p:nvPr>
+            <p:ph type="title"/>
+          </p:nvPr>
+        </p:nvSpPr>
+        <p:spPr/>
+        <p:txBody>
+          <a:bodyPr/>
+          <a:lstStyle/>
+          <a:p>
+            <a:r>
+              <a:rPr lang="pt-BR" dirty="0"/>
+              <a:t>Aprendizado</a:t>
+            </a:r>
+          </a:p>
+        </p:txBody>
+      </p:sp>
+      <p:sp>
+        <p:nvSpPr>
+          <p:cNvPr id="3" name="Espaço Reservado para Conteúdo 2">
+            <a:extLst>
+              <a:ext uri="{FF2B5EF4-FFF2-40B4-BE49-F238E27FC236}">
+                <a16:creationId xmlns:a16="http://schemas.microsoft.com/office/drawing/2014/main" id="{7FC1ACEC-7428-D012-8658-30B4F6078EA8}"/>
+              </a:ext>
+            </a:extLst>
+          </p:cNvPr>
+          <p:cNvSpPr>
+            <a:spLocks noGrp="1"/>
+          </p:cNvSpPr>
+          <p:nvPr>
+            <p:ph sz="quarter" idx="10"/>
+          </p:nvPr>
+        </p:nvSpPr>
+        <p:spPr>
+          <a:xfrm>
+            <a:off x="539496" y="1337284"/>
+            <a:ext cx="2508504" cy="5348554"/>
+          </a:xfrm>
+        </p:spPr>
+        <p:txBody>
+          <a:bodyPr>
+            <a:normAutofit/>
+          </a:bodyPr>
+          <a:lstStyle/>
+          <a:p>
+            <a:r>
+              <a:rPr lang="pt-BR" dirty="0" err="1"/>
+              <a:t>footer</a:t>
+            </a:r>
+            <a:r>
+              <a:rPr lang="pt-BR" dirty="0"/>
+              <a:t> -&gt; É a </a:t>
+            </a:r>
+            <a:r>
+              <a:rPr lang="pt-BR" dirty="0" err="1"/>
+              <a:t>tag</a:t>
+            </a:r>
+            <a:r>
+              <a:rPr lang="pt-BR" dirty="0"/>
+              <a:t> do rodapé </a:t>
+            </a:r>
+          </a:p>
+          <a:p>
+            <a:r>
+              <a:rPr lang="pt-BR" dirty="0"/>
+              <a:t>background: </a:t>
+            </a:r>
+            <a:r>
+              <a:rPr lang="pt-BR" dirty="0" err="1"/>
+              <a:t>url</a:t>
+            </a:r>
+            <a:r>
+              <a:rPr lang="pt-BR" dirty="0"/>
+              <a:t>(bg.jpg); -&gt; Exemplo de como colocar uma imagem de fundo. </a:t>
+            </a:r>
+          </a:p>
+          <a:p>
+            <a:r>
+              <a:rPr lang="pt-BR" dirty="0"/>
+              <a:t>Quando criamos no CSS uma imagem de fundo de qualquer elemento, por padrão, o CSS, ele vai copiando e colando aquela imagem, infinitas vezes, até ocupar todo o espaço do elemento. Então, usamos uma imagem pequena, que tem um tamanho pequeno e o CSS, ele vai replicando, ao invés de usarmos uma imagem gigante e ficar gastando a banda e a internet do usuário.</a:t>
+            </a:r>
+          </a:p>
+        </p:txBody>
+      </p:sp>
+      <p:sp>
+        <p:nvSpPr>
+          <p:cNvPr id="4" name="Espaço Reservado para Conteúdo 2">
+            <a:extLst>
+              <a:ext uri="{FF2B5EF4-FFF2-40B4-BE49-F238E27FC236}">
+                <a16:creationId xmlns:a16="http://schemas.microsoft.com/office/drawing/2014/main" id="{A36E34B5-DCF8-0267-72FC-AE45973ACF9E}"/>
+              </a:ext>
+            </a:extLst>
+          </p:cNvPr>
+          <p:cNvSpPr txBox="1">
+            <a:spLocks/>
+          </p:cNvSpPr>
+          <p:nvPr/>
+        </p:nvSpPr>
+        <p:spPr>
+          <a:xfrm>
+            <a:off x="6144074" y="1307885"/>
+            <a:ext cx="2508504" cy="5348554"/>
+          </a:xfrm>
+          <a:prstGeom prst="rect">
+            <a:avLst/>
+          </a:prstGeom>
+        </p:spPr>
+        <p:txBody>
+          <a:bodyPr vert="horz" lIns="91440" tIns="45720" rIns="91440" bIns="45720" rtlCol="0">
+            <a:noAutofit/>
+          </a:bodyPr>
+          <a:lstStyle>
+            <a:lvl1pPr marL="0" indent="0" algn="l" defTabSz="914400" rtl="0" eaLnBrk="1" latinLnBrk="0" hangingPunct="1">
+              <a:lnSpc>
+                <a:spcPct val="150000"/>
+              </a:lnSpc>
+              <a:spcBef>
+                <a:spcPts val="1000"/>
+              </a:spcBef>
+              <a:spcAft>
+                <a:spcPts val="1200"/>
+              </a:spcAft>
+              <a:buFontTx/>
+              <a:buNone/>
+              <a:defRPr lang="en-US" sz="1200" kern="1200" smtClean="0">
+                <a:solidFill>
+                  <a:schemeClr val="tx1">
+                    <a:lumMod val="75000"/>
+                    <a:lumOff val="25000"/>
+                  </a:schemeClr>
+                </a:solidFill>
+                <a:latin typeface="+mn-lt"/>
+                <a:ea typeface="+mn-ea"/>
+                <a:cs typeface="+mn-cs"/>
+              </a:defRPr>
+            </a:lvl1pPr>
+            <a:lvl2pPr marL="228600" indent="-228600" algn="l" defTabSz="914400" rtl="0" eaLnBrk="1" latinLnBrk="0" hangingPunct="1">
+              <a:lnSpc>
+                <a:spcPct val="150000"/>
+              </a:lnSpc>
+              <a:spcBef>
+                <a:spcPts val="1000"/>
+              </a:spcBef>
+              <a:spcAft>
+                <a:spcPts val="1200"/>
+              </a:spcAft>
+              <a:buFont typeface="Arial" panose="020B0604020202020204" pitchFamily="34" charset="0"/>
+              <a:buChar char="•"/>
+              <a:defRPr lang="en-US" sz="1200" kern="1200" smtClean="0">
+                <a:solidFill>
+                  <a:schemeClr val="tx1">
+                    <a:lumMod val="75000"/>
+                    <a:lumOff val="25000"/>
+                  </a:schemeClr>
+                </a:solidFill>
+                <a:latin typeface="+mn-lt"/>
+                <a:ea typeface="+mn-ea"/>
+                <a:cs typeface="+mn-cs"/>
+              </a:defRPr>
+            </a:lvl2pPr>
+            <a:lvl3pPr marL="685800" indent="-228600" algn="l" defTabSz="914400" rtl="0" eaLnBrk="1" latinLnBrk="0" hangingPunct="1">
+              <a:lnSpc>
+                <a:spcPct val="150000"/>
+              </a:lnSpc>
+              <a:spcBef>
+                <a:spcPts val="1000"/>
+              </a:spcBef>
+              <a:spcAft>
+                <a:spcPts val="1200"/>
+              </a:spcAft>
+              <a:buFont typeface="Arial" panose="020B0604020202020204" pitchFamily="34" charset="0"/>
+              <a:buChar char="•"/>
+              <a:defRPr lang="en-US" sz="1200" kern="1200" smtClean="0">
+                <a:solidFill>
+                  <a:schemeClr val="tx1">
+                    <a:lumMod val="75000"/>
+                    <a:lumOff val="25000"/>
+                  </a:schemeClr>
+                </a:solidFill>
+                <a:latin typeface="+mn-lt"/>
+                <a:ea typeface="+mn-ea"/>
+                <a:cs typeface="+mn-cs"/>
+              </a:defRPr>
+            </a:lvl3pPr>
+            <a:lvl4pPr marL="1143000" indent="-228600" algn="l" defTabSz="914400" rtl="0" eaLnBrk="1" latinLnBrk="0" hangingPunct="1">
+              <a:lnSpc>
+                <a:spcPct val="150000"/>
+              </a:lnSpc>
+              <a:spcBef>
+                <a:spcPts val="1000"/>
+              </a:spcBef>
+              <a:spcAft>
+                <a:spcPts val="1200"/>
+              </a:spcAft>
+              <a:buFont typeface="Arial" panose="020B0604020202020204" pitchFamily="34" charset="0"/>
+              <a:buChar char="•"/>
+              <a:defRPr lang="en-US" sz="1200" kern="1200" smtClean="0">
+                <a:solidFill>
+                  <a:schemeClr val="tx1">
+                    <a:lumMod val="75000"/>
+                    <a:lumOff val="25000"/>
+                  </a:schemeClr>
+                </a:solidFill>
+                <a:latin typeface="+mn-lt"/>
+                <a:ea typeface="+mn-ea"/>
+                <a:cs typeface="+mn-cs"/>
+              </a:defRPr>
+            </a:lvl4pPr>
+            <a:lvl5pPr marL="1600200" indent="-228600" algn="l" defTabSz="914400" rtl="0" eaLnBrk="1" latinLnBrk="0" hangingPunct="1">
+              <a:lnSpc>
+                <a:spcPct val="150000"/>
+              </a:lnSpc>
+              <a:spcBef>
+                <a:spcPts val="1000"/>
+              </a:spcBef>
+              <a:spcAft>
+                <a:spcPts val="1200"/>
+              </a:spcAft>
+              <a:buFont typeface="Arial" panose="020B0604020202020204" pitchFamily="34" charset="0"/>
+              <a:buChar char="•"/>
+              <a:defRPr lang="en-US" sz="1200" kern="1200">
+                <a:solidFill>
+                  <a:schemeClr val="tx1">
+                    <a:lumMod val="75000"/>
+                    <a:lumOff val="25000"/>
+                  </a:schemeClr>
+                </a:solidFill>
+                <a:latin typeface="+mn-lt"/>
+                <a:ea typeface="+mn-ea"/>
+                <a:cs typeface="+mn-cs"/>
+              </a:defRPr>
+            </a:lvl5pPr>
+            <a:lvl6pPr marL="2057400" indent="-228600" algn="l" defTabSz="914400" rtl="0" eaLnBrk="1" latinLnBrk="0" hangingPunct="1">
+              <a:lnSpc>
+                <a:spcPct val="150000"/>
+              </a:lnSpc>
+              <a:spcBef>
+                <a:spcPts val="1000"/>
+              </a:spcBef>
+              <a:spcAft>
+                <a:spcPts val="1200"/>
+              </a:spcAft>
+              <a:buFont typeface="Arial" panose="020B0604020202020204" pitchFamily="34" charset="0"/>
+              <a:buChar char="•"/>
+              <a:defRPr lang="en-US" sz="1200" kern="1200" dirty="0" smtClean="0">
+                <a:solidFill>
+                  <a:schemeClr val="tx1"/>
+                </a:solidFill>
+                <a:latin typeface="+mn-lt"/>
+                <a:ea typeface="+mn-ea"/>
+                <a:cs typeface="+mn-cs"/>
+              </a:defRPr>
+            </a:lvl6pPr>
+            <a:lvl7pPr marL="2514600" indent="-228600" algn="l" defTabSz="914400" rtl="0" eaLnBrk="1" latinLnBrk="0" hangingPunct="1">
+              <a:lnSpc>
+                <a:spcPct val="150000"/>
+              </a:lnSpc>
+              <a:spcBef>
+                <a:spcPts val="1000"/>
+              </a:spcBef>
+              <a:spcAft>
+                <a:spcPts val="1200"/>
+              </a:spcAft>
+              <a:buFont typeface="Arial" panose="020B0604020202020204" pitchFamily="34" charset="0"/>
+              <a:buChar char="•"/>
+              <a:defRPr lang="en-US" sz="1200" kern="1200" dirty="0" smtClean="0">
+                <a:solidFill>
+                  <a:schemeClr val="tx1"/>
+                </a:solidFill>
+                <a:latin typeface="+mn-lt"/>
+                <a:ea typeface="+mn-ea"/>
+                <a:cs typeface="+mn-cs"/>
+              </a:defRPr>
+            </a:lvl7pPr>
+            <a:lvl8pPr marL="2971800" indent="-228600" algn="l" defTabSz="914400" rtl="0" eaLnBrk="1" latinLnBrk="0" hangingPunct="1">
+              <a:lnSpc>
+                <a:spcPct val="150000"/>
+              </a:lnSpc>
+              <a:spcBef>
+                <a:spcPts val="1000"/>
+              </a:spcBef>
+              <a:spcAft>
+                <a:spcPts val="1200"/>
+              </a:spcAft>
+              <a:buFont typeface="Arial" panose="020B0604020202020204" pitchFamily="34" charset="0"/>
+              <a:buChar char="•"/>
+              <a:defRPr lang="en-US" sz="1200" kern="1200" dirty="0" smtClean="0">
+                <a:solidFill>
+                  <a:schemeClr val="tx1"/>
+                </a:solidFill>
+                <a:latin typeface="+mn-lt"/>
+                <a:ea typeface="+mn-ea"/>
+                <a:cs typeface="+mn-cs"/>
+              </a:defRPr>
+            </a:lvl8pPr>
+            <a:lvl9pPr marL="3429000" indent="-228600" algn="l" defTabSz="914400" rtl="0" eaLnBrk="1" latinLnBrk="0" hangingPunct="1">
+              <a:lnSpc>
+                <a:spcPct val="90000"/>
+              </a:lnSpc>
+              <a:spcBef>
+                <a:spcPct val="30000"/>
+              </a:spcBef>
+              <a:buFont typeface="Arial" panose="020B0604020202020204" pitchFamily="34" charset="0"/>
+              <a:buNone/>
+              <a:defRPr sz="1200" kern="1200">
+                <a:solidFill>
+                  <a:schemeClr val="tx1"/>
+                </a:solidFill>
+                <a:latin typeface="+mn-lt"/>
+                <a:ea typeface="+mn-ea"/>
+                <a:cs typeface="+mn-cs"/>
+              </a:defRPr>
+            </a:lvl9pPr>
+          </a:lstStyle>
+          <a:p>
+            <a:r>
+              <a:rPr lang="pt-BR" dirty="0"/>
+              <a:t>O símbolo de Copyright, sinal de direitos autorais tem algumas configurações. </a:t>
+            </a:r>
+          </a:p>
+          <a:p>
+            <a:r>
+              <a:rPr lang="pt-BR" dirty="0"/>
+              <a:t>- Número específico: U+00A9</a:t>
+            </a:r>
+            <a:br>
+              <a:rPr lang="pt-BR" dirty="0"/>
+            </a:br>
+            <a:r>
+              <a:rPr lang="pt-BR" dirty="0"/>
+              <a:t>- Código HTML: &amp;#169; </a:t>
+            </a:r>
+            <a:br>
+              <a:rPr lang="pt-BR" dirty="0"/>
+            </a:br>
+            <a:r>
+              <a:rPr lang="pt-BR" dirty="0"/>
+              <a:t>-  Entidade: &amp;</a:t>
+            </a:r>
+            <a:r>
+              <a:rPr lang="pt-BR" dirty="0" err="1"/>
+              <a:t>copy</a:t>
+            </a:r>
+            <a:r>
+              <a:rPr lang="pt-BR" dirty="0"/>
+              <a:t>;</a:t>
+            </a:r>
+          </a:p>
+          <a:p>
+            <a:r>
+              <a:rPr lang="pt-BR" dirty="0"/>
+              <a:t>O navegador lê todas essas formas e algumas linguagens de programação, leem algum tipo de representação do </a:t>
+            </a:r>
+            <a:r>
+              <a:rPr lang="pt-BR" dirty="0" err="1"/>
+              <a:t>unicode</a:t>
+            </a:r>
+            <a:r>
+              <a:rPr lang="pt-BR" dirty="0"/>
+              <a:t>. </a:t>
+            </a:r>
+          </a:p>
+          <a:p>
+            <a:r>
+              <a:rPr lang="pt-BR" dirty="0"/>
+              <a:t>A padrão é a forma de entidade, “©”.</a:t>
+            </a:r>
+          </a:p>
+        </p:txBody>
+      </p:sp>
+      <p:sp>
+        <p:nvSpPr>
+          <p:cNvPr id="5" name="Espaço Reservado para Conteúdo 2">
+            <a:extLst>
+              <a:ext uri="{FF2B5EF4-FFF2-40B4-BE49-F238E27FC236}">
+                <a16:creationId xmlns:a16="http://schemas.microsoft.com/office/drawing/2014/main" id="{FEDDF6FF-5FB0-A664-CEB5-2725566E0D34}"/>
+              </a:ext>
+            </a:extLst>
+          </p:cNvPr>
+          <p:cNvSpPr txBox="1">
+            <a:spLocks/>
+          </p:cNvSpPr>
+          <p:nvPr/>
+        </p:nvSpPr>
+        <p:spPr>
+          <a:xfrm>
+            <a:off x="3341785" y="1337284"/>
+            <a:ext cx="2508504" cy="5348554"/>
+          </a:xfrm>
+          <a:prstGeom prst="rect">
+            <a:avLst/>
+          </a:prstGeom>
+        </p:spPr>
+        <p:txBody>
+          <a:bodyPr vert="horz" lIns="91440" tIns="45720" rIns="91440" bIns="45720" rtlCol="0">
+            <a:normAutofit/>
+          </a:bodyPr>
+          <a:lstStyle>
+            <a:lvl1pPr marL="0" indent="0" algn="l" defTabSz="914400" rtl="0" eaLnBrk="1" latinLnBrk="0" hangingPunct="1">
+              <a:lnSpc>
+                <a:spcPct val="150000"/>
+              </a:lnSpc>
+              <a:spcBef>
+                <a:spcPts val="1000"/>
+              </a:spcBef>
+              <a:spcAft>
+                <a:spcPts val="1200"/>
+              </a:spcAft>
+              <a:buFontTx/>
+              <a:buNone/>
+              <a:defRPr lang="en-US" sz="1200" kern="1200" smtClean="0">
+                <a:solidFill>
+                  <a:schemeClr val="tx1">
+                    <a:lumMod val="75000"/>
+                    <a:lumOff val="25000"/>
+                  </a:schemeClr>
+                </a:solidFill>
+                <a:latin typeface="+mn-lt"/>
+                <a:ea typeface="+mn-ea"/>
+                <a:cs typeface="+mn-cs"/>
+              </a:defRPr>
+            </a:lvl1pPr>
+            <a:lvl2pPr marL="228600" indent="-228600" algn="l" defTabSz="914400" rtl="0" eaLnBrk="1" latinLnBrk="0" hangingPunct="1">
+              <a:lnSpc>
+                <a:spcPct val="150000"/>
+              </a:lnSpc>
+              <a:spcBef>
+                <a:spcPts val="1000"/>
+              </a:spcBef>
+              <a:spcAft>
+                <a:spcPts val="1200"/>
+              </a:spcAft>
+              <a:buFont typeface="Arial" panose="020B0604020202020204" pitchFamily="34" charset="0"/>
+              <a:buChar char="•"/>
+              <a:defRPr lang="en-US" sz="1200" kern="1200" smtClean="0">
+                <a:solidFill>
+                  <a:schemeClr val="tx1">
+                    <a:lumMod val="75000"/>
+                    <a:lumOff val="25000"/>
+                  </a:schemeClr>
+                </a:solidFill>
+                <a:latin typeface="+mn-lt"/>
+                <a:ea typeface="+mn-ea"/>
+                <a:cs typeface="+mn-cs"/>
+              </a:defRPr>
+            </a:lvl2pPr>
+            <a:lvl3pPr marL="685800" indent="-228600" algn="l" defTabSz="914400" rtl="0" eaLnBrk="1" latinLnBrk="0" hangingPunct="1">
+              <a:lnSpc>
+                <a:spcPct val="150000"/>
+              </a:lnSpc>
+              <a:spcBef>
+                <a:spcPts val="1000"/>
+              </a:spcBef>
+              <a:spcAft>
+                <a:spcPts val="1200"/>
+              </a:spcAft>
+              <a:buFont typeface="Arial" panose="020B0604020202020204" pitchFamily="34" charset="0"/>
+              <a:buChar char="•"/>
+              <a:defRPr lang="en-US" sz="1200" kern="1200" smtClean="0">
+                <a:solidFill>
+                  <a:schemeClr val="tx1">
+                    <a:lumMod val="75000"/>
+                    <a:lumOff val="25000"/>
+                  </a:schemeClr>
+                </a:solidFill>
+                <a:latin typeface="+mn-lt"/>
+                <a:ea typeface="+mn-ea"/>
+                <a:cs typeface="+mn-cs"/>
+              </a:defRPr>
+            </a:lvl3pPr>
+            <a:lvl4pPr marL="1143000" indent="-228600" algn="l" defTabSz="914400" rtl="0" eaLnBrk="1" latinLnBrk="0" hangingPunct="1">
+              <a:lnSpc>
+                <a:spcPct val="150000"/>
+              </a:lnSpc>
+              <a:spcBef>
+                <a:spcPts val="1000"/>
+              </a:spcBef>
+              <a:spcAft>
+                <a:spcPts val="1200"/>
+              </a:spcAft>
+              <a:buFont typeface="Arial" panose="020B0604020202020204" pitchFamily="34" charset="0"/>
+              <a:buChar char="•"/>
+              <a:defRPr lang="en-US" sz="1200" kern="1200" smtClean="0">
+                <a:solidFill>
+                  <a:schemeClr val="tx1">
+                    <a:lumMod val="75000"/>
+                    <a:lumOff val="25000"/>
+                  </a:schemeClr>
+                </a:solidFill>
+                <a:latin typeface="+mn-lt"/>
+                <a:ea typeface="+mn-ea"/>
+                <a:cs typeface="+mn-cs"/>
+              </a:defRPr>
+            </a:lvl4pPr>
+            <a:lvl5pPr marL="1600200" indent="-228600" algn="l" defTabSz="914400" rtl="0" eaLnBrk="1" latinLnBrk="0" hangingPunct="1">
+              <a:lnSpc>
+                <a:spcPct val="150000"/>
+              </a:lnSpc>
+              <a:spcBef>
+                <a:spcPts val="1000"/>
+              </a:spcBef>
+              <a:spcAft>
+                <a:spcPts val="1200"/>
+              </a:spcAft>
+              <a:buFont typeface="Arial" panose="020B0604020202020204" pitchFamily="34" charset="0"/>
+              <a:buChar char="•"/>
+              <a:defRPr lang="en-US" sz="1200" kern="1200">
+                <a:solidFill>
+                  <a:schemeClr val="tx1">
+                    <a:lumMod val="75000"/>
+                    <a:lumOff val="25000"/>
+                  </a:schemeClr>
+                </a:solidFill>
+                <a:latin typeface="+mn-lt"/>
+                <a:ea typeface="+mn-ea"/>
+                <a:cs typeface="+mn-cs"/>
+              </a:defRPr>
+            </a:lvl5pPr>
+            <a:lvl6pPr marL="2057400" indent="-228600" algn="l" defTabSz="914400" rtl="0" eaLnBrk="1" latinLnBrk="0" hangingPunct="1">
+              <a:lnSpc>
+                <a:spcPct val="150000"/>
+              </a:lnSpc>
+              <a:spcBef>
+                <a:spcPts val="1000"/>
+              </a:spcBef>
+              <a:spcAft>
+                <a:spcPts val="1200"/>
+              </a:spcAft>
+              <a:buFont typeface="Arial" panose="020B0604020202020204" pitchFamily="34" charset="0"/>
+              <a:buChar char="•"/>
+              <a:defRPr lang="en-US" sz="1200" kern="1200" dirty="0" smtClean="0">
+                <a:solidFill>
+                  <a:schemeClr val="tx1"/>
+                </a:solidFill>
+                <a:latin typeface="+mn-lt"/>
+                <a:ea typeface="+mn-ea"/>
+                <a:cs typeface="+mn-cs"/>
+              </a:defRPr>
+            </a:lvl6pPr>
+            <a:lvl7pPr marL="2514600" indent="-228600" algn="l" defTabSz="914400" rtl="0" eaLnBrk="1" latinLnBrk="0" hangingPunct="1">
+              <a:lnSpc>
+                <a:spcPct val="150000"/>
+              </a:lnSpc>
+              <a:spcBef>
+                <a:spcPts val="1000"/>
+              </a:spcBef>
+              <a:spcAft>
+                <a:spcPts val="1200"/>
+              </a:spcAft>
+              <a:buFont typeface="Arial" panose="020B0604020202020204" pitchFamily="34" charset="0"/>
+              <a:buChar char="•"/>
+              <a:defRPr lang="en-US" sz="1200" kern="1200" dirty="0" smtClean="0">
+                <a:solidFill>
+                  <a:schemeClr val="tx1"/>
+                </a:solidFill>
+                <a:latin typeface="+mn-lt"/>
+                <a:ea typeface="+mn-ea"/>
+                <a:cs typeface="+mn-cs"/>
+              </a:defRPr>
+            </a:lvl7pPr>
+            <a:lvl8pPr marL="2971800" indent="-228600" algn="l" defTabSz="914400" rtl="0" eaLnBrk="1" latinLnBrk="0" hangingPunct="1">
+              <a:lnSpc>
+                <a:spcPct val="150000"/>
+              </a:lnSpc>
+              <a:spcBef>
+                <a:spcPts val="1000"/>
+              </a:spcBef>
+              <a:spcAft>
+                <a:spcPts val="1200"/>
+              </a:spcAft>
+              <a:buFont typeface="Arial" panose="020B0604020202020204" pitchFamily="34" charset="0"/>
+              <a:buChar char="•"/>
+              <a:defRPr lang="en-US" sz="1200" kern="1200" dirty="0" smtClean="0">
+                <a:solidFill>
+                  <a:schemeClr val="tx1"/>
+                </a:solidFill>
+                <a:latin typeface="+mn-lt"/>
+                <a:ea typeface="+mn-ea"/>
+                <a:cs typeface="+mn-cs"/>
+              </a:defRPr>
+            </a:lvl8pPr>
+            <a:lvl9pPr marL="3429000" indent="-228600" algn="l" defTabSz="914400" rtl="0" eaLnBrk="1" latinLnBrk="0" hangingPunct="1">
+              <a:lnSpc>
+                <a:spcPct val="90000"/>
+              </a:lnSpc>
+              <a:spcBef>
+                <a:spcPct val="30000"/>
+              </a:spcBef>
+              <a:buFont typeface="Arial" panose="020B0604020202020204" pitchFamily="34" charset="0"/>
+              <a:buNone/>
+              <a:defRPr sz="1200" kern="1200">
+                <a:solidFill>
+                  <a:schemeClr val="tx1"/>
+                </a:solidFill>
+                <a:latin typeface="+mn-lt"/>
+                <a:ea typeface="+mn-ea"/>
+                <a:cs typeface="+mn-cs"/>
+              </a:defRPr>
+            </a:lvl9pPr>
+          </a:lstStyle>
+          <a:p>
+            <a:r>
+              <a:rPr lang="pt-BR" dirty="0"/>
+              <a:t>copyright: Termo registrado e serve para dizer que o conteúdo do nosso site não pode ser copiado, a gente usa aquele símbolo que é um “C” com uma bolinha em volta, parecido com um @, mas com um “C” no meio.</a:t>
+            </a:r>
+          </a:p>
+          <a:p>
+            <a:r>
+              <a:rPr lang="pt-BR" dirty="0"/>
+              <a:t>Linguagem Unicode: Linguagem que tem vários itens específicos, vários caracteres diferentes. Linguagem universal, que serve para representarmos alguns símbolos</a:t>
+            </a:r>
+          </a:p>
+          <a:p>
+            <a:r>
+              <a:rPr lang="pt-BR" dirty="0"/>
+              <a:t>SITE: unicode-table.com</a:t>
+            </a:r>
+          </a:p>
+        </p:txBody>
+      </p:sp>
+      <p:sp>
+        <p:nvSpPr>
+          <p:cNvPr id="6" name="Espaço Reservado para Conteúdo 2">
+            <a:extLst>
+              <a:ext uri="{FF2B5EF4-FFF2-40B4-BE49-F238E27FC236}">
+                <a16:creationId xmlns:a16="http://schemas.microsoft.com/office/drawing/2014/main" id="{2999A4A8-4AB8-36DF-9531-7EF510BFC412}"/>
+              </a:ext>
+            </a:extLst>
+          </p:cNvPr>
+          <p:cNvSpPr txBox="1">
+            <a:spLocks/>
+          </p:cNvSpPr>
+          <p:nvPr/>
+        </p:nvSpPr>
+        <p:spPr>
+          <a:xfrm>
+            <a:off x="8946363" y="1337283"/>
+            <a:ext cx="2508504" cy="5348554"/>
+          </a:xfrm>
+          <a:prstGeom prst="rect">
+            <a:avLst/>
+          </a:prstGeom>
+        </p:spPr>
+        <p:txBody>
+          <a:bodyPr vert="horz" lIns="91440" tIns="45720" rIns="91440" bIns="45720" rtlCol="0">
+            <a:normAutofit/>
+          </a:bodyPr>
+          <a:lstStyle>
+            <a:lvl1pPr marL="0" indent="0" algn="l" defTabSz="914400" rtl="0" eaLnBrk="1" latinLnBrk="0" hangingPunct="1">
+              <a:lnSpc>
+                <a:spcPct val="150000"/>
+              </a:lnSpc>
+              <a:spcBef>
+                <a:spcPts val="1000"/>
+              </a:spcBef>
+              <a:spcAft>
+                <a:spcPts val="1200"/>
+              </a:spcAft>
+              <a:buFontTx/>
+              <a:buNone/>
+              <a:defRPr lang="en-US" sz="1200" kern="1200" smtClean="0">
+                <a:solidFill>
+                  <a:schemeClr val="tx1">
+                    <a:lumMod val="75000"/>
+                    <a:lumOff val="25000"/>
+                  </a:schemeClr>
+                </a:solidFill>
+                <a:latin typeface="+mn-lt"/>
+                <a:ea typeface="+mn-ea"/>
+                <a:cs typeface="+mn-cs"/>
+              </a:defRPr>
+            </a:lvl1pPr>
+            <a:lvl2pPr marL="228600" indent="-228600" algn="l" defTabSz="914400" rtl="0" eaLnBrk="1" latinLnBrk="0" hangingPunct="1">
+              <a:lnSpc>
+                <a:spcPct val="150000"/>
+              </a:lnSpc>
+              <a:spcBef>
+                <a:spcPts val="1000"/>
+              </a:spcBef>
+              <a:spcAft>
+                <a:spcPts val="1200"/>
+              </a:spcAft>
+              <a:buFont typeface="Arial" panose="020B0604020202020204" pitchFamily="34" charset="0"/>
+              <a:buChar char="•"/>
+              <a:defRPr lang="en-US" sz="1200" kern="1200" smtClean="0">
+                <a:solidFill>
+                  <a:schemeClr val="tx1">
+                    <a:lumMod val="75000"/>
+                    <a:lumOff val="25000"/>
+                  </a:schemeClr>
+                </a:solidFill>
+                <a:latin typeface="+mn-lt"/>
+                <a:ea typeface="+mn-ea"/>
+                <a:cs typeface="+mn-cs"/>
+              </a:defRPr>
+            </a:lvl2pPr>
+            <a:lvl3pPr marL="685800" indent="-228600" algn="l" defTabSz="914400" rtl="0" eaLnBrk="1" latinLnBrk="0" hangingPunct="1">
+              <a:lnSpc>
+                <a:spcPct val="150000"/>
+              </a:lnSpc>
+              <a:spcBef>
+                <a:spcPts val="1000"/>
+              </a:spcBef>
+              <a:spcAft>
+                <a:spcPts val="1200"/>
+              </a:spcAft>
+              <a:buFont typeface="Arial" panose="020B0604020202020204" pitchFamily="34" charset="0"/>
+              <a:buChar char="•"/>
+              <a:defRPr lang="en-US" sz="1200" kern="1200" smtClean="0">
+                <a:solidFill>
+                  <a:schemeClr val="tx1">
+                    <a:lumMod val="75000"/>
+                    <a:lumOff val="25000"/>
+                  </a:schemeClr>
+                </a:solidFill>
+                <a:latin typeface="+mn-lt"/>
+                <a:ea typeface="+mn-ea"/>
+                <a:cs typeface="+mn-cs"/>
+              </a:defRPr>
+            </a:lvl3pPr>
+            <a:lvl4pPr marL="1143000" indent="-228600" algn="l" defTabSz="914400" rtl="0" eaLnBrk="1" latinLnBrk="0" hangingPunct="1">
+              <a:lnSpc>
+                <a:spcPct val="150000"/>
+              </a:lnSpc>
+              <a:spcBef>
+                <a:spcPts val="1000"/>
+              </a:spcBef>
+              <a:spcAft>
+                <a:spcPts val="1200"/>
+              </a:spcAft>
+              <a:buFont typeface="Arial" panose="020B0604020202020204" pitchFamily="34" charset="0"/>
+              <a:buChar char="•"/>
+              <a:defRPr lang="en-US" sz="1200" kern="1200" smtClean="0">
+                <a:solidFill>
+                  <a:schemeClr val="tx1">
+                    <a:lumMod val="75000"/>
+                    <a:lumOff val="25000"/>
+                  </a:schemeClr>
+                </a:solidFill>
+                <a:latin typeface="+mn-lt"/>
+                <a:ea typeface="+mn-ea"/>
+                <a:cs typeface="+mn-cs"/>
+              </a:defRPr>
+            </a:lvl4pPr>
+            <a:lvl5pPr marL="1600200" indent="-228600" algn="l" defTabSz="914400" rtl="0" eaLnBrk="1" latinLnBrk="0" hangingPunct="1">
+              <a:lnSpc>
+                <a:spcPct val="150000"/>
+              </a:lnSpc>
+              <a:spcBef>
+                <a:spcPts val="1000"/>
+              </a:spcBef>
+              <a:spcAft>
+                <a:spcPts val="1200"/>
+              </a:spcAft>
+              <a:buFont typeface="Arial" panose="020B0604020202020204" pitchFamily="34" charset="0"/>
+              <a:buChar char="•"/>
+              <a:defRPr lang="en-US" sz="1200" kern="1200">
+                <a:solidFill>
+                  <a:schemeClr val="tx1">
+                    <a:lumMod val="75000"/>
+                    <a:lumOff val="25000"/>
+                  </a:schemeClr>
+                </a:solidFill>
+                <a:latin typeface="+mn-lt"/>
+                <a:ea typeface="+mn-ea"/>
+                <a:cs typeface="+mn-cs"/>
+              </a:defRPr>
+            </a:lvl5pPr>
+            <a:lvl6pPr marL="2057400" indent="-228600" algn="l" defTabSz="914400" rtl="0" eaLnBrk="1" latinLnBrk="0" hangingPunct="1">
+              <a:lnSpc>
+                <a:spcPct val="150000"/>
+              </a:lnSpc>
+              <a:spcBef>
+                <a:spcPts val="1000"/>
+              </a:spcBef>
+              <a:spcAft>
+                <a:spcPts val="1200"/>
+              </a:spcAft>
+              <a:buFont typeface="Arial" panose="020B0604020202020204" pitchFamily="34" charset="0"/>
+              <a:buChar char="•"/>
+              <a:defRPr lang="en-US" sz="1200" kern="1200" dirty="0" smtClean="0">
+                <a:solidFill>
+                  <a:schemeClr val="tx1"/>
+                </a:solidFill>
+                <a:latin typeface="+mn-lt"/>
+                <a:ea typeface="+mn-ea"/>
+                <a:cs typeface="+mn-cs"/>
+              </a:defRPr>
+            </a:lvl6pPr>
+            <a:lvl7pPr marL="2514600" indent="-228600" algn="l" defTabSz="914400" rtl="0" eaLnBrk="1" latinLnBrk="0" hangingPunct="1">
+              <a:lnSpc>
+                <a:spcPct val="150000"/>
+              </a:lnSpc>
+              <a:spcBef>
+                <a:spcPts val="1000"/>
+              </a:spcBef>
+              <a:spcAft>
+                <a:spcPts val="1200"/>
+              </a:spcAft>
+              <a:buFont typeface="Arial" panose="020B0604020202020204" pitchFamily="34" charset="0"/>
+              <a:buChar char="•"/>
+              <a:defRPr lang="en-US" sz="1200" kern="1200" dirty="0" smtClean="0">
+                <a:solidFill>
+                  <a:schemeClr val="tx1"/>
+                </a:solidFill>
+                <a:latin typeface="+mn-lt"/>
+                <a:ea typeface="+mn-ea"/>
+                <a:cs typeface="+mn-cs"/>
+              </a:defRPr>
+            </a:lvl7pPr>
+            <a:lvl8pPr marL="2971800" indent="-228600" algn="l" defTabSz="914400" rtl="0" eaLnBrk="1" latinLnBrk="0" hangingPunct="1">
+              <a:lnSpc>
+                <a:spcPct val="150000"/>
+              </a:lnSpc>
+              <a:spcBef>
+                <a:spcPts val="1000"/>
+              </a:spcBef>
+              <a:spcAft>
+                <a:spcPts val="1200"/>
+              </a:spcAft>
+              <a:buFont typeface="Arial" panose="020B0604020202020204" pitchFamily="34" charset="0"/>
+              <a:buChar char="•"/>
+              <a:defRPr lang="en-US" sz="1200" kern="1200" dirty="0" smtClean="0">
+                <a:solidFill>
+                  <a:schemeClr val="tx1"/>
+                </a:solidFill>
+                <a:latin typeface="+mn-lt"/>
+                <a:ea typeface="+mn-ea"/>
+                <a:cs typeface="+mn-cs"/>
+              </a:defRPr>
+            </a:lvl8pPr>
+            <a:lvl9pPr marL="3429000" indent="-228600" algn="l" defTabSz="914400" rtl="0" eaLnBrk="1" latinLnBrk="0" hangingPunct="1">
+              <a:lnSpc>
+                <a:spcPct val="90000"/>
+              </a:lnSpc>
+              <a:spcBef>
+                <a:spcPct val="30000"/>
+              </a:spcBef>
+              <a:buFont typeface="Arial" panose="020B0604020202020204" pitchFamily="34" charset="0"/>
+              <a:buNone/>
+              <a:defRPr sz="1200" kern="1200">
+                <a:solidFill>
+                  <a:schemeClr val="tx1"/>
+                </a:solidFill>
+                <a:latin typeface="+mn-lt"/>
+                <a:ea typeface="+mn-ea"/>
+                <a:cs typeface="+mn-cs"/>
+              </a:defRPr>
+            </a:lvl9pPr>
+          </a:lstStyle>
+          <a:p>
+            <a:r>
+              <a:rPr lang="pt-BR" dirty="0"/>
+              <a:t>Podemos usar esses símbolos para muita coisa, existe muito conteúdo, inclusive, todos os emojis usamos no celular são um tipo de código </a:t>
+            </a:r>
+            <a:r>
+              <a:rPr lang="pt-BR" dirty="0" err="1"/>
+              <a:t>unicode</a:t>
+            </a:r>
+            <a:r>
+              <a:rPr lang="pt-BR" dirty="0"/>
+              <a:t>, eles funcionam em quase todos os dispositivos, usando o mesmo caractere, usando a mesma codificação. </a:t>
+            </a:r>
+          </a:p>
+          <a:p>
+            <a:r>
+              <a:rPr lang="pt-BR" dirty="0"/>
+              <a:t>Alguns celulares ou alguns sistemas operacionais tem uma exibição diferente do que é o sorrisinho, mas o sorrisinho, o </a:t>
+            </a:r>
+            <a:r>
+              <a:rPr lang="pt-BR" dirty="0" err="1"/>
+              <a:t>smile</a:t>
+            </a:r>
+            <a:r>
+              <a:rPr lang="pt-BR" dirty="0"/>
+              <a:t>, ele é a mesma representação </a:t>
+            </a:r>
+            <a:r>
+              <a:rPr lang="pt-BR" dirty="0" err="1"/>
+              <a:t>unicode</a:t>
+            </a:r>
+            <a:r>
+              <a:rPr lang="pt-BR" dirty="0"/>
+              <a:t>, em qualquer uma dessas plataformas.</a:t>
+            </a:r>
+          </a:p>
+          <a:p>
+            <a:endParaRPr lang="pt-BR" dirty="0"/>
+          </a:p>
+        </p:txBody>
+      </p:sp>
+    </p:spTree>
+    <p:extLst>
+      <p:ext uri="{BB962C8B-B14F-4D97-AF65-F5344CB8AC3E}">
+        <p14:creationId xmlns:p14="http://schemas.microsoft.com/office/powerpoint/2010/main" val="2793117333"/>
+      </p:ext>
+    </p:extLst>
+  </p:cSld>
+  <p:clrMapOvr>
+    <a:masterClrMapping/>
+  </p:clrMapOvr>
+</p:sld>
+</file>
+
+<file path=ppt/slides/slide11.xml><?xml version="1.0" encoding="utf-8"?>
+<p:sld xmlns:a="http://schemas.openxmlformats.org/drawingml/2006/main" xmlns:r="http://schemas.openxmlformats.org/officeDocument/2006/relationships" xmlns:p="http://schemas.openxmlformats.org/presentationml/2006/main">
+  <p:cSld>
+    <p:spTree>
+      <p:nvGrpSpPr>
+        <p:cNvPr id="1" name=""/>
+        <p:cNvGrpSpPr/>
+        <p:nvPr/>
+      </p:nvGrpSpPr>
+      <p:grpSpPr>
+        <a:xfrm>
+          <a:off x="0" y="0"/>
+          <a:ext cx="0" cy="0"/>
+          <a:chOff x="0" y="0"/>
+          <a:chExt cx="0" cy="0"/>
+        </a:xfrm>
+      </p:grpSpPr>
+      <p:sp>
+        <p:nvSpPr>
+          <p:cNvPr id="2" name="Título 1">
+            <a:extLst>
+              <a:ext uri="{FF2B5EF4-FFF2-40B4-BE49-F238E27FC236}">
+                <a16:creationId xmlns:a16="http://schemas.microsoft.com/office/drawing/2014/main" id="{A01C971D-D2FE-D9C4-3DDC-F8968DCBA25F}"/>
+              </a:ext>
+            </a:extLst>
+          </p:cNvPr>
+          <p:cNvSpPr>
+            <a:spLocks noGrp="1"/>
+          </p:cNvSpPr>
+          <p:nvPr>
+            <p:ph type="title"/>
+          </p:nvPr>
+        </p:nvSpPr>
+        <p:spPr/>
+        <p:txBody>
+          <a:bodyPr/>
+          <a:lstStyle/>
+          <a:p>
+            <a:r>
+              <a:rPr lang="pt-BR" dirty="0"/>
+              <a:t>O que aprendemos?</a:t>
+            </a:r>
+          </a:p>
+        </p:txBody>
+      </p:sp>
+      <p:sp>
+        <p:nvSpPr>
+          <p:cNvPr id="3" name="Espaço Reservado para Conteúdo 2">
+            <a:extLst>
+              <a:ext uri="{FF2B5EF4-FFF2-40B4-BE49-F238E27FC236}">
+                <a16:creationId xmlns:a16="http://schemas.microsoft.com/office/drawing/2014/main" id="{0340480E-6405-975A-4841-1539A7DB8BFF}"/>
+              </a:ext>
+            </a:extLst>
+          </p:cNvPr>
+          <p:cNvSpPr>
+            <a:spLocks noGrp="1"/>
+          </p:cNvSpPr>
+          <p:nvPr>
+            <p:ph sz="quarter" idx="10"/>
+          </p:nvPr>
+        </p:nvSpPr>
+        <p:spPr/>
+        <p:txBody>
+          <a:bodyPr>
+            <a:normAutofit/>
+          </a:bodyPr>
+          <a:lstStyle/>
+          <a:p>
+            <a:r>
+              <a:rPr lang="pt-BR" b="1" dirty="0"/>
+              <a:t>Nesta aula, aprendemos:</a:t>
+            </a:r>
+          </a:p>
+          <a:p>
+            <a:pPr marL="171450" indent="-171450">
+              <a:buFont typeface="Wingdings" panose="05000000000000000000" pitchFamily="2" charset="2"/>
+              <a:buChar char="q"/>
+            </a:pPr>
+            <a:r>
+              <a:rPr lang="pt-BR" dirty="0"/>
+              <a:t>A </a:t>
+            </a:r>
+            <a:r>
+              <a:rPr lang="pt-BR" dirty="0" err="1"/>
+              <a:t>tag</a:t>
+            </a:r>
+            <a:r>
+              <a:rPr lang="pt-BR" dirty="0"/>
+              <a:t> </a:t>
+            </a:r>
+            <a:r>
+              <a:rPr lang="pt-BR" dirty="0" err="1"/>
+              <a:t>footer</a:t>
+            </a:r>
+            <a:r>
+              <a:rPr lang="pt-BR" dirty="0"/>
+              <a:t>, para o rodapé da nossa página</a:t>
+            </a:r>
+          </a:p>
+          <a:p>
+            <a:pPr marL="171450" indent="-171450">
+              <a:buFont typeface="Wingdings" panose="05000000000000000000" pitchFamily="2" charset="2"/>
+              <a:buChar char="q"/>
+            </a:pPr>
+            <a:r>
+              <a:rPr lang="pt-BR" dirty="0"/>
+              <a:t>Que, com CSS, podemos colocar uma imagem de fundo em um elemento</a:t>
+            </a:r>
+          </a:p>
+          <a:p>
+            <a:pPr marL="171450" indent="-171450">
+              <a:buFont typeface="Wingdings" panose="05000000000000000000" pitchFamily="2" charset="2"/>
+              <a:buChar char="q"/>
+            </a:pPr>
+            <a:r>
+              <a:rPr lang="pt-BR" dirty="0"/>
+              <a:t> Quando colocamos uma imagem de fundo em um elemento, o CSS, por padrão, copia e cola a imagem diversas vezes até ocupar todo o espaço do elemento</a:t>
+            </a:r>
+          </a:p>
+          <a:p>
+            <a:pPr marL="171450" indent="-171450">
+              <a:buFont typeface="Wingdings" panose="05000000000000000000" pitchFamily="2" charset="2"/>
+              <a:buChar char="q"/>
+            </a:pPr>
+            <a:r>
+              <a:rPr lang="pt-BR" dirty="0"/>
+              <a:t>A tabela Unicode</a:t>
+            </a:r>
+          </a:p>
+          <a:p>
+            <a:endParaRPr lang="pt-BR" dirty="0"/>
+          </a:p>
+        </p:txBody>
+      </p:sp>
+    </p:spTree>
+    <p:extLst>
+      <p:ext uri="{BB962C8B-B14F-4D97-AF65-F5344CB8AC3E}">
+        <p14:creationId xmlns:p14="http://schemas.microsoft.com/office/powerpoint/2010/main" val="2051742223"/>
+      </p:ext>
+    </p:extLst>
+  </p:cSld>
+  <p:clrMapOvr>
+    <a:masterClrMapping/>
+  </p:clrMapOvr>
+</p:sld>
+</file>
+
+<file path=ppt/slides/slide12.xml><?xml version="1.0" encoding="utf-8"?>
+<p:sld xmlns:a="http://schemas.openxmlformats.org/drawingml/2006/main" xmlns:r="http://schemas.openxmlformats.org/officeDocument/2006/relationships" xmlns:p="http://schemas.openxmlformats.org/presentationml/2006/main">
+  <p:cSld>
+    <p:spTree>
+      <p:nvGrpSpPr>
+        <p:cNvPr id="1" name=""/>
+        <p:cNvGrpSpPr/>
+        <p:nvPr/>
+      </p:nvGrpSpPr>
+      <p:grpSpPr>
+        <a:xfrm>
+          <a:off x="0" y="0"/>
+          <a:ext cx="0" cy="0"/>
+          <a:chOff x="0" y="0"/>
+          <a:chExt cx="0" cy="0"/>
+        </a:xfrm>
+      </p:grpSpPr>
+      <p:sp>
+        <p:nvSpPr>
+          <p:cNvPr id="2" name="Título 1">
+            <a:extLst>
+              <a:ext uri="{FF2B5EF4-FFF2-40B4-BE49-F238E27FC236}">
+                <a16:creationId xmlns:a16="http://schemas.microsoft.com/office/drawing/2014/main" id="{BF196629-8AC0-0B73-740C-E21CC555C7C2}"/>
+              </a:ext>
+            </a:extLst>
+          </p:cNvPr>
+          <p:cNvSpPr>
+            <a:spLocks noGrp="1"/>
+          </p:cNvSpPr>
+          <p:nvPr>
+            <p:ph type="title"/>
+          </p:nvPr>
+        </p:nvSpPr>
+        <p:spPr/>
+        <p:txBody>
+          <a:bodyPr/>
+          <a:lstStyle/>
+          <a:p>
+            <a:r>
+              <a:rPr lang="pt-BR" dirty="0"/>
+              <a:t>Conclusão</a:t>
+            </a:r>
+          </a:p>
+        </p:txBody>
+      </p:sp>
+      <p:sp>
+        <p:nvSpPr>
+          <p:cNvPr id="3" name="Espaço Reservado para Conteúdo 2">
+            <a:extLst>
+              <a:ext uri="{FF2B5EF4-FFF2-40B4-BE49-F238E27FC236}">
+                <a16:creationId xmlns:a16="http://schemas.microsoft.com/office/drawing/2014/main" id="{365421BF-3A29-C474-46BE-DD892216FC4E}"/>
+              </a:ext>
+            </a:extLst>
+          </p:cNvPr>
+          <p:cNvSpPr>
+            <a:spLocks noGrp="1"/>
+          </p:cNvSpPr>
+          <p:nvPr>
+            <p:ph sz="quarter" idx="10"/>
+          </p:nvPr>
+        </p:nvSpPr>
+        <p:spPr>
+          <a:xfrm>
+            <a:off x="539496" y="1435607"/>
+            <a:ext cx="2420014" cy="5083179"/>
+          </a:xfrm>
+        </p:spPr>
+        <p:txBody>
+          <a:bodyPr>
+            <a:normAutofit/>
+          </a:bodyPr>
+          <a:lstStyle/>
+          <a:p>
+            <a:r>
+              <a:rPr lang="pt-BR" sz="1100" dirty="0"/>
+              <a:t>- Montagem da estrutura de HTML </a:t>
+            </a:r>
+          </a:p>
+          <a:p>
+            <a:r>
+              <a:rPr lang="pt-BR" sz="1100" dirty="0"/>
+              <a:t>- </a:t>
+            </a:r>
+            <a:r>
+              <a:rPr lang="pt-BR" sz="1100" dirty="0" err="1"/>
+              <a:t>tag</a:t>
+            </a:r>
+            <a:r>
+              <a:rPr lang="pt-BR" sz="1100" dirty="0"/>
+              <a:t> meta</a:t>
+            </a:r>
+          </a:p>
+          <a:p>
+            <a:r>
+              <a:rPr lang="pt-BR" sz="1100" dirty="0"/>
+              <a:t>- </a:t>
+            </a:r>
+            <a:r>
+              <a:rPr lang="pt-BR" sz="1100" dirty="0" err="1"/>
+              <a:t>tag</a:t>
+            </a:r>
+            <a:r>
+              <a:rPr lang="pt-BR" sz="1100" dirty="0"/>
+              <a:t> </a:t>
+            </a:r>
+            <a:r>
+              <a:rPr lang="pt-BR" sz="1100" dirty="0" err="1"/>
+              <a:t>title</a:t>
+            </a:r>
+            <a:r>
+              <a:rPr lang="pt-BR" sz="1100" dirty="0"/>
+              <a:t> </a:t>
+            </a:r>
+          </a:p>
+          <a:p>
+            <a:r>
+              <a:rPr lang="pt-BR" sz="1100" dirty="0"/>
+              <a:t>- links</a:t>
+            </a:r>
+          </a:p>
+          <a:p>
+            <a:r>
+              <a:rPr lang="pt-BR" sz="1100" dirty="0"/>
+              <a:t>- reset CSS </a:t>
+            </a:r>
+          </a:p>
+          <a:p>
+            <a:r>
+              <a:rPr lang="pt-BR" sz="1100" dirty="0"/>
+              <a:t>- Utilidade do header</a:t>
+            </a:r>
+          </a:p>
+          <a:p>
+            <a:r>
+              <a:rPr lang="pt-BR" sz="1100" dirty="0"/>
+              <a:t>- Como criar uma divisão dentro do header</a:t>
+            </a:r>
+          </a:p>
+        </p:txBody>
+      </p:sp>
+      <p:sp>
+        <p:nvSpPr>
+          <p:cNvPr id="4" name="Espaço Reservado para Conteúdo 2">
+            <a:extLst>
+              <a:ext uri="{FF2B5EF4-FFF2-40B4-BE49-F238E27FC236}">
+                <a16:creationId xmlns:a16="http://schemas.microsoft.com/office/drawing/2014/main" id="{E95A6F6C-4DFE-F50A-E377-D5D93F9FC5F0}"/>
+              </a:ext>
+            </a:extLst>
+          </p:cNvPr>
+          <p:cNvSpPr txBox="1">
+            <a:spLocks/>
+          </p:cNvSpPr>
+          <p:nvPr/>
+        </p:nvSpPr>
+        <p:spPr>
+          <a:xfrm>
+            <a:off x="3484257" y="1450453"/>
+            <a:ext cx="2823136" cy="5083179"/>
+          </a:xfrm>
+          <a:prstGeom prst="rect">
+            <a:avLst/>
+          </a:prstGeom>
+        </p:spPr>
+        <p:txBody>
+          <a:bodyPr vert="horz" lIns="91440" tIns="45720" rIns="91440" bIns="45720" rtlCol="0">
+            <a:normAutofit/>
+          </a:bodyPr>
+          <a:lstStyle>
+            <a:lvl1pPr marL="0" indent="0" algn="l" defTabSz="914400" rtl="0" eaLnBrk="1" latinLnBrk="0" hangingPunct="1">
+              <a:lnSpc>
+                <a:spcPct val="150000"/>
+              </a:lnSpc>
+              <a:spcBef>
+                <a:spcPts val="1000"/>
+              </a:spcBef>
+              <a:spcAft>
+                <a:spcPts val="1200"/>
+              </a:spcAft>
+              <a:buFontTx/>
+              <a:buNone/>
+              <a:defRPr lang="en-US" sz="1200" kern="1200" smtClean="0">
+                <a:solidFill>
+                  <a:schemeClr val="tx1">
+                    <a:lumMod val="75000"/>
+                    <a:lumOff val="25000"/>
+                  </a:schemeClr>
+                </a:solidFill>
+                <a:latin typeface="+mn-lt"/>
+                <a:ea typeface="+mn-ea"/>
+                <a:cs typeface="+mn-cs"/>
+              </a:defRPr>
+            </a:lvl1pPr>
+            <a:lvl2pPr marL="228600" indent="-228600" algn="l" defTabSz="914400" rtl="0" eaLnBrk="1" latinLnBrk="0" hangingPunct="1">
+              <a:lnSpc>
+                <a:spcPct val="150000"/>
+              </a:lnSpc>
+              <a:spcBef>
+                <a:spcPts val="1000"/>
+              </a:spcBef>
+              <a:spcAft>
+                <a:spcPts val="1200"/>
+              </a:spcAft>
+              <a:buFont typeface="Arial" panose="020B0604020202020204" pitchFamily="34" charset="0"/>
+              <a:buChar char="•"/>
+              <a:defRPr lang="en-US" sz="1200" kern="1200" smtClean="0">
+                <a:solidFill>
+                  <a:schemeClr val="tx1">
+                    <a:lumMod val="75000"/>
+                    <a:lumOff val="25000"/>
+                  </a:schemeClr>
+                </a:solidFill>
+                <a:latin typeface="+mn-lt"/>
+                <a:ea typeface="+mn-ea"/>
+                <a:cs typeface="+mn-cs"/>
+              </a:defRPr>
+            </a:lvl2pPr>
+            <a:lvl3pPr marL="685800" indent="-228600" algn="l" defTabSz="914400" rtl="0" eaLnBrk="1" latinLnBrk="0" hangingPunct="1">
+              <a:lnSpc>
+                <a:spcPct val="150000"/>
+              </a:lnSpc>
+              <a:spcBef>
+                <a:spcPts val="1000"/>
+              </a:spcBef>
+              <a:spcAft>
+                <a:spcPts val="1200"/>
+              </a:spcAft>
+              <a:buFont typeface="Arial" panose="020B0604020202020204" pitchFamily="34" charset="0"/>
+              <a:buChar char="•"/>
+              <a:defRPr lang="en-US" sz="1200" kern="1200" smtClean="0">
+                <a:solidFill>
+                  <a:schemeClr val="tx1">
+                    <a:lumMod val="75000"/>
+                    <a:lumOff val="25000"/>
+                  </a:schemeClr>
+                </a:solidFill>
+                <a:latin typeface="+mn-lt"/>
+                <a:ea typeface="+mn-ea"/>
+                <a:cs typeface="+mn-cs"/>
+              </a:defRPr>
+            </a:lvl3pPr>
+            <a:lvl4pPr marL="1143000" indent="-228600" algn="l" defTabSz="914400" rtl="0" eaLnBrk="1" latinLnBrk="0" hangingPunct="1">
+              <a:lnSpc>
+                <a:spcPct val="150000"/>
+              </a:lnSpc>
+              <a:spcBef>
+                <a:spcPts val="1000"/>
+              </a:spcBef>
+              <a:spcAft>
+                <a:spcPts val="1200"/>
+              </a:spcAft>
+              <a:buFont typeface="Arial" panose="020B0604020202020204" pitchFamily="34" charset="0"/>
+              <a:buChar char="•"/>
+              <a:defRPr lang="en-US" sz="1200" kern="1200" smtClean="0">
+                <a:solidFill>
+                  <a:schemeClr val="tx1">
+                    <a:lumMod val="75000"/>
+                    <a:lumOff val="25000"/>
+                  </a:schemeClr>
+                </a:solidFill>
+                <a:latin typeface="+mn-lt"/>
+                <a:ea typeface="+mn-ea"/>
+                <a:cs typeface="+mn-cs"/>
+              </a:defRPr>
+            </a:lvl4pPr>
+            <a:lvl5pPr marL="1600200" indent="-228600" algn="l" defTabSz="914400" rtl="0" eaLnBrk="1" latinLnBrk="0" hangingPunct="1">
+              <a:lnSpc>
+                <a:spcPct val="150000"/>
+              </a:lnSpc>
+              <a:spcBef>
+                <a:spcPts val="1000"/>
+              </a:spcBef>
+              <a:spcAft>
+                <a:spcPts val="1200"/>
+              </a:spcAft>
+              <a:buFont typeface="Arial" panose="020B0604020202020204" pitchFamily="34" charset="0"/>
+              <a:buChar char="•"/>
+              <a:defRPr lang="en-US" sz="1200" kern="1200">
+                <a:solidFill>
+                  <a:schemeClr val="tx1">
+                    <a:lumMod val="75000"/>
+                    <a:lumOff val="25000"/>
+                  </a:schemeClr>
+                </a:solidFill>
+                <a:latin typeface="+mn-lt"/>
+                <a:ea typeface="+mn-ea"/>
+                <a:cs typeface="+mn-cs"/>
+              </a:defRPr>
+            </a:lvl5pPr>
+            <a:lvl6pPr marL="2057400" indent="-228600" algn="l" defTabSz="914400" rtl="0" eaLnBrk="1" latinLnBrk="0" hangingPunct="1">
+              <a:lnSpc>
+                <a:spcPct val="150000"/>
+              </a:lnSpc>
+              <a:spcBef>
+                <a:spcPts val="1000"/>
+              </a:spcBef>
+              <a:spcAft>
+                <a:spcPts val="1200"/>
+              </a:spcAft>
+              <a:buFont typeface="Arial" panose="020B0604020202020204" pitchFamily="34" charset="0"/>
+              <a:buChar char="•"/>
+              <a:defRPr lang="en-US" sz="1200" kern="1200" dirty="0" smtClean="0">
+                <a:solidFill>
+                  <a:schemeClr val="tx1"/>
+                </a:solidFill>
+                <a:latin typeface="+mn-lt"/>
+                <a:ea typeface="+mn-ea"/>
+                <a:cs typeface="+mn-cs"/>
+              </a:defRPr>
+            </a:lvl6pPr>
+            <a:lvl7pPr marL="2514600" indent="-228600" algn="l" defTabSz="914400" rtl="0" eaLnBrk="1" latinLnBrk="0" hangingPunct="1">
+              <a:lnSpc>
+                <a:spcPct val="150000"/>
+              </a:lnSpc>
+              <a:spcBef>
+                <a:spcPts val="1000"/>
+              </a:spcBef>
+              <a:spcAft>
+                <a:spcPts val="1200"/>
+              </a:spcAft>
+              <a:buFont typeface="Arial" panose="020B0604020202020204" pitchFamily="34" charset="0"/>
+              <a:buChar char="•"/>
+              <a:defRPr lang="en-US" sz="1200" kern="1200" dirty="0" smtClean="0">
+                <a:solidFill>
+                  <a:schemeClr val="tx1"/>
+                </a:solidFill>
+                <a:latin typeface="+mn-lt"/>
+                <a:ea typeface="+mn-ea"/>
+                <a:cs typeface="+mn-cs"/>
+              </a:defRPr>
+            </a:lvl7pPr>
+            <a:lvl8pPr marL="2971800" indent="-228600" algn="l" defTabSz="914400" rtl="0" eaLnBrk="1" latinLnBrk="0" hangingPunct="1">
+              <a:lnSpc>
+                <a:spcPct val="150000"/>
+              </a:lnSpc>
+              <a:spcBef>
+                <a:spcPts val="1000"/>
+              </a:spcBef>
+              <a:spcAft>
+                <a:spcPts val="1200"/>
+              </a:spcAft>
+              <a:buFont typeface="Arial" panose="020B0604020202020204" pitchFamily="34" charset="0"/>
+              <a:buChar char="•"/>
+              <a:defRPr lang="en-US" sz="1200" kern="1200" dirty="0" smtClean="0">
+                <a:solidFill>
+                  <a:schemeClr val="tx1"/>
+                </a:solidFill>
+                <a:latin typeface="+mn-lt"/>
+                <a:ea typeface="+mn-ea"/>
+                <a:cs typeface="+mn-cs"/>
+              </a:defRPr>
+            </a:lvl8pPr>
+            <a:lvl9pPr marL="3429000" indent="-228600" algn="l" defTabSz="914400" rtl="0" eaLnBrk="1" latinLnBrk="0" hangingPunct="1">
+              <a:lnSpc>
+                <a:spcPct val="90000"/>
+              </a:lnSpc>
+              <a:spcBef>
+                <a:spcPct val="30000"/>
+              </a:spcBef>
+              <a:buFont typeface="Arial" panose="020B0604020202020204" pitchFamily="34" charset="0"/>
+              <a:buNone/>
+              <a:defRPr sz="1200" kern="1200">
+                <a:solidFill>
+                  <a:schemeClr val="tx1"/>
+                </a:solidFill>
+                <a:latin typeface="+mn-lt"/>
+                <a:ea typeface="+mn-ea"/>
+                <a:cs typeface="+mn-cs"/>
+              </a:defRPr>
+            </a:lvl9pPr>
+          </a:lstStyle>
+          <a:p>
+            <a:endParaRPr lang="pt-BR" dirty="0"/>
+          </a:p>
+        </p:txBody>
+      </p:sp>
+      <p:sp>
+        <p:nvSpPr>
+          <p:cNvPr id="7" name="Espaço Reservado para Conteúdo 2">
+            <a:extLst>
+              <a:ext uri="{FF2B5EF4-FFF2-40B4-BE49-F238E27FC236}">
+                <a16:creationId xmlns:a16="http://schemas.microsoft.com/office/drawing/2014/main" id="{8AF935A3-27B0-35AB-6A2F-95AE43725630}"/>
+              </a:ext>
+            </a:extLst>
+          </p:cNvPr>
+          <p:cNvSpPr txBox="1">
+            <a:spLocks/>
+          </p:cNvSpPr>
+          <p:nvPr/>
+        </p:nvSpPr>
+        <p:spPr>
+          <a:xfrm>
+            <a:off x="3362632" y="1435605"/>
+            <a:ext cx="2420014" cy="5083179"/>
+          </a:xfrm>
+          <a:prstGeom prst="rect">
+            <a:avLst/>
+          </a:prstGeom>
+        </p:spPr>
+        <p:txBody>
+          <a:bodyPr vert="horz" lIns="91440" tIns="45720" rIns="91440" bIns="45720" rtlCol="0">
+            <a:normAutofit/>
+          </a:bodyPr>
+          <a:lstStyle>
+            <a:lvl1pPr marL="0" indent="0" algn="l" defTabSz="914400" rtl="0" eaLnBrk="1" latinLnBrk="0" hangingPunct="1">
+              <a:lnSpc>
+                <a:spcPct val="150000"/>
+              </a:lnSpc>
+              <a:spcBef>
+                <a:spcPts val="1000"/>
+              </a:spcBef>
+              <a:spcAft>
+                <a:spcPts val="1200"/>
+              </a:spcAft>
+              <a:buFontTx/>
+              <a:buNone/>
+              <a:defRPr lang="en-US" sz="1200" kern="1200" smtClean="0">
+                <a:solidFill>
+                  <a:schemeClr val="tx1">
+                    <a:lumMod val="75000"/>
+                    <a:lumOff val="25000"/>
+                  </a:schemeClr>
+                </a:solidFill>
+                <a:latin typeface="+mn-lt"/>
+                <a:ea typeface="+mn-ea"/>
+                <a:cs typeface="+mn-cs"/>
+              </a:defRPr>
+            </a:lvl1pPr>
+            <a:lvl2pPr marL="228600" indent="-228600" algn="l" defTabSz="914400" rtl="0" eaLnBrk="1" latinLnBrk="0" hangingPunct="1">
+              <a:lnSpc>
+                <a:spcPct val="150000"/>
+              </a:lnSpc>
+              <a:spcBef>
+                <a:spcPts val="1000"/>
+              </a:spcBef>
+              <a:spcAft>
+                <a:spcPts val="1200"/>
+              </a:spcAft>
+              <a:buFont typeface="Arial" panose="020B0604020202020204" pitchFamily="34" charset="0"/>
+              <a:buChar char="•"/>
+              <a:defRPr lang="en-US" sz="1200" kern="1200" smtClean="0">
+                <a:solidFill>
+                  <a:schemeClr val="tx1">
+                    <a:lumMod val="75000"/>
+                    <a:lumOff val="25000"/>
+                  </a:schemeClr>
+                </a:solidFill>
+                <a:latin typeface="+mn-lt"/>
+                <a:ea typeface="+mn-ea"/>
+                <a:cs typeface="+mn-cs"/>
+              </a:defRPr>
+            </a:lvl2pPr>
+            <a:lvl3pPr marL="685800" indent="-228600" algn="l" defTabSz="914400" rtl="0" eaLnBrk="1" latinLnBrk="0" hangingPunct="1">
+              <a:lnSpc>
+                <a:spcPct val="150000"/>
+              </a:lnSpc>
+              <a:spcBef>
+                <a:spcPts val="1000"/>
+              </a:spcBef>
+              <a:spcAft>
+                <a:spcPts val="1200"/>
+              </a:spcAft>
+              <a:buFont typeface="Arial" panose="020B0604020202020204" pitchFamily="34" charset="0"/>
+              <a:buChar char="•"/>
+              <a:defRPr lang="en-US" sz="1200" kern="1200" smtClean="0">
+                <a:solidFill>
+                  <a:schemeClr val="tx1">
+                    <a:lumMod val="75000"/>
+                    <a:lumOff val="25000"/>
+                  </a:schemeClr>
+                </a:solidFill>
+                <a:latin typeface="+mn-lt"/>
+                <a:ea typeface="+mn-ea"/>
+                <a:cs typeface="+mn-cs"/>
+              </a:defRPr>
+            </a:lvl3pPr>
+            <a:lvl4pPr marL="1143000" indent="-228600" algn="l" defTabSz="914400" rtl="0" eaLnBrk="1" latinLnBrk="0" hangingPunct="1">
+              <a:lnSpc>
+                <a:spcPct val="150000"/>
+              </a:lnSpc>
+              <a:spcBef>
+                <a:spcPts val="1000"/>
+              </a:spcBef>
+              <a:spcAft>
+                <a:spcPts val="1200"/>
+              </a:spcAft>
+              <a:buFont typeface="Arial" panose="020B0604020202020204" pitchFamily="34" charset="0"/>
+              <a:buChar char="•"/>
+              <a:defRPr lang="en-US" sz="1200" kern="1200" smtClean="0">
+                <a:solidFill>
+                  <a:schemeClr val="tx1">
+                    <a:lumMod val="75000"/>
+                    <a:lumOff val="25000"/>
+                  </a:schemeClr>
+                </a:solidFill>
+                <a:latin typeface="+mn-lt"/>
+                <a:ea typeface="+mn-ea"/>
+                <a:cs typeface="+mn-cs"/>
+              </a:defRPr>
+            </a:lvl4pPr>
+            <a:lvl5pPr marL="1600200" indent="-228600" algn="l" defTabSz="914400" rtl="0" eaLnBrk="1" latinLnBrk="0" hangingPunct="1">
+              <a:lnSpc>
+                <a:spcPct val="150000"/>
+              </a:lnSpc>
+              <a:spcBef>
+                <a:spcPts val="1000"/>
+              </a:spcBef>
+              <a:spcAft>
+                <a:spcPts val="1200"/>
+              </a:spcAft>
+              <a:buFont typeface="Arial" panose="020B0604020202020204" pitchFamily="34" charset="0"/>
+              <a:buChar char="•"/>
+              <a:defRPr lang="en-US" sz="1200" kern="1200">
+                <a:solidFill>
+                  <a:schemeClr val="tx1">
+                    <a:lumMod val="75000"/>
+                    <a:lumOff val="25000"/>
+                  </a:schemeClr>
+                </a:solidFill>
+                <a:latin typeface="+mn-lt"/>
+                <a:ea typeface="+mn-ea"/>
+                <a:cs typeface="+mn-cs"/>
+              </a:defRPr>
+            </a:lvl5pPr>
+            <a:lvl6pPr marL="2057400" indent="-228600" algn="l" defTabSz="914400" rtl="0" eaLnBrk="1" latinLnBrk="0" hangingPunct="1">
+              <a:lnSpc>
+                <a:spcPct val="150000"/>
+              </a:lnSpc>
+              <a:spcBef>
+                <a:spcPts val="1000"/>
+              </a:spcBef>
+              <a:spcAft>
+                <a:spcPts val="1200"/>
+              </a:spcAft>
+              <a:buFont typeface="Arial" panose="020B0604020202020204" pitchFamily="34" charset="0"/>
+              <a:buChar char="•"/>
+              <a:defRPr lang="en-US" sz="1200" kern="1200" dirty="0" smtClean="0">
+                <a:solidFill>
+                  <a:schemeClr val="tx1"/>
+                </a:solidFill>
+                <a:latin typeface="+mn-lt"/>
+                <a:ea typeface="+mn-ea"/>
+                <a:cs typeface="+mn-cs"/>
+              </a:defRPr>
+            </a:lvl6pPr>
+            <a:lvl7pPr marL="2514600" indent="-228600" algn="l" defTabSz="914400" rtl="0" eaLnBrk="1" latinLnBrk="0" hangingPunct="1">
+              <a:lnSpc>
+                <a:spcPct val="150000"/>
+              </a:lnSpc>
+              <a:spcBef>
+                <a:spcPts val="1000"/>
+              </a:spcBef>
+              <a:spcAft>
+                <a:spcPts val="1200"/>
+              </a:spcAft>
+              <a:buFont typeface="Arial" panose="020B0604020202020204" pitchFamily="34" charset="0"/>
+              <a:buChar char="•"/>
+              <a:defRPr lang="en-US" sz="1200" kern="1200" dirty="0" smtClean="0">
+                <a:solidFill>
+                  <a:schemeClr val="tx1"/>
+                </a:solidFill>
+                <a:latin typeface="+mn-lt"/>
+                <a:ea typeface="+mn-ea"/>
+                <a:cs typeface="+mn-cs"/>
+              </a:defRPr>
+            </a:lvl7pPr>
+            <a:lvl8pPr marL="2971800" indent="-228600" algn="l" defTabSz="914400" rtl="0" eaLnBrk="1" latinLnBrk="0" hangingPunct="1">
+              <a:lnSpc>
+                <a:spcPct val="150000"/>
+              </a:lnSpc>
+              <a:spcBef>
+                <a:spcPts val="1000"/>
+              </a:spcBef>
+              <a:spcAft>
+                <a:spcPts val="1200"/>
+              </a:spcAft>
+              <a:buFont typeface="Arial" panose="020B0604020202020204" pitchFamily="34" charset="0"/>
+              <a:buChar char="•"/>
+              <a:defRPr lang="en-US" sz="1200" kern="1200" dirty="0" smtClean="0">
+                <a:solidFill>
+                  <a:schemeClr val="tx1"/>
+                </a:solidFill>
+                <a:latin typeface="+mn-lt"/>
+                <a:ea typeface="+mn-ea"/>
+                <a:cs typeface="+mn-cs"/>
+              </a:defRPr>
+            </a:lvl8pPr>
+            <a:lvl9pPr marL="3429000" indent="-228600" algn="l" defTabSz="914400" rtl="0" eaLnBrk="1" latinLnBrk="0" hangingPunct="1">
+              <a:lnSpc>
+                <a:spcPct val="90000"/>
+              </a:lnSpc>
+              <a:spcBef>
+                <a:spcPct val="30000"/>
+              </a:spcBef>
+              <a:buFont typeface="Arial" panose="020B0604020202020204" pitchFamily="34" charset="0"/>
+              <a:buNone/>
+              <a:defRPr sz="1200" kern="1200">
+                <a:solidFill>
+                  <a:schemeClr val="tx1"/>
+                </a:solidFill>
+                <a:latin typeface="+mn-lt"/>
+                <a:ea typeface="+mn-ea"/>
+                <a:cs typeface="+mn-cs"/>
+              </a:defRPr>
+            </a:lvl9pPr>
+          </a:lstStyle>
+          <a:p>
+            <a:r>
+              <a:rPr lang="pt-BR" sz="1100" dirty="0"/>
+              <a:t>- Como colocar uma imagem como conteúdo principal no seu título</a:t>
+            </a:r>
+          </a:p>
+          <a:p>
+            <a:r>
+              <a:rPr lang="pt-BR" sz="1100" dirty="0"/>
+              <a:t>- Criação de um menu de navegação com links entre páginas.</a:t>
+            </a:r>
+          </a:p>
+          <a:p>
+            <a:r>
+              <a:rPr lang="pt-BR" sz="1100" dirty="0"/>
+              <a:t>- Lista de itens, itens complexos com item, com título, com imagem, com texto de descrição, com texto para ser o preço do item. </a:t>
+            </a:r>
+          </a:p>
+          <a:p>
+            <a:r>
+              <a:rPr lang="pt-BR" sz="1100" dirty="0"/>
+              <a:t>- Rodapé (</a:t>
+            </a:r>
+            <a:r>
+              <a:rPr lang="pt-BR" sz="1100" dirty="0" err="1"/>
+              <a:t>footer</a:t>
+            </a:r>
+            <a:r>
+              <a:rPr lang="pt-BR" sz="1100" dirty="0"/>
+              <a:t>)</a:t>
+            </a:r>
+          </a:p>
+          <a:p>
+            <a:r>
+              <a:rPr lang="pt-BR" sz="1100" dirty="0"/>
+              <a:t>- Imagem e  imagem de fundo no rodapé.</a:t>
+            </a:r>
+          </a:p>
+          <a:p>
+            <a:endParaRPr lang="pt-BR" dirty="0"/>
+          </a:p>
+        </p:txBody>
+      </p:sp>
+      <p:sp>
+        <p:nvSpPr>
+          <p:cNvPr id="8" name="Espaço Reservado para Conteúdo 2">
+            <a:extLst>
+              <a:ext uri="{FF2B5EF4-FFF2-40B4-BE49-F238E27FC236}">
+                <a16:creationId xmlns:a16="http://schemas.microsoft.com/office/drawing/2014/main" id="{EC6E4E36-A2A2-95DF-5C94-EEB6A2F6C9F6}"/>
+              </a:ext>
+            </a:extLst>
+          </p:cNvPr>
+          <p:cNvSpPr txBox="1">
+            <a:spLocks/>
+          </p:cNvSpPr>
+          <p:nvPr/>
+        </p:nvSpPr>
+        <p:spPr>
+          <a:xfrm>
+            <a:off x="6188319" y="1435605"/>
+            <a:ext cx="2420014" cy="5083179"/>
+          </a:xfrm>
+          <a:prstGeom prst="rect">
+            <a:avLst/>
+          </a:prstGeom>
+        </p:spPr>
+        <p:txBody>
+          <a:bodyPr vert="horz" lIns="91440" tIns="45720" rIns="91440" bIns="45720" rtlCol="0">
+            <a:normAutofit/>
+          </a:bodyPr>
+          <a:lstStyle>
+            <a:lvl1pPr marL="0" indent="0" algn="l" defTabSz="914400" rtl="0" eaLnBrk="1" latinLnBrk="0" hangingPunct="1">
+              <a:lnSpc>
+                <a:spcPct val="150000"/>
+              </a:lnSpc>
+              <a:spcBef>
+                <a:spcPts val="1000"/>
+              </a:spcBef>
+              <a:spcAft>
+                <a:spcPts val="1200"/>
+              </a:spcAft>
+              <a:buFontTx/>
+              <a:buNone/>
+              <a:defRPr lang="en-US" sz="1200" kern="1200" smtClean="0">
+                <a:solidFill>
+                  <a:schemeClr val="tx1">
+                    <a:lumMod val="75000"/>
+                    <a:lumOff val="25000"/>
+                  </a:schemeClr>
+                </a:solidFill>
+                <a:latin typeface="+mn-lt"/>
+                <a:ea typeface="+mn-ea"/>
+                <a:cs typeface="+mn-cs"/>
+              </a:defRPr>
+            </a:lvl1pPr>
+            <a:lvl2pPr marL="228600" indent="-228600" algn="l" defTabSz="914400" rtl="0" eaLnBrk="1" latinLnBrk="0" hangingPunct="1">
+              <a:lnSpc>
+                <a:spcPct val="150000"/>
+              </a:lnSpc>
+              <a:spcBef>
+                <a:spcPts val="1000"/>
+              </a:spcBef>
+              <a:spcAft>
+                <a:spcPts val="1200"/>
+              </a:spcAft>
+              <a:buFont typeface="Arial" panose="020B0604020202020204" pitchFamily="34" charset="0"/>
+              <a:buChar char="•"/>
+              <a:defRPr lang="en-US" sz="1200" kern="1200" smtClean="0">
+                <a:solidFill>
+                  <a:schemeClr val="tx1">
+                    <a:lumMod val="75000"/>
+                    <a:lumOff val="25000"/>
+                  </a:schemeClr>
+                </a:solidFill>
+                <a:latin typeface="+mn-lt"/>
+                <a:ea typeface="+mn-ea"/>
+                <a:cs typeface="+mn-cs"/>
+              </a:defRPr>
+            </a:lvl2pPr>
+            <a:lvl3pPr marL="685800" indent="-228600" algn="l" defTabSz="914400" rtl="0" eaLnBrk="1" latinLnBrk="0" hangingPunct="1">
+              <a:lnSpc>
+                <a:spcPct val="150000"/>
+              </a:lnSpc>
+              <a:spcBef>
+                <a:spcPts val="1000"/>
+              </a:spcBef>
+              <a:spcAft>
+                <a:spcPts val="1200"/>
+              </a:spcAft>
+              <a:buFont typeface="Arial" panose="020B0604020202020204" pitchFamily="34" charset="0"/>
+              <a:buChar char="•"/>
+              <a:defRPr lang="en-US" sz="1200" kern="1200" smtClean="0">
+                <a:solidFill>
+                  <a:schemeClr val="tx1">
+                    <a:lumMod val="75000"/>
+                    <a:lumOff val="25000"/>
+                  </a:schemeClr>
+                </a:solidFill>
+                <a:latin typeface="+mn-lt"/>
+                <a:ea typeface="+mn-ea"/>
+                <a:cs typeface="+mn-cs"/>
+              </a:defRPr>
+            </a:lvl3pPr>
+            <a:lvl4pPr marL="1143000" indent="-228600" algn="l" defTabSz="914400" rtl="0" eaLnBrk="1" latinLnBrk="0" hangingPunct="1">
+              <a:lnSpc>
+                <a:spcPct val="150000"/>
+              </a:lnSpc>
+              <a:spcBef>
+                <a:spcPts val="1000"/>
+              </a:spcBef>
+              <a:spcAft>
+                <a:spcPts val="1200"/>
+              </a:spcAft>
+              <a:buFont typeface="Arial" panose="020B0604020202020204" pitchFamily="34" charset="0"/>
+              <a:buChar char="•"/>
+              <a:defRPr lang="en-US" sz="1200" kern="1200" smtClean="0">
+                <a:solidFill>
+                  <a:schemeClr val="tx1">
+                    <a:lumMod val="75000"/>
+                    <a:lumOff val="25000"/>
+                  </a:schemeClr>
+                </a:solidFill>
+                <a:latin typeface="+mn-lt"/>
+                <a:ea typeface="+mn-ea"/>
+                <a:cs typeface="+mn-cs"/>
+              </a:defRPr>
+            </a:lvl4pPr>
+            <a:lvl5pPr marL="1600200" indent="-228600" algn="l" defTabSz="914400" rtl="0" eaLnBrk="1" latinLnBrk="0" hangingPunct="1">
+              <a:lnSpc>
+                <a:spcPct val="150000"/>
+              </a:lnSpc>
+              <a:spcBef>
+                <a:spcPts val="1000"/>
+              </a:spcBef>
+              <a:spcAft>
+                <a:spcPts val="1200"/>
+              </a:spcAft>
+              <a:buFont typeface="Arial" panose="020B0604020202020204" pitchFamily="34" charset="0"/>
+              <a:buChar char="•"/>
+              <a:defRPr lang="en-US" sz="1200" kern="1200">
+                <a:solidFill>
+                  <a:schemeClr val="tx1">
+                    <a:lumMod val="75000"/>
+                    <a:lumOff val="25000"/>
+                  </a:schemeClr>
+                </a:solidFill>
+                <a:latin typeface="+mn-lt"/>
+                <a:ea typeface="+mn-ea"/>
+                <a:cs typeface="+mn-cs"/>
+              </a:defRPr>
+            </a:lvl5pPr>
+            <a:lvl6pPr marL="2057400" indent="-228600" algn="l" defTabSz="914400" rtl="0" eaLnBrk="1" latinLnBrk="0" hangingPunct="1">
+              <a:lnSpc>
+                <a:spcPct val="150000"/>
+              </a:lnSpc>
+              <a:spcBef>
+                <a:spcPts val="1000"/>
+              </a:spcBef>
+              <a:spcAft>
+                <a:spcPts val="1200"/>
+              </a:spcAft>
+              <a:buFont typeface="Arial" panose="020B0604020202020204" pitchFamily="34" charset="0"/>
+              <a:buChar char="•"/>
+              <a:defRPr lang="en-US" sz="1200" kern="1200" dirty="0" smtClean="0">
+                <a:solidFill>
+                  <a:schemeClr val="tx1"/>
+                </a:solidFill>
+                <a:latin typeface="+mn-lt"/>
+                <a:ea typeface="+mn-ea"/>
+                <a:cs typeface="+mn-cs"/>
+              </a:defRPr>
+            </a:lvl6pPr>
+            <a:lvl7pPr marL="2514600" indent="-228600" algn="l" defTabSz="914400" rtl="0" eaLnBrk="1" latinLnBrk="0" hangingPunct="1">
+              <a:lnSpc>
+                <a:spcPct val="150000"/>
+              </a:lnSpc>
+              <a:spcBef>
+                <a:spcPts val="1000"/>
+              </a:spcBef>
+              <a:spcAft>
+                <a:spcPts val="1200"/>
+              </a:spcAft>
+              <a:buFont typeface="Arial" panose="020B0604020202020204" pitchFamily="34" charset="0"/>
+              <a:buChar char="•"/>
+              <a:defRPr lang="en-US" sz="1200" kern="1200" dirty="0" smtClean="0">
+                <a:solidFill>
+                  <a:schemeClr val="tx1"/>
+                </a:solidFill>
+                <a:latin typeface="+mn-lt"/>
+                <a:ea typeface="+mn-ea"/>
+                <a:cs typeface="+mn-cs"/>
+              </a:defRPr>
+            </a:lvl7pPr>
+            <a:lvl8pPr marL="2971800" indent="-228600" algn="l" defTabSz="914400" rtl="0" eaLnBrk="1" latinLnBrk="0" hangingPunct="1">
+              <a:lnSpc>
+                <a:spcPct val="150000"/>
+              </a:lnSpc>
+              <a:spcBef>
+                <a:spcPts val="1000"/>
+              </a:spcBef>
+              <a:spcAft>
+                <a:spcPts val="1200"/>
+              </a:spcAft>
+              <a:buFont typeface="Arial" panose="020B0604020202020204" pitchFamily="34" charset="0"/>
+              <a:buChar char="•"/>
+              <a:defRPr lang="en-US" sz="1200" kern="1200" dirty="0" smtClean="0">
+                <a:solidFill>
+                  <a:schemeClr val="tx1"/>
+                </a:solidFill>
+                <a:latin typeface="+mn-lt"/>
+                <a:ea typeface="+mn-ea"/>
+                <a:cs typeface="+mn-cs"/>
+              </a:defRPr>
+            </a:lvl8pPr>
+            <a:lvl9pPr marL="3429000" indent="-228600" algn="l" defTabSz="914400" rtl="0" eaLnBrk="1" latinLnBrk="0" hangingPunct="1">
+              <a:lnSpc>
+                <a:spcPct val="90000"/>
+              </a:lnSpc>
+              <a:spcBef>
+                <a:spcPct val="30000"/>
+              </a:spcBef>
+              <a:buFont typeface="Arial" panose="020B0604020202020204" pitchFamily="34" charset="0"/>
+              <a:buNone/>
+              <a:defRPr sz="1200" kern="1200">
+                <a:solidFill>
+                  <a:schemeClr val="tx1"/>
+                </a:solidFill>
+                <a:latin typeface="+mn-lt"/>
+                <a:ea typeface="+mn-ea"/>
+                <a:cs typeface="+mn-cs"/>
+              </a:defRPr>
+            </a:lvl9pPr>
+          </a:lstStyle>
+          <a:p>
+            <a:r>
+              <a:rPr lang="pt-BR" sz="1100" dirty="0"/>
+              <a:t>- Colocar o Copyright usando linguagem </a:t>
+            </a:r>
+            <a:r>
+              <a:rPr lang="pt-BR" sz="1100" dirty="0" err="1"/>
+              <a:t>unicode</a:t>
+            </a:r>
+            <a:r>
+              <a:rPr lang="pt-BR" sz="1100" dirty="0"/>
+              <a:t>.</a:t>
+            </a:r>
+          </a:p>
+          <a:p>
+            <a:r>
+              <a:rPr lang="pt-BR" sz="1100" dirty="0"/>
+              <a:t>- Uso </a:t>
+            </a:r>
+            <a:r>
+              <a:rPr lang="pt-BR" sz="1100" dirty="0" err="1"/>
+              <a:t>padding</a:t>
+            </a:r>
+            <a:r>
+              <a:rPr lang="pt-BR" sz="1100" dirty="0"/>
+              <a:t> e de margem</a:t>
+            </a:r>
+          </a:p>
+          <a:p>
+            <a:r>
+              <a:rPr lang="pt-BR" sz="1100" dirty="0"/>
+              <a:t>- Criação de cores de fundo e cores de texto</a:t>
+            </a:r>
+          </a:p>
+          <a:p>
+            <a:r>
+              <a:rPr lang="pt-BR" sz="1100" dirty="0"/>
+              <a:t>- Centralização de conteúdo usando a margem automática. </a:t>
+            </a:r>
+          </a:p>
+          <a:p>
+            <a:r>
+              <a:rPr lang="pt-BR" sz="1100" dirty="0"/>
+              <a:t>- Posição de um elemento com o position </a:t>
+            </a:r>
+            <a:r>
+              <a:rPr lang="pt-BR" sz="1100" dirty="0" err="1"/>
+              <a:t>relative</a:t>
+            </a:r>
+            <a:r>
+              <a:rPr lang="pt-BR" sz="1100" dirty="0"/>
+              <a:t> e </a:t>
+            </a:r>
+            <a:r>
+              <a:rPr lang="pt-BR" sz="1100" dirty="0" err="1"/>
+              <a:t>absolute</a:t>
+            </a:r>
+            <a:r>
+              <a:rPr lang="pt-BR" sz="1100" dirty="0"/>
+              <a:t>.</a:t>
+            </a:r>
+          </a:p>
+          <a:p>
+            <a:r>
+              <a:rPr lang="pt-BR" sz="1100" dirty="0"/>
+              <a:t>- Transformação do texto deixando tudo maiúsculo.</a:t>
+            </a:r>
+          </a:p>
+          <a:p>
+            <a:r>
+              <a:rPr lang="pt-BR" sz="1100" dirty="0"/>
+              <a:t>- Como tirar o sublinhado do texto de um link.</a:t>
+            </a:r>
+          </a:p>
+        </p:txBody>
+      </p:sp>
+      <p:sp>
+        <p:nvSpPr>
+          <p:cNvPr id="9" name="Espaço Reservado para Conteúdo 2">
+            <a:extLst>
+              <a:ext uri="{FF2B5EF4-FFF2-40B4-BE49-F238E27FC236}">
+                <a16:creationId xmlns:a16="http://schemas.microsoft.com/office/drawing/2014/main" id="{A8A675D7-BB6D-31B8-3EB9-7E1007DA9C63}"/>
+              </a:ext>
+            </a:extLst>
+          </p:cNvPr>
+          <p:cNvSpPr txBox="1">
+            <a:spLocks/>
+          </p:cNvSpPr>
+          <p:nvPr/>
+        </p:nvSpPr>
+        <p:spPr>
+          <a:xfrm>
+            <a:off x="9133080" y="1435605"/>
+            <a:ext cx="2420014" cy="5083179"/>
+          </a:xfrm>
+          <a:prstGeom prst="rect">
+            <a:avLst/>
+          </a:prstGeom>
+        </p:spPr>
+        <p:txBody>
+          <a:bodyPr vert="horz" lIns="91440" tIns="45720" rIns="91440" bIns="45720" rtlCol="0">
+            <a:normAutofit fontScale="92500"/>
+          </a:bodyPr>
+          <a:lstStyle>
+            <a:lvl1pPr marL="0" indent="0" algn="l" defTabSz="914400" rtl="0" eaLnBrk="1" latinLnBrk="0" hangingPunct="1">
+              <a:lnSpc>
+                <a:spcPct val="150000"/>
+              </a:lnSpc>
+              <a:spcBef>
+                <a:spcPts val="1000"/>
+              </a:spcBef>
+              <a:spcAft>
+                <a:spcPts val="1200"/>
+              </a:spcAft>
+              <a:buFontTx/>
+              <a:buNone/>
+              <a:defRPr lang="en-US" sz="1200" kern="1200" smtClean="0">
+                <a:solidFill>
+                  <a:schemeClr val="tx1">
+                    <a:lumMod val="75000"/>
+                    <a:lumOff val="25000"/>
+                  </a:schemeClr>
+                </a:solidFill>
+                <a:latin typeface="+mn-lt"/>
+                <a:ea typeface="+mn-ea"/>
+                <a:cs typeface="+mn-cs"/>
+              </a:defRPr>
+            </a:lvl1pPr>
+            <a:lvl2pPr marL="228600" indent="-228600" algn="l" defTabSz="914400" rtl="0" eaLnBrk="1" latinLnBrk="0" hangingPunct="1">
+              <a:lnSpc>
+                <a:spcPct val="150000"/>
+              </a:lnSpc>
+              <a:spcBef>
+                <a:spcPts val="1000"/>
+              </a:spcBef>
+              <a:spcAft>
+                <a:spcPts val="1200"/>
+              </a:spcAft>
+              <a:buFont typeface="Arial" panose="020B0604020202020204" pitchFamily="34" charset="0"/>
+              <a:buChar char="•"/>
+              <a:defRPr lang="en-US" sz="1200" kern="1200" smtClean="0">
+                <a:solidFill>
+                  <a:schemeClr val="tx1">
+                    <a:lumMod val="75000"/>
+                    <a:lumOff val="25000"/>
+                  </a:schemeClr>
+                </a:solidFill>
+                <a:latin typeface="+mn-lt"/>
+                <a:ea typeface="+mn-ea"/>
+                <a:cs typeface="+mn-cs"/>
+              </a:defRPr>
+            </a:lvl2pPr>
+            <a:lvl3pPr marL="685800" indent="-228600" algn="l" defTabSz="914400" rtl="0" eaLnBrk="1" latinLnBrk="0" hangingPunct="1">
+              <a:lnSpc>
+                <a:spcPct val="150000"/>
+              </a:lnSpc>
+              <a:spcBef>
+                <a:spcPts val="1000"/>
+              </a:spcBef>
+              <a:spcAft>
+                <a:spcPts val="1200"/>
+              </a:spcAft>
+              <a:buFont typeface="Arial" panose="020B0604020202020204" pitchFamily="34" charset="0"/>
+              <a:buChar char="•"/>
+              <a:defRPr lang="en-US" sz="1200" kern="1200" smtClean="0">
+                <a:solidFill>
+                  <a:schemeClr val="tx1">
+                    <a:lumMod val="75000"/>
+                    <a:lumOff val="25000"/>
+                  </a:schemeClr>
+                </a:solidFill>
+                <a:latin typeface="+mn-lt"/>
+                <a:ea typeface="+mn-ea"/>
+                <a:cs typeface="+mn-cs"/>
+              </a:defRPr>
+            </a:lvl3pPr>
+            <a:lvl4pPr marL="1143000" indent="-228600" algn="l" defTabSz="914400" rtl="0" eaLnBrk="1" latinLnBrk="0" hangingPunct="1">
+              <a:lnSpc>
+                <a:spcPct val="150000"/>
+              </a:lnSpc>
+              <a:spcBef>
+                <a:spcPts val="1000"/>
+              </a:spcBef>
+              <a:spcAft>
+                <a:spcPts val="1200"/>
+              </a:spcAft>
+              <a:buFont typeface="Arial" panose="020B0604020202020204" pitchFamily="34" charset="0"/>
+              <a:buChar char="•"/>
+              <a:defRPr lang="en-US" sz="1200" kern="1200" smtClean="0">
+                <a:solidFill>
+                  <a:schemeClr val="tx1">
+                    <a:lumMod val="75000"/>
+                    <a:lumOff val="25000"/>
+                  </a:schemeClr>
+                </a:solidFill>
+                <a:latin typeface="+mn-lt"/>
+                <a:ea typeface="+mn-ea"/>
+                <a:cs typeface="+mn-cs"/>
+              </a:defRPr>
+            </a:lvl4pPr>
+            <a:lvl5pPr marL="1600200" indent="-228600" algn="l" defTabSz="914400" rtl="0" eaLnBrk="1" latinLnBrk="0" hangingPunct="1">
+              <a:lnSpc>
+                <a:spcPct val="150000"/>
+              </a:lnSpc>
+              <a:spcBef>
+                <a:spcPts val="1000"/>
+              </a:spcBef>
+              <a:spcAft>
+                <a:spcPts val="1200"/>
+              </a:spcAft>
+              <a:buFont typeface="Arial" panose="020B0604020202020204" pitchFamily="34" charset="0"/>
+              <a:buChar char="•"/>
+              <a:defRPr lang="en-US" sz="1200" kern="1200">
+                <a:solidFill>
+                  <a:schemeClr val="tx1">
+                    <a:lumMod val="75000"/>
+                    <a:lumOff val="25000"/>
+                  </a:schemeClr>
+                </a:solidFill>
+                <a:latin typeface="+mn-lt"/>
+                <a:ea typeface="+mn-ea"/>
+                <a:cs typeface="+mn-cs"/>
+              </a:defRPr>
+            </a:lvl5pPr>
+            <a:lvl6pPr marL="2057400" indent="-228600" algn="l" defTabSz="914400" rtl="0" eaLnBrk="1" latinLnBrk="0" hangingPunct="1">
+              <a:lnSpc>
+                <a:spcPct val="150000"/>
+              </a:lnSpc>
+              <a:spcBef>
+                <a:spcPts val="1000"/>
+              </a:spcBef>
+              <a:spcAft>
+                <a:spcPts val="1200"/>
+              </a:spcAft>
+              <a:buFont typeface="Arial" panose="020B0604020202020204" pitchFamily="34" charset="0"/>
+              <a:buChar char="•"/>
+              <a:defRPr lang="en-US" sz="1200" kern="1200" dirty="0" smtClean="0">
+                <a:solidFill>
+                  <a:schemeClr val="tx1"/>
+                </a:solidFill>
+                <a:latin typeface="+mn-lt"/>
+                <a:ea typeface="+mn-ea"/>
+                <a:cs typeface="+mn-cs"/>
+              </a:defRPr>
+            </a:lvl6pPr>
+            <a:lvl7pPr marL="2514600" indent="-228600" algn="l" defTabSz="914400" rtl="0" eaLnBrk="1" latinLnBrk="0" hangingPunct="1">
+              <a:lnSpc>
+                <a:spcPct val="150000"/>
+              </a:lnSpc>
+              <a:spcBef>
+                <a:spcPts val="1000"/>
+              </a:spcBef>
+              <a:spcAft>
+                <a:spcPts val="1200"/>
+              </a:spcAft>
+              <a:buFont typeface="Arial" panose="020B0604020202020204" pitchFamily="34" charset="0"/>
+              <a:buChar char="•"/>
+              <a:defRPr lang="en-US" sz="1200" kern="1200" dirty="0" smtClean="0">
+                <a:solidFill>
+                  <a:schemeClr val="tx1"/>
+                </a:solidFill>
+                <a:latin typeface="+mn-lt"/>
+                <a:ea typeface="+mn-ea"/>
+                <a:cs typeface="+mn-cs"/>
+              </a:defRPr>
+            </a:lvl7pPr>
+            <a:lvl8pPr marL="2971800" indent="-228600" algn="l" defTabSz="914400" rtl="0" eaLnBrk="1" latinLnBrk="0" hangingPunct="1">
+              <a:lnSpc>
+                <a:spcPct val="150000"/>
+              </a:lnSpc>
+              <a:spcBef>
+                <a:spcPts val="1000"/>
+              </a:spcBef>
+              <a:spcAft>
+                <a:spcPts val="1200"/>
+              </a:spcAft>
+              <a:buFont typeface="Arial" panose="020B0604020202020204" pitchFamily="34" charset="0"/>
+              <a:buChar char="•"/>
+              <a:defRPr lang="en-US" sz="1200" kern="1200" dirty="0" smtClean="0">
+                <a:solidFill>
+                  <a:schemeClr val="tx1"/>
+                </a:solidFill>
+                <a:latin typeface="+mn-lt"/>
+                <a:ea typeface="+mn-ea"/>
+                <a:cs typeface="+mn-cs"/>
+              </a:defRPr>
+            </a:lvl8pPr>
+            <a:lvl9pPr marL="3429000" indent="-228600" algn="l" defTabSz="914400" rtl="0" eaLnBrk="1" latinLnBrk="0" hangingPunct="1">
+              <a:lnSpc>
+                <a:spcPct val="90000"/>
+              </a:lnSpc>
+              <a:spcBef>
+                <a:spcPct val="30000"/>
+              </a:spcBef>
+              <a:buFont typeface="Arial" panose="020B0604020202020204" pitchFamily="34" charset="0"/>
+              <a:buNone/>
+              <a:defRPr sz="1200" kern="1200">
+                <a:solidFill>
+                  <a:schemeClr val="tx1"/>
+                </a:solidFill>
+                <a:latin typeface="+mn-lt"/>
+                <a:ea typeface="+mn-ea"/>
+                <a:cs typeface="+mn-cs"/>
+              </a:defRPr>
+            </a:lvl9pPr>
+          </a:lstStyle>
+          <a:p>
+            <a:r>
+              <a:rPr lang="pt-BR" dirty="0"/>
+              <a:t>- Como transformar um elemento em um tamanho percentual, como botar a margem em percentual, como botar o conteúdo do elemento para se comportar de acordo com a largura em percentual que criamos.</a:t>
+            </a:r>
+          </a:p>
+          <a:p>
+            <a:r>
+              <a:rPr lang="pt-BR" dirty="0"/>
+              <a:t>- Borda, arredondamento do canto da borda</a:t>
+            </a:r>
+          </a:p>
+          <a:p>
+            <a:r>
+              <a:rPr lang="pt-BR" dirty="0"/>
+              <a:t>- Comportamento dos elementos com o </a:t>
+            </a:r>
+            <a:r>
+              <a:rPr lang="pt-BR" dirty="0" err="1"/>
+              <a:t>hover</a:t>
+            </a:r>
+            <a:r>
+              <a:rPr lang="pt-BR" dirty="0"/>
+              <a:t> e </a:t>
+            </a:r>
+            <a:r>
+              <a:rPr lang="pt-BR" dirty="0" err="1"/>
+              <a:t>active</a:t>
+            </a:r>
+            <a:r>
+              <a:rPr lang="pt-BR" dirty="0"/>
+              <a:t>. </a:t>
+            </a:r>
+          </a:p>
+          <a:p>
+            <a:r>
+              <a:rPr lang="pt-BR" dirty="0"/>
+              <a:t>- Rodapé, botando uma imagem de fundo repetida automaticamente e mexendo sempre no tamanho das fontes e tamanho dos textos.</a:t>
+            </a:r>
+          </a:p>
+        </p:txBody>
+      </p:sp>
+    </p:spTree>
+    <p:extLst>
+      <p:ext uri="{BB962C8B-B14F-4D97-AF65-F5344CB8AC3E}">
+        <p14:creationId xmlns:p14="http://schemas.microsoft.com/office/powerpoint/2010/main" val="1159558856"/>
+      </p:ext>
+    </p:extLst>
+  </p:cSld>
+  <p:clrMapOvr>
+    <a:masterClrMapping/>
+  </p:clrMapOvr>
+</p:sld>
+</file>
+
 <file path=ppt/slides/slide2.xml><?xml version="1.0" encoding="utf-8"?>
 <p:sld xmlns:a="http://schemas.openxmlformats.org/drawingml/2006/main" xmlns:r="http://schemas.openxmlformats.org/officeDocument/2006/relationships" xmlns:p="http://schemas.openxmlformats.org/presentationml/2006/main">
   <p:cSld>
@@ -2427,7 +4755,7 @@
           <a:p>
             <a:r>
               <a:rPr lang="pt-BR" dirty="0"/>
-              <a:t>Aprendizado</a:t>
+              <a:t>Aprendizado / O que aprendemos?</a:t>
             </a:r>
           </a:p>
         </p:txBody>
@@ -3471,7 +5799,7 @@
           <a:p>
             <a:r>
               <a:rPr lang="pt-BR" dirty="0"/>
-              <a:t>Aprendizado</a:t>
+              <a:t>Aprendizado / O que aprendemos?</a:t>
             </a:r>
           </a:p>
         </p:txBody>
@@ -4977,7 +7305,7 @@
           <a:p>
             <a:r>
               <a:rPr lang="pt-BR" dirty="0"/>
-              <a:t>Aprendizado</a:t>
+              <a:t>O que aprendemos?</a:t>
             </a:r>
           </a:p>
         </p:txBody>
@@ -5075,6 +7403,1227 @@
     <p:extLst>
       <p:ext uri="{BB962C8B-B14F-4D97-AF65-F5344CB8AC3E}">
         <p14:creationId xmlns:p14="http://schemas.microsoft.com/office/powerpoint/2010/main" val="2469283028"/>
+      </p:ext>
+    </p:extLst>
+  </p:cSld>
+  <p:clrMapOvr>
+    <a:masterClrMapping/>
+  </p:clrMapOvr>
+</p:sld>
+</file>
+
+<file path=ppt/slides/slide8.xml><?xml version="1.0" encoding="utf-8"?>
+<p:sld xmlns:a="http://schemas.openxmlformats.org/drawingml/2006/main" xmlns:r="http://schemas.openxmlformats.org/officeDocument/2006/relationships" xmlns:p="http://schemas.openxmlformats.org/presentationml/2006/main">
+  <p:cSld>
+    <p:spTree>
+      <p:nvGrpSpPr>
+        <p:cNvPr id="1" name=""/>
+        <p:cNvGrpSpPr/>
+        <p:nvPr/>
+      </p:nvGrpSpPr>
+      <p:grpSpPr>
+        <a:xfrm>
+          <a:off x="0" y="0"/>
+          <a:ext cx="0" cy="0"/>
+          <a:chOff x="0" y="0"/>
+          <a:chExt cx="0" cy="0"/>
+        </a:xfrm>
+      </p:grpSpPr>
+      <p:sp>
+        <p:nvSpPr>
+          <p:cNvPr id="2" name="Título 1">
+            <a:extLst>
+              <a:ext uri="{FF2B5EF4-FFF2-40B4-BE49-F238E27FC236}">
+                <a16:creationId xmlns:a16="http://schemas.microsoft.com/office/drawing/2014/main" id="{EA225961-95C7-E3A2-E3F2-3FFD40964884}"/>
+              </a:ext>
+            </a:extLst>
+          </p:cNvPr>
+          <p:cNvSpPr>
+            <a:spLocks noGrp="1"/>
+          </p:cNvSpPr>
+          <p:nvPr>
+            <p:ph type="title"/>
+          </p:nvPr>
+        </p:nvSpPr>
+        <p:spPr/>
+        <p:txBody>
+          <a:bodyPr/>
+          <a:lstStyle/>
+          <a:p>
+            <a:r>
+              <a:rPr lang="pt-BR" dirty="0"/>
+              <a:t>Aprendizado / O que aprendemos?</a:t>
+            </a:r>
+          </a:p>
+        </p:txBody>
+      </p:sp>
+      <p:sp>
+        <p:nvSpPr>
+          <p:cNvPr id="3" name="Espaço Reservado para Conteúdo 2">
+            <a:extLst>
+              <a:ext uri="{FF2B5EF4-FFF2-40B4-BE49-F238E27FC236}">
+                <a16:creationId xmlns:a16="http://schemas.microsoft.com/office/drawing/2014/main" id="{9D5FB0FC-B69E-D6D7-C058-18A43F0AA3E8}"/>
+              </a:ext>
+            </a:extLst>
+          </p:cNvPr>
+          <p:cNvSpPr>
+            <a:spLocks noGrp="1"/>
+          </p:cNvSpPr>
+          <p:nvPr>
+            <p:ph sz="quarter" idx="10"/>
+          </p:nvPr>
+        </p:nvSpPr>
+        <p:spPr>
+          <a:xfrm>
+            <a:off x="4473038" y="1588008"/>
+            <a:ext cx="3245923" cy="4974336"/>
+          </a:xfrm>
+        </p:spPr>
+        <p:txBody>
+          <a:bodyPr>
+            <a:normAutofit/>
+          </a:bodyPr>
+          <a:lstStyle/>
+          <a:p>
+            <a:r>
+              <a:rPr lang="pt-BR" b="1" dirty="0"/>
+              <a:t>Qualquer elemento do CSS se comporta na estrutura de caixas.</a:t>
+            </a:r>
+          </a:p>
+          <a:p>
+            <a:r>
+              <a:rPr lang="pt-BR" dirty="0"/>
+              <a:t>- Caixa do conteúdo </a:t>
+            </a:r>
+          </a:p>
+          <a:p>
+            <a:r>
+              <a:rPr lang="pt-BR" dirty="0"/>
+              <a:t>- Caixa do espaçamento interno (</a:t>
+            </a:r>
+            <a:r>
+              <a:rPr lang="pt-BR" dirty="0" err="1"/>
+              <a:t>padding</a:t>
+            </a:r>
+            <a:r>
+              <a:rPr lang="pt-BR" dirty="0"/>
+              <a:t>)</a:t>
+            </a:r>
+          </a:p>
+          <a:p>
+            <a:r>
+              <a:rPr lang="pt-BR" dirty="0"/>
+              <a:t>- Caixa da borda (</a:t>
+            </a:r>
+            <a:r>
+              <a:rPr lang="pt-BR" dirty="0" err="1"/>
+              <a:t>border</a:t>
+            </a:r>
+            <a:r>
+              <a:rPr lang="pt-BR" dirty="0"/>
+              <a:t>) </a:t>
+            </a:r>
+          </a:p>
+          <a:p>
+            <a:r>
+              <a:rPr lang="pt-BR" dirty="0"/>
+              <a:t>- Caixa do espaçamento externo (</a:t>
+            </a:r>
+            <a:r>
+              <a:rPr lang="pt-BR" dirty="0" err="1"/>
+              <a:t>margin</a:t>
+            </a:r>
+            <a:r>
+              <a:rPr lang="pt-BR" dirty="0"/>
+              <a:t>) </a:t>
+            </a:r>
+          </a:p>
+        </p:txBody>
+      </p:sp>
+      <p:sp>
+        <p:nvSpPr>
+          <p:cNvPr id="5" name="Espaço Reservado para Conteúdo 2">
+            <a:extLst>
+              <a:ext uri="{FF2B5EF4-FFF2-40B4-BE49-F238E27FC236}">
+                <a16:creationId xmlns:a16="http://schemas.microsoft.com/office/drawing/2014/main" id="{B9E4CFB2-A5DC-F085-4338-598A3FD8F3B0}"/>
+              </a:ext>
+            </a:extLst>
+          </p:cNvPr>
+          <p:cNvSpPr txBox="1">
+            <a:spLocks/>
+          </p:cNvSpPr>
+          <p:nvPr/>
+        </p:nvSpPr>
+        <p:spPr>
+          <a:xfrm>
+            <a:off x="691896" y="1588008"/>
+            <a:ext cx="3245923" cy="4974336"/>
+          </a:xfrm>
+          <a:prstGeom prst="rect">
+            <a:avLst/>
+          </a:prstGeom>
+        </p:spPr>
+        <p:txBody>
+          <a:bodyPr vert="horz" lIns="91440" tIns="45720" rIns="91440" bIns="45720" rtlCol="0">
+            <a:normAutofit lnSpcReduction="10000"/>
+          </a:bodyPr>
+          <a:lstStyle>
+            <a:lvl1pPr marL="0" indent="0" algn="l" defTabSz="914400" rtl="0" eaLnBrk="1" latinLnBrk="0" hangingPunct="1">
+              <a:lnSpc>
+                <a:spcPct val="150000"/>
+              </a:lnSpc>
+              <a:spcBef>
+                <a:spcPts val="1000"/>
+              </a:spcBef>
+              <a:spcAft>
+                <a:spcPts val="1200"/>
+              </a:spcAft>
+              <a:buFontTx/>
+              <a:buNone/>
+              <a:defRPr lang="en-US" sz="1200" kern="1200" smtClean="0">
+                <a:solidFill>
+                  <a:schemeClr val="tx1">
+                    <a:lumMod val="75000"/>
+                    <a:lumOff val="25000"/>
+                  </a:schemeClr>
+                </a:solidFill>
+                <a:latin typeface="+mn-lt"/>
+                <a:ea typeface="+mn-ea"/>
+                <a:cs typeface="+mn-cs"/>
+              </a:defRPr>
+            </a:lvl1pPr>
+            <a:lvl2pPr marL="228600" indent="-228600" algn="l" defTabSz="914400" rtl="0" eaLnBrk="1" latinLnBrk="0" hangingPunct="1">
+              <a:lnSpc>
+                <a:spcPct val="150000"/>
+              </a:lnSpc>
+              <a:spcBef>
+                <a:spcPts val="1000"/>
+              </a:spcBef>
+              <a:spcAft>
+                <a:spcPts val="1200"/>
+              </a:spcAft>
+              <a:buFont typeface="Arial" panose="020B0604020202020204" pitchFamily="34" charset="0"/>
+              <a:buChar char="•"/>
+              <a:defRPr lang="en-US" sz="1200" kern="1200" smtClean="0">
+                <a:solidFill>
+                  <a:schemeClr val="tx1">
+                    <a:lumMod val="75000"/>
+                    <a:lumOff val="25000"/>
+                  </a:schemeClr>
+                </a:solidFill>
+                <a:latin typeface="+mn-lt"/>
+                <a:ea typeface="+mn-ea"/>
+                <a:cs typeface="+mn-cs"/>
+              </a:defRPr>
+            </a:lvl2pPr>
+            <a:lvl3pPr marL="685800" indent="-228600" algn="l" defTabSz="914400" rtl="0" eaLnBrk="1" latinLnBrk="0" hangingPunct="1">
+              <a:lnSpc>
+                <a:spcPct val="150000"/>
+              </a:lnSpc>
+              <a:spcBef>
+                <a:spcPts val="1000"/>
+              </a:spcBef>
+              <a:spcAft>
+                <a:spcPts val="1200"/>
+              </a:spcAft>
+              <a:buFont typeface="Arial" panose="020B0604020202020204" pitchFamily="34" charset="0"/>
+              <a:buChar char="•"/>
+              <a:defRPr lang="en-US" sz="1200" kern="1200" smtClean="0">
+                <a:solidFill>
+                  <a:schemeClr val="tx1">
+                    <a:lumMod val="75000"/>
+                    <a:lumOff val="25000"/>
+                  </a:schemeClr>
+                </a:solidFill>
+                <a:latin typeface="+mn-lt"/>
+                <a:ea typeface="+mn-ea"/>
+                <a:cs typeface="+mn-cs"/>
+              </a:defRPr>
+            </a:lvl3pPr>
+            <a:lvl4pPr marL="1143000" indent="-228600" algn="l" defTabSz="914400" rtl="0" eaLnBrk="1" latinLnBrk="0" hangingPunct="1">
+              <a:lnSpc>
+                <a:spcPct val="150000"/>
+              </a:lnSpc>
+              <a:spcBef>
+                <a:spcPts val="1000"/>
+              </a:spcBef>
+              <a:spcAft>
+                <a:spcPts val="1200"/>
+              </a:spcAft>
+              <a:buFont typeface="Arial" panose="020B0604020202020204" pitchFamily="34" charset="0"/>
+              <a:buChar char="•"/>
+              <a:defRPr lang="en-US" sz="1200" kern="1200" smtClean="0">
+                <a:solidFill>
+                  <a:schemeClr val="tx1">
+                    <a:lumMod val="75000"/>
+                    <a:lumOff val="25000"/>
+                  </a:schemeClr>
+                </a:solidFill>
+                <a:latin typeface="+mn-lt"/>
+                <a:ea typeface="+mn-ea"/>
+                <a:cs typeface="+mn-cs"/>
+              </a:defRPr>
+            </a:lvl4pPr>
+            <a:lvl5pPr marL="1600200" indent="-228600" algn="l" defTabSz="914400" rtl="0" eaLnBrk="1" latinLnBrk="0" hangingPunct="1">
+              <a:lnSpc>
+                <a:spcPct val="150000"/>
+              </a:lnSpc>
+              <a:spcBef>
+                <a:spcPts val="1000"/>
+              </a:spcBef>
+              <a:spcAft>
+                <a:spcPts val="1200"/>
+              </a:spcAft>
+              <a:buFont typeface="Arial" panose="020B0604020202020204" pitchFamily="34" charset="0"/>
+              <a:buChar char="•"/>
+              <a:defRPr lang="en-US" sz="1200" kern="1200">
+                <a:solidFill>
+                  <a:schemeClr val="tx1">
+                    <a:lumMod val="75000"/>
+                    <a:lumOff val="25000"/>
+                  </a:schemeClr>
+                </a:solidFill>
+                <a:latin typeface="+mn-lt"/>
+                <a:ea typeface="+mn-ea"/>
+                <a:cs typeface="+mn-cs"/>
+              </a:defRPr>
+            </a:lvl5pPr>
+            <a:lvl6pPr marL="2057400" indent="-228600" algn="l" defTabSz="914400" rtl="0" eaLnBrk="1" latinLnBrk="0" hangingPunct="1">
+              <a:lnSpc>
+                <a:spcPct val="150000"/>
+              </a:lnSpc>
+              <a:spcBef>
+                <a:spcPts val="1000"/>
+              </a:spcBef>
+              <a:spcAft>
+                <a:spcPts val="1200"/>
+              </a:spcAft>
+              <a:buFont typeface="Arial" panose="020B0604020202020204" pitchFamily="34" charset="0"/>
+              <a:buChar char="•"/>
+              <a:defRPr lang="en-US" sz="1200" kern="1200" dirty="0" smtClean="0">
+                <a:solidFill>
+                  <a:schemeClr val="tx1"/>
+                </a:solidFill>
+                <a:latin typeface="+mn-lt"/>
+                <a:ea typeface="+mn-ea"/>
+                <a:cs typeface="+mn-cs"/>
+              </a:defRPr>
+            </a:lvl6pPr>
+            <a:lvl7pPr marL="2514600" indent="-228600" algn="l" defTabSz="914400" rtl="0" eaLnBrk="1" latinLnBrk="0" hangingPunct="1">
+              <a:lnSpc>
+                <a:spcPct val="150000"/>
+              </a:lnSpc>
+              <a:spcBef>
+                <a:spcPts val="1000"/>
+              </a:spcBef>
+              <a:spcAft>
+                <a:spcPts val="1200"/>
+              </a:spcAft>
+              <a:buFont typeface="Arial" panose="020B0604020202020204" pitchFamily="34" charset="0"/>
+              <a:buChar char="•"/>
+              <a:defRPr lang="en-US" sz="1200" kern="1200" dirty="0" smtClean="0">
+                <a:solidFill>
+                  <a:schemeClr val="tx1"/>
+                </a:solidFill>
+                <a:latin typeface="+mn-lt"/>
+                <a:ea typeface="+mn-ea"/>
+                <a:cs typeface="+mn-cs"/>
+              </a:defRPr>
+            </a:lvl7pPr>
+            <a:lvl8pPr marL="2971800" indent="-228600" algn="l" defTabSz="914400" rtl="0" eaLnBrk="1" latinLnBrk="0" hangingPunct="1">
+              <a:lnSpc>
+                <a:spcPct val="150000"/>
+              </a:lnSpc>
+              <a:spcBef>
+                <a:spcPts val="1000"/>
+              </a:spcBef>
+              <a:spcAft>
+                <a:spcPts val="1200"/>
+              </a:spcAft>
+              <a:buFont typeface="Arial" panose="020B0604020202020204" pitchFamily="34" charset="0"/>
+              <a:buChar char="•"/>
+              <a:defRPr lang="en-US" sz="1200" kern="1200" dirty="0" smtClean="0">
+                <a:solidFill>
+                  <a:schemeClr val="tx1"/>
+                </a:solidFill>
+                <a:latin typeface="+mn-lt"/>
+                <a:ea typeface="+mn-ea"/>
+                <a:cs typeface="+mn-cs"/>
+              </a:defRPr>
+            </a:lvl8pPr>
+            <a:lvl9pPr marL="3429000" indent="-228600" algn="l" defTabSz="914400" rtl="0" eaLnBrk="1" latinLnBrk="0" hangingPunct="1">
+              <a:lnSpc>
+                <a:spcPct val="90000"/>
+              </a:lnSpc>
+              <a:spcBef>
+                <a:spcPct val="30000"/>
+              </a:spcBef>
+              <a:buFont typeface="Arial" panose="020B0604020202020204" pitchFamily="34" charset="0"/>
+              <a:buNone/>
+              <a:defRPr sz="1200" kern="1200">
+                <a:solidFill>
+                  <a:schemeClr val="tx1"/>
+                </a:solidFill>
+                <a:latin typeface="+mn-lt"/>
+                <a:ea typeface="+mn-ea"/>
+                <a:cs typeface="+mn-cs"/>
+              </a:defRPr>
+            </a:lvl9pPr>
+          </a:lstStyle>
+          <a:p>
+            <a:r>
+              <a:rPr lang="pt-BR" b="1" dirty="0"/>
+              <a:t>Borda tem 3 aspectos importantes:</a:t>
+            </a:r>
+          </a:p>
+          <a:p>
+            <a:r>
+              <a:rPr lang="pt-BR" dirty="0"/>
+              <a:t>-Tamanho</a:t>
+            </a:r>
+            <a:br>
+              <a:rPr lang="pt-BR" dirty="0"/>
+            </a:br>
+            <a:r>
+              <a:rPr lang="pt-BR" dirty="0"/>
+              <a:t>- Tipo</a:t>
+            </a:r>
+            <a:br>
+              <a:rPr lang="pt-BR" dirty="0"/>
+            </a:br>
+            <a:r>
+              <a:rPr lang="pt-BR" dirty="0"/>
+              <a:t>- Cor </a:t>
+            </a:r>
+          </a:p>
+          <a:p>
+            <a:r>
+              <a:rPr lang="pt-BR" b="1" dirty="0"/>
+              <a:t>Essas três configurações são o que montam uma borda. </a:t>
+            </a:r>
+          </a:p>
+          <a:p>
+            <a:r>
+              <a:rPr lang="pt-BR" dirty="0"/>
+              <a:t>- </a:t>
+            </a:r>
+            <a:r>
+              <a:rPr lang="pt-BR" dirty="0" err="1"/>
+              <a:t>border</a:t>
+            </a:r>
+            <a:r>
+              <a:rPr lang="pt-BR" dirty="0"/>
+              <a:t>-color </a:t>
+            </a:r>
+            <a:br>
+              <a:rPr lang="pt-BR" dirty="0"/>
+            </a:br>
+            <a:r>
+              <a:rPr lang="pt-BR" dirty="0"/>
+              <a:t>- </a:t>
+            </a:r>
+            <a:r>
+              <a:rPr lang="pt-BR" dirty="0" err="1"/>
+              <a:t>border-width</a:t>
+            </a:r>
+            <a:r>
+              <a:rPr lang="pt-BR" dirty="0"/>
+              <a:t> </a:t>
+            </a:r>
+            <a:br>
+              <a:rPr lang="pt-BR" dirty="0"/>
+            </a:br>
+            <a:r>
+              <a:rPr lang="pt-BR" dirty="0"/>
+              <a:t>- </a:t>
+            </a:r>
+            <a:r>
+              <a:rPr lang="pt-BR" dirty="0" err="1"/>
+              <a:t>border-style</a:t>
+            </a:r>
+            <a:endParaRPr lang="pt-BR" dirty="0"/>
+          </a:p>
+          <a:p>
+            <a:r>
+              <a:rPr lang="pt-BR" b="1" dirty="0"/>
+              <a:t>Uma única declaração para fazer as três coisas: </a:t>
+            </a:r>
+          </a:p>
+          <a:p>
+            <a:r>
+              <a:rPr lang="pt-BR" dirty="0"/>
+              <a:t>- </a:t>
+            </a:r>
+            <a:r>
+              <a:rPr lang="pt-BR" dirty="0" err="1"/>
+              <a:t>border</a:t>
+            </a:r>
+            <a:r>
+              <a:rPr lang="pt-BR" dirty="0"/>
+              <a:t>: tamanho, tipo e cor. </a:t>
+            </a:r>
+            <a:br>
+              <a:rPr lang="pt-BR" dirty="0"/>
+            </a:br>
+            <a:r>
+              <a:rPr lang="pt-BR" dirty="0"/>
+              <a:t>- </a:t>
+            </a:r>
+            <a:r>
+              <a:rPr lang="pt-BR" dirty="0" err="1"/>
+              <a:t>border</a:t>
+            </a:r>
+            <a:r>
+              <a:rPr lang="pt-BR" dirty="0"/>
+              <a:t>: 2px </a:t>
+            </a:r>
+            <a:r>
+              <a:rPr lang="pt-BR" dirty="0" err="1"/>
+              <a:t>solid</a:t>
+            </a:r>
+            <a:r>
+              <a:rPr lang="pt-BR" dirty="0"/>
+              <a:t> #000000</a:t>
+            </a:r>
+          </a:p>
+        </p:txBody>
+      </p:sp>
+      <p:sp>
+        <p:nvSpPr>
+          <p:cNvPr id="6" name="Espaço Reservado para Conteúdo 2">
+            <a:extLst>
+              <a:ext uri="{FF2B5EF4-FFF2-40B4-BE49-F238E27FC236}">
+                <a16:creationId xmlns:a16="http://schemas.microsoft.com/office/drawing/2014/main" id="{6029704F-6E3B-5556-4FBB-1AD9BA7CB103}"/>
+              </a:ext>
+            </a:extLst>
+          </p:cNvPr>
+          <p:cNvSpPr txBox="1">
+            <a:spLocks/>
+          </p:cNvSpPr>
+          <p:nvPr/>
+        </p:nvSpPr>
+        <p:spPr>
+          <a:xfrm>
+            <a:off x="8120167" y="1588008"/>
+            <a:ext cx="3245923" cy="4974336"/>
+          </a:xfrm>
+          <a:prstGeom prst="rect">
+            <a:avLst/>
+          </a:prstGeom>
+        </p:spPr>
+        <p:txBody>
+          <a:bodyPr vert="horz" lIns="91440" tIns="45720" rIns="91440" bIns="45720" rtlCol="0">
+            <a:normAutofit/>
+          </a:bodyPr>
+          <a:lstStyle>
+            <a:lvl1pPr marL="0" indent="0" algn="l" defTabSz="914400" rtl="0" eaLnBrk="1" latinLnBrk="0" hangingPunct="1">
+              <a:lnSpc>
+                <a:spcPct val="150000"/>
+              </a:lnSpc>
+              <a:spcBef>
+                <a:spcPts val="1000"/>
+              </a:spcBef>
+              <a:spcAft>
+                <a:spcPts val="1200"/>
+              </a:spcAft>
+              <a:buFontTx/>
+              <a:buNone/>
+              <a:defRPr lang="en-US" sz="1200" kern="1200" smtClean="0">
+                <a:solidFill>
+                  <a:schemeClr val="tx1">
+                    <a:lumMod val="75000"/>
+                    <a:lumOff val="25000"/>
+                  </a:schemeClr>
+                </a:solidFill>
+                <a:latin typeface="+mn-lt"/>
+                <a:ea typeface="+mn-ea"/>
+                <a:cs typeface="+mn-cs"/>
+              </a:defRPr>
+            </a:lvl1pPr>
+            <a:lvl2pPr marL="228600" indent="-228600" algn="l" defTabSz="914400" rtl="0" eaLnBrk="1" latinLnBrk="0" hangingPunct="1">
+              <a:lnSpc>
+                <a:spcPct val="150000"/>
+              </a:lnSpc>
+              <a:spcBef>
+                <a:spcPts val="1000"/>
+              </a:spcBef>
+              <a:spcAft>
+                <a:spcPts val="1200"/>
+              </a:spcAft>
+              <a:buFont typeface="Arial" panose="020B0604020202020204" pitchFamily="34" charset="0"/>
+              <a:buChar char="•"/>
+              <a:defRPr lang="en-US" sz="1200" kern="1200" smtClean="0">
+                <a:solidFill>
+                  <a:schemeClr val="tx1">
+                    <a:lumMod val="75000"/>
+                    <a:lumOff val="25000"/>
+                  </a:schemeClr>
+                </a:solidFill>
+                <a:latin typeface="+mn-lt"/>
+                <a:ea typeface="+mn-ea"/>
+                <a:cs typeface="+mn-cs"/>
+              </a:defRPr>
+            </a:lvl2pPr>
+            <a:lvl3pPr marL="685800" indent="-228600" algn="l" defTabSz="914400" rtl="0" eaLnBrk="1" latinLnBrk="0" hangingPunct="1">
+              <a:lnSpc>
+                <a:spcPct val="150000"/>
+              </a:lnSpc>
+              <a:spcBef>
+                <a:spcPts val="1000"/>
+              </a:spcBef>
+              <a:spcAft>
+                <a:spcPts val="1200"/>
+              </a:spcAft>
+              <a:buFont typeface="Arial" panose="020B0604020202020204" pitchFamily="34" charset="0"/>
+              <a:buChar char="•"/>
+              <a:defRPr lang="en-US" sz="1200" kern="1200" smtClean="0">
+                <a:solidFill>
+                  <a:schemeClr val="tx1">
+                    <a:lumMod val="75000"/>
+                    <a:lumOff val="25000"/>
+                  </a:schemeClr>
+                </a:solidFill>
+                <a:latin typeface="+mn-lt"/>
+                <a:ea typeface="+mn-ea"/>
+                <a:cs typeface="+mn-cs"/>
+              </a:defRPr>
+            </a:lvl3pPr>
+            <a:lvl4pPr marL="1143000" indent="-228600" algn="l" defTabSz="914400" rtl="0" eaLnBrk="1" latinLnBrk="0" hangingPunct="1">
+              <a:lnSpc>
+                <a:spcPct val="150000"/>
+              </a:lnSpc>
+              <a:spcBef>
+                <a:spcPts val="1000"/>
+              </a:spcBef>
+              <a:spcAft>
+                <a:spcPts val="1200"/>
+              </a:spcAft>
+              <a:buFont typeface="Arial" panose="020B0604020202020204" pitchFamily="34" charset="0"/>
+              <a:buChar char="•"/>
+              <a:defRPr lang="en-US" sz="1200" kern="1200" smtClean="0">
+                <a:solidFill>
+                  <a:schemeClr val="tx1">
+                    <a:lumMod val="75000"/>
+                    <a:lumOff val="25000"/>
+                  </a:schemeClr>
+                </a:solidFill>
+                <a:latin typeface="+mn-lt"/>
+                <a:ea typeface="+mn-ea"/>
+                <a:cs typeface="+mn-cs"/>
+              </a:defRPr>
+            </a:lvl4pPr>
+            <a:lvl5pPr marL="1600200" indent="-228600" algn="l" defTabSz="914400" rtl="0" eaLnBrk="1" latinLnBrk="0" hangingPunct="1">
+              <a:lnSpc>
+                <a:spcPct val="150000"/>
+              </a:lnSpc>
+              <a:spcBef>
+                <a:spcPts val="1000"/>
+              </a:spcBef>
+              <a:spcAft>
+                <a:spcPts val="1200"/>
+              </a:spcAft>
+              <a:buFont typeface="Arial" panose="020B0604020202020204" pitchFamily="34" charset="0"/>
+              <a:buChar char="•"/>
+              <a:defRPr lang="en-US" sz="1200" kern="1200">
+                <a:solidFill>
+                  <a:schemeClr val="tx1">
+                    <a:lumMod val="75000"/>
+                    <a:lumOff val="25000"/>
+                  </a:schemeClr>
+                </a:solidFill>
+                <a:latin typeface="+mn-lt"/>
+                <a:ea typeface="+mn-ea"/>
+                <a:cs typeface="+mn-cs"/>
+              </a:defRPr>
+            </a:lvl5pPr>
+            <a:lvl6pPr marL="2057400" indent="-228600" algn="l" defTabSz="914400" rtl="0" eaLnBrk="1" latinLnBrk="0" hangingPunct="1">
+              <a:lnSpc>
+                <a:spcPct val="150000"/>
+              </a:lnSpc>
+              <a:spcBef>
+                <a:spcPts val="1000"/>
+              </a:spcBef>
+              <a:spcAft>
+                <a:spcPts val="1200"/>
+              </a:spcAft>
+              <a:buFont typeface="Arial" panose="020B0604020202020204" pitchFamily="34" charset="0"/>
+              <a:buChar char="•"/>
+              <a:defRPr lang="en-US" sz="1200" kern="1200" dirty="0" smtClean="0">
+                <a:solidFill>
+                  <a:schemeClr val="tx1"/>
+                </a:solidFill>
+                <a:latin typeface="+mn-lt"/>
+                <a:ea typeface="+mn-ea"/>
+                <a:cs typeface="+mn-cs"/>
+              </a:defRPr>
+            </a:lvl6pPr>
+            <a:lvl7pPr marL="2514600" indent="-228600" algn="l" defTabSz="914400" rtl="0" eaLnBrk="1" latinLnBrk="0" hangingPunct="1">
+              <a:lnSpc>
+                <a:spcPct val="150000"/>
+              </a:lnSpc>
+              <a:spcBef>
+                <a:spcPts val="1000"/>
+              </a:spcBef>
+              <a:spcAft>
+                <a:spcPts val="1200"/>
+              </a:spcAft>
+              <a:buFont typeface="Arial" panose="020B0604020202020204" pitchFamily="34" charset="0"/>
+              <a:buChar char="•"/>
+              <a:defRPr lang="en-US" sz="1200" kern="1200" dirty="0" smtClean="0">
+                <a:solidFill>
+                  <a:schemeClr val="tx1"/>
+                </a:solidFill>
+                <a:latin typeface="+mn-lt"/>
+                <a:ea typeface="+mn-ea"/>
+                <a:cs typeface="+mn-cs"/>
+              </a:defRPr>
+            </a:lvl7pPr>
+            <a:lvl8pPr marL="2971800" indent="-228600" algn="l" defTabSz="914400" rtl="0" eaLnBrk="1" latinLnBrk="0" hangingPunct="1">
+              <a:lnSpc>
+                <a:spcPct val="150000"/>
+              </a:lnSpc>
+              <a:spcBef>
+                <a:spcPts val="1000"/>
+              </a:spcBef>
+              <a:spcAft>
+                <a:spcPts val="1200"/>
+              </a:spcAft>
+              <a:buFont typeface="Arial" panose="020B0604020202020204" pitchFamily="34" charset="0"/>
+              <a:buChar char="•"/>
+              <a:defRPr lang="en-US" sz="1200" kern="1200" dirty="0" smtClean="0">
+                <a:solidFill>
+                  <a:schemeClr val="tx1"/>
+                </a:solidFill>
+                <a:latin typeface="+mn-lt"/>
+                <a:ea typeface="+mn-ea"/>
+                <a:cs typeface="+mn-cs"/>
+              </a:defRPr>
+            </a:lvl8pPr>
+            <a:lvl9pPr marL="3429000" indent="-228600" algn="l" defTabSz="914400" rtl="0" eaLnBrk="1" latinLnBrk="0" hangingPunct="1">
+              <a:lnSpc>
+                <a:spcPct val="90000"/>
+              </a:lnSpc>
+              <a:spcBef>
+                <a:spcPct val="30000"/>
+              </a:spcBef>
+              <a:buFont typeface="Arial" panose="020B0604020202020204" pitchFamily="34" charset="0"/>
+              <a:buNone/>
+              <a:defRPr sz="1200" kern="1200">
+                <a:solidFill>
+                  <a:schemeClr val="tx1"/>
+                </a:solidFill>
+                <a:latin typeface="+mn-lt"/>
+                <a:ea typeface="+mn-ea"/>
+                <a:cs typeface="+mn-cs"/>
+              </a:defRPr>
+            </a:lvl9pPr>
+          </a:lstStyle>
+          <a:p>
+            <a:r>
+              <a:rPr lang="pt-BR" dirty="0" err="1"/>
+              <a:t>border-radius</a:t>
+            </a:r>
+            <a:r>
+              <a:rPr lang="pt-BR" dirty="0"/>
+              <a:t> - raio da borda </a:t>
+            </a:r>
+          </a:p>
+          <a:p>
+            <a:r>
+              <a:rPr lang="pt-BR" dirty="0"/>
+              <a:t>top-</a:t>
+            </a:r>
+            <a:r>
+              <a:rPr lang="pt-BR" dirty="0" err="1"/>
+              <a:t>left</a:t>
+            </a:r>
+            <a:r>
+              <a:rPr lang="pt-BR" dirty="0"/>
+              <a:t>: declara o canto superior esquerdo </a:t>
+            </a:r>
+          </a:p>
+          <a:p>
+            <a:r>
+              <a:rPr lang="pt-BR" dirty="0" err="1"/>
+              <a:t>bottom-right</a:t>
+            </a:r>
+            <a:r>
+              <a:rPr lang="pt-BR" dirty="0"/>
+              <a:t>: declara o canto inferior direito </a:t>
+            </a:r>
+          </a:p>
+          <a:p>
+            <a:r>
+              <a:rPr lang="pt-BR" dirty="0" err="1"/>
+              <a:t>border-radius</a:t>
+            </a:r>
+            <a:r>
+              <a:rPr lang="pt-BR" dirty="0"/>
+              <a:t>: uma única declaração para arredondar todos os cantos de forma igual </a:t>
+            </a:r>
+          </a:p>
+          <a:p>
+            <a:r>
+              <a:rPr lang="pt-BR" b="1" dirty="0"/>
+              <a:t>Nesta aula, aprendemos:</a:t>
+            </a:r>
+          </a:p>
+          <a:p>
+            <a:pPr marL="171450" indent="-171450">
+              <a:buFont typeface="Wingdings" panose="05000000000000000000" pitchFamily="2" charset="2"/>
+              <a:buChar char="q"/>
+            </a:pPr>
+            <a:r>
+              <a:rPr lang="pt-BR" dirty="0"/>
+              <a:t>Através do CSS, aplicar bordas nos elementos.</a:t>
+            </a:r>
+          </a:p>
+          <a:p>
+            <a:pPr marL="171450" indent="-171450">
+              <a:buFont typeface="Wingdings" panose="05000000000000000000" pitchFamily="2" charset="2"/>
+              <a:buChar char="q"/>
+            </a:pPr>
+            <a:r>
+              <a:rPr lang="pt-BR" dirty="0"/>
+              <a:t>Os diferentes tipos de bordas.</a:t>
+            </a:r>
+          </a:p>
+          <a:p>
+            <a:pPr marL="171450" indent="-171450">
+              <a:buFont typeface="Wingdings" panose="05000000000000000000" pitchFamily="2" charset="2"/>
+              <a:buChar char="q"/>
+            </a:pPr>
+            <a:r>
+              <a:rPr lang="pt-BR" dirty="0"/>
+              <a:t>A deixar a borda arredondada.</a:t>
+            </a:r>
+          </a:p>
+        </p:txBody>
+      </p:sp>
+    </p:spTree>
+    <p:extLst>
+      <p:ext uri="{BB962C8B-B14F-4D97-AF65-F5344CB8AC3E}">
+        <p14:creationId xmlns:p14="http://schemas.microsoft.com/office/powerpoint/2010/main" val="3520733937"/>
+      </p:ext>
+    </p:extLst>
+  </p:cSld>
+  <p:clrMapOvr>
+    <a:masterClrMapping/>
+  </p:clrMapOvr>
+</p:sld>
+</file>
+
+<file path=ppt/slides/slide9.xml><?xml version="1.0" encoding="utf-8"?>
+<p:sld xmlns:a="http://schemas.openxmlformats.org/drawingml/2006/main" xmlns:r="http://schemas.openxmlformats.org/officeDocument/2006/relationships" xmlns:p="http://schemas.openxmlformats.org/presentationml/2006/main">
+  <p:cSld>
+    <p:spTree>
+      <p:nvGrpSpPr>
+        <p:cNvPr id="1" name=""/>
+        <p:cNvGrpSpPr/>
+        <p:nvPr/>
+      </p:nvGrpSpPr>
+      <p:grpSpPr>
+        <a:xfrm>
+          <a:off x="0" y="0"/>
+          <a:ext cx="0" cy="0"/>
+          <a:chOff x="0" y="0"/>
+          <a:chExt cx="0" cy="0"/>
+        </a:xfrm>
+      </p:grpSpPr>
+      <p:sp>
+        <p:nvSpPr>
+          <p:cNvPr id="2" name="Título 1">
+            <a:extLst>
+              <a:ext uri="{FF2B5EF4-FFF2-40B4-BE49-F238E27FC236}">
+                <a16:creationId xmlns:a16="http://schemas.microsoft.com/office/drawing/2014/main" id="{A45FFBE9-2AC3-286F-AF9D-653145DE3501}"/>
+              </a:ext>
+            </a:extLst>
+          </p:cNvPr>
+          <p:cNvSpPr>
+            <a:spLocks noGrp="1"/>
+          </p:cNvSpPr>
+          <p:nvPr>
+            <p:ph type="title"/>
+          </p:nvPr>
+        </p:nvSpPr>
+        <p:spPr/>
+        <p:txBody>
+          <a:bodyPr/>
+          <a:lstStyle/>
+          <a:p>
+            <a:r>
+              <a:rPr lang="pt-BR" dirty="0"/>
+              <a:t>Aprendizado / O que aprendemos?</a:t>
+            </a:r>
+          </a:p>
+        </p:txBody>
+      </p:sp>
+      <p:sp>
+        <p:nvSpPr>
+          <p:cNvPr id="3" name="Espaço Reservado para Conteúdo 2">
+            <a:extLst>
+              <a:ext uri="{FF2B5EF4-FFF2-40B4-BE49-F238E27FC236}">
+                <a16:creationId xmlns:a16="http://schemas.microsoft.com/office/drawing/2014/main" id="{22278C2E-6EA3-4F6C-3EA8-2C3582BEFF3E}"/>
+              </a:ext>
+            </a:extLst>
+          </p:cNvPr>
+          <p:cNvSpPr>
+            <a:spLocks noGrp="1"/>
+          </p:cNvSpPr>
+          <p:nvPr>
+            <p:ph sz="quarter" idx="10"/>
+          </p:nvPr>
+        </p:nvSpPr>
+        <p:spPr>
+          <a:xfrm>
+            <a:off x="922955" y="1946886"/>
+            <a:ext cx="4416552" cy="3977640"/>
+          </a:xfrm>
+        </p:spPr>
+        <p:txBody>
+          <a:bodyPr/>
+          <a:lstStyle/>
+          <a:p>
+            <a:r>
+              <a:rPr lang="pt-BR" dirty="0"/>
+              <a:t>A gente pode e deve usar o CSS para mapear o que o usuário está fazendo e a partir da interação dele, mudar o comportamento do elemento.</a:t>
+            </a:r>
+          </a:p>
+          <a:p>
+            <a:r>
+              <a:rPr lang="pt-BR" dirty="0" err="1"/>
+              <a:t>hover</a:t>
+            </a:r>
+            <a:r>
+              <a:rPr lang="pt-BR" dirty="0"/>
+              <a:t> -&gt; Mapeia o comportamento de quando o mouse está por cima do elemento. É quando o mouse está por cima do elemento.</a:t>
+            </a:r>
+          </a:p>
+          <a:p>
+            <a:r>
+              <a:rPr lang="pt-BR" dirty="0" err="1"/>
+              <a:t>active</a:t>
+            </a:r>
+            <a:r>
+              <a:rPr lang="pt-BR" dirty="0"/>
+              <a:t> -&gt; Quando o comportamento está ativo. Quando o mouse está com o clique pressionado. </a:t>
+            </a:r>
+          </a:p>
+        </p:txBody>
+      </p:sp>
+      <p:sp>
+        <p:nvSpPr>
+          <p:cNvPr id="4" name="Espaço Reservado para Conteúdo 2">
+            <a:extLst>
+              <a:ext uri="{FF2B5EF4-FFF2-40B4-BE49-F238E27FC236}">
+                <a16:creationId xmlns:a16="http://schemas.microsoft.com/office/drawing/2014/main" id="{A1BDA128-1E34-969A-70F9-7FE79D54F1C4}"/>
+              </a:ext>
+            </a:extLst>
+          </p:cNvPr>
+          <p:cNvSpPr txBox="1">
+            <a:spLocks/>
+          </p:cNvSpPr>
+          <p:nvPr/>
+        </p:nvSpPr>
+        <p:spPr>
+          <a:xfrm>
+            <a:off x="6479459" y="1946886"/>
+            <a:ext cx="4416552" cy="3977640"/>
+          </a:xfrm>
+          <a:prstGeom prst="rect">
+            <a:avLst/>
+          </a:prstGeom>
+        </p:spPr>
+        <p:txBody>
+          <a:bodyPr vert="horz" lIns="91440" tIns="45720" rIns="91440" bIns="45720" rtlCol="0">
+            <a:normAutofit/>
+          </a:bodyPr>
+          <a:lstStyle>
+            <a:lvl1pPr marL="0" indent="0" algn="l" defTabSz="914400" rtl="0" eaLnBrk="1" latinLnBrk="0" hangingPunct="1">
+              <a:lnSpc>
+                <a:spcPct val="150000"/>
+              </a:lnSpc>
+              <a:spcBef>
+                <a:spcPts val="1000"/>
+              </a:spcBef>
+              <a:spcAft>
+                <a:spcPts val="1200"/>
+              </a:spcAft>
+              <a:buFontTx/>
+              <a:buNone/>
+              <a:defRPr lang="en-US" sz="1200" kern="1200" smtClean="0">
+                <a:solidFill>
+                  <a:schemeClr val="tx1">
+                    <a:lumMod val="75000"/>
+                    <a:lumOff val="25000"/>
+                  </a:schemeClr>
+                </a:solidFill>
+                <a:latin typeface="+mn-lt"/>
+                <a:ea typeface="+mn-ea"/>
+                <a:cs typeface="+mn-cs"/>
+              </a:defRPr>
+            </a:lvl1pPr>
+            <a:lvl2pPr marL="228600" indent="-228600" algn="l" defTabSz="914400" rtl="0" eaLnBrk="1" latinLnBrk="0" hangingPunct="1">
+              <a:lnSpc>
+                <a:spcPct val="150000"/>
+              </a:lnSpc>
+              <a:spcBef>
+                <a:spcPts val="1000"/>
+              </a:spcBef>
+              <a:spcAft>
+                <a:spcPts val="1200"/>
+              </a:spcAft>
+              <a:buFont typeface="Arial" panose="020B0604020202020204" pitchFamily="34" charset="0"/>
+              <a:buChar char="•"/>
+              <a:defRPr lang="en-US" sz="1200" kern="1200" smtClean="0">
+                <a:solidFill>
+                  <a:schemeClr val="tx1">
+                    <a:lumMod val="75000"/>
+                    <a:lumOff val="25000"/>
+                  </a:schemeClr>
+                </a:solidFill>
+                <a:latin typeface="+mn-lt"/>
+                <a:ea typeface="+mn-ea"/>
+                <a:cs typeface="+mn-cs"/>
+              </a:defRPr>
+            </a:lvl2pPr>
+            <a:lvl3pPr marL="685800" indent="-228600" algn="l" defTabSz="914400" rtl="0" eaLnBrk="1" latinLnBrk="0" hangingPunct="1">
+              <a:lnSpc>
+                <a:spcPct val="150000"/>
+              </a:lnSpc>
+              <a:spcBef>
+                <a:spcPts val="1000"/>
+              </a:spcBef>
+              <a:spcAft>
+                <a:spcPts val="1200"/>
+              </a:spcAft>
+              <a:buFont typeface="Arial" panose="020B0604020202020204" pitchFamily="34" charset="0"/>
+              <a:buChar char="•"/>
+              <a:defRPr lang="en-US" sz="1200" kern="1200" smtClean="0">
+                <a:solidFill>
+                  <a:schemeClr val="tx1">
+                    <a:lumMod val="75000"/>
+                    <a:lumOff val="25000"/>
+                  </a:schemeClr>
+                </a:solidFill>
+                <a:latin typeface="+mn-lt"/>
+                <a:ea typeface="+mn-ea"/>
+                <a:cs typeface="+mn-cs"/>
+              </a:defRPr>
+            </a:lvl3pPr>
+            <a:lvl4pPr marL="1143000" indent="-228600" algn="l" defTabSz="914400" rtl="0" eaLnBrk="1" latinLnBrk="0" hangingPunct="1">
+              <a:lnSpc>
+                <a:spcPct val="150000"/>
+              </a:lnSpc>
+              <a:spcBef>
+                <a:spcPts val="1000"/>
+              </a:spcBef>
+              <a:spcAft>
+                <a:spcPts val="1200"/>
+              </a:spcAft>
+              <a:buFont typeface="Arial" panose="020B0604020202020204" pitchFamily="34" charset="0"/>
+              <a:buChar char="•"/>
+              <a:defRPr lang="en-US" sz="1200" kern="1200" smtClean="0">
+                <a:solidFill>
+                  <a:schemeClr val="tx1">
+                    <a:lumMod val="75000"/>
+                    <a:lumOff val="25000"/>
+                  </a:schemeClr>
+                </a:solidFill>
+                <a:latin typeface="+mn-lt"/>
+                <a:ea typeface="+mn-ea"/>
+                <a:cs typeface="+mn-cs"/>
+              </a:defRPr>
+            </a:lvl4pPr>
+            <a:lvl5pPr marL="1600200" indent="-228600" algn="l" defTabSz="914400" rtl="0" eaLnBrk="1" latinLnBrk="0" hangingPunct="1">
+              <a:lnSpc>
+                <a:spcPct val="150000"/>
+              </a:lnSpc>
+              <a:spcBef>
+                <a:spcPts val="1000"/>
+              </a:spcBef>
+              <a:spcAft>
+                <a:spcPts val="1200"/>
+              </a:spcAft>
+              <a:buFont typeface="Arial" panose="020B0604020202020204" pitchFamily="34" charset="0"/>
+              <a:buChar char="•"/>
+              <a:defRPr lang="en-US" sz="1200" kern="1200">
+                <a:solidFill>
+                  <a:schemeClr val="tx1">
+                    <a:lumMod val="75000"/>
+                    <a:lumOff val="25000"/>
+                  </a:schemeClr>
+                </a:solidFill>
+                <a:latin typeface="+mn-lt"/>
+                <a:ea typeface="+mn-ea"/>
+                <a:cs typeface="+mn-cs"/>
+              </a:defRPr>
+            </a:lvl5pPr>
+            <a:lvl6pPr marL="2057400" indent="-228600" algn="l" defTabSz="914400" rtl="0" eaLnBrk="1" latinLnBrk="0" hangingPunct="1">
+              <a:lnSpc>
+                <a:spcPct val="150000"/>
+              </a:lnSpc>
+              <a:spcBef>
+                <a:spcPts val="1000"/>
+              </a:spcBef>
+              <a:spcAft>
+                <a:spcPts val="1200"/>
+              </a:spcAft>
+              <a:buFont typeface="Arial" panose="020B0604020202020204" pitchFamily="34" charset="0"/>
+              <a:buChar char="•"/>
+              <a:defRPr lang="en-US" sz="1200" kern="1200" dirty="0" smtClean="0">
+                <a:solidFill>
+                  <a:schemeClr val="tx1"/>
+                </a:solidFill>
+                <a:latin typeface="+mn-lt"/>
+                <a:ea typeface="+mn-ea"/>
+                <a:cs typeface="+mn-cs"/>
+              </a:defRPr>
+            </a:lvl6pPr>
+            <a:lvl7pPr marL="2514600" indent="-228600" algn="l" defTabSz="914400" rtl="0" eaLnBrk="1" latinLnBrk="0" hangingPunct="1">
+              <a:lnSpc>
+                <a:spcPct val="150000"/>
+              </a:lnSpc>
+              <a:spcBef>
+                <a:spcPts val="1000"/>
+              </a:spcBef>
+              <a:spcAft>
+                <a:spcPts val="1200"/>
+              </a:spcAft>
+              <a:buFont typeface="Arial" panose="020B0604020202020204" pitchFamily="34" charset="0"/>
+              <a:buChar char="•"/>
+              <a:defRPr lang="en-US" sz="1200" kern="1200" dirty="0" smtClean="0">
+                <a:solidFill>
+                  <a:schemeClr val="tx1"/>
+                </a:solidFill>
+                <a:latin typeface="+mn-lt"/>
+                <a:ea typeface="+mn-ea"/>
+                <a:cs typeface="+mn-cs"/>
+              </a:defRPr>
+            </a:lvl7pPr>
+            <a:lvl8pPr marL="2971800" indent="-228600" algn="l" defTabSz="914400" rtl="0" eaLnBrk="1" latinLnBrk="0" hangingPunct="1">
+              <a:lnSpc>
+                <a:spcPct val="150000"/>
+              </a:lnSpc>
+              <a:spcBef>
+                <a:spcPts val="1000"/>
+              </a:spcBef>
+              <a:spcAft>
+                <a:spcPts val="1200"/>
+              </a:spcAft>
+              <a:buFont typeface="Arial" panose="020B0604020202020204" pitchFamily="34" charset="0"/>
+              <a:buChar char="•"/>
+              <a:defRPr lang="en-US" sz="1200" kern="1200" dirty="0" smtClean="0">
+                <a:solidFill>
+                  <a:schemeClr val="tx1"/>
+                </a:solidFill>
+                <a:latin typeface="+mn-lt"/>
+                <a:ea typeface="+mn-ea"/>
+                <a:cs typeface="+mn-cs"/>
+              </a:defRPr>
+            </a:lvl8pPr>
+            <a:lvl9pPr marL="3429000" indent="-228600" algn="l" defTabSz="914400" rtl="0" eaLnBrk="1" latinLnBrk="0" hangingPunct="1">
+              <a:lnSpc>
+                <a:spcPct val="90000"/>
+              </a:lnSpc>
+              <a:spcBef>
+                <a:spcPct val="30000"/>
+              </a:spcBef>
+              <a:buFont typeface="Arial" panose="020B0604020202020204" pitchFamily="34" charset="0"/>
+              <a:buNone/>
+              <a:defRPr sz="1200" kern="1200">
+                <a:solidFill>
+                  <a:schemeClr val="tx1"/>
+                </a:solidFill>
+                <a:latin typeface="+mn-lt"/>
+                <a:ea typeface="+mn-ea"/>
+                <a:cs typeface="+mn-cs"/>
+              </a:defRPr>
+            </a:lvl9pPr>
+          </a:lstStyle>
+          <a:p>
+            <a:r>
+              <a:rPr lang="pt-BR" b="1" dirty="0"/>
+              <a:t>Nesta aula, aprendemos:</a:t>
+            </a:r>
+          </a:p>
+          <a:p>
+            <a:pPr marL="171450" indent="-171450">
+              <a:buFont typeface="Wingdings" panose="05000000000000000000" pitchFamily="2" charset="2"/>
+              <a:buChar char="q"/>
+            </a:pPr>
+            <a:r>
+              <a:rPr lang="pt-BR" dirty="0"/>
+              <a:t>Algumas </a:t>
+            </a:r>
+            <a:r>
+              <a:rPr lang="pt-BR" dirty="0" err="1"/>
+              <a:t>pseudo-classes</a:t>
+            </a:r>
+            <a:r>
+              <a:rPr lang="pt-BR" dirty="0"/>
+              <a:t> CSS</a:t>
+            </a:r>
+            <a:br>
+              <a:rPr lang="pt-BR" dirty="0"/>
+            </a:br>
+            <a:r>
+              <a:rPr lang="pt-BR" dirty="0"/>
+              <a:t> - </a:t>
+            </a:r>
+            <a:r>
+              <a:rPr lang="pt-BR" dirty="0" err="1"/>
+              <a:t>hover</a:t>
+            </a:r>
+            <a:r>
+              <a:rPr lang="pt-BR" dirty="0"/>
+              <a:t>, quando o usuário passa o cursor sobre o elemento</a:t>
+            </a:r>
+            <a:br>
+              <a:rPr lang="pt-BR" dirty="0"/>
+            </a:br>
+            <a:r>
+              <a:rPr lang="pt-BR" dirty="0"/>
+              <a:t> - </a:t>
+            </a:r>
+            <a:r>
+              <a:rPr lang="pt-BR" dirty="0" err="1"/>
+              <a:t>active</a:t>
+            </a:r>
+            <a:r>
+              <a:rPr lang="pt-BR" dirty="0"/>
+              <a:t>, quando um elemento está sendo ativado pelo usuário</a:t>
+            </a:r>
+          </a:p>
+          <a:p>
+            <a:pPr marL="171450" indent="-171450">
+              <a:buFont typeface="Wingdings" panose="05000000000000000000" pitchFamily="2" charset="2"/>
+              <a:buChar char="q"/>
+            </a:pPr>
+            <a:r>
+              <a:rPr lang="pt-BR" dirty="0"/>
+              <a:t>A mudar a cor do texto e/ou da borda de um elemento, quando o usuário passar o cursor sobre o mesmo</a:t>
+            </a:r>
+          </a:p>
+          <a:p>
+            <a:pPr marL="171450" indent="-171450">
+              <a:buFont typeface="Wingdings" panose="05000000000000000000" pitchFamily="2" charset="2"/>
+              <a:buChar char="q"/>
+            </a:pPr>
+            <a:r>
+              <a:rPr lang="pt-BR" dirty="0"/>
+              <a:t>A mudar a cor da borda de um elemento, quando o mesmo estiver sendo ativado pelo usuário</a:t>
+            </a:r>
+          </a:p>
+          <a:p>
+            <a:endParaRPr lang="pt-BR" dirty="0"/>
+          </a:p>
+        </p:txBody>
+      </p:sp>
+    </p:spTree>
+    <p:extLst>
+      <p:ext uri="{BB962C8B-B14F-4D97-AF65-F5344CB8AC3E}">
+        <p14:creationId xmlns:p14="http://schemas.microsoft.com/office/powerpoint/2010/main" val="1750319411"/>
       </p:ext>
     </p:extLst>
   </p:cSld>

</xml_diff>